<commit_message>
add pptx and gitignore
</commit_message>
<xml_diff>
--- a/assets/cs_night_info.pptx
+++ b/assets/cs_night_info.pptx
@@ -7,9 +7,11 @@
   <p:sldIdLst>
     <p:sldId id="256" r:id="rId2"/>
     <p:sldId id="257" r:id="rId3"/>
+    <p:sldId id="259" r:id="rId4"/>
+    <p:sldId id="258" r:id="rId5"/>
   </p:sldIdLst>
   <p:sldSz cx="12192000" cy="6858000"/>
-  <p:notesSz cx="6858000" cy="9144000"/>
+  <p:notesSz cx="7010400" cy="9296400"/>
   <p:defaultTextStyle>
     <a:defPPr>
       <a:defRPr lang="en-US"/>
@@ -105,6 +107,11 @@
       </a:defRPr>
     </a:lvl9pPr>
   </p:defaultTextStyle>
+  <p:extLst>
+    <p:ext uri="{EFAFB233-063F-42B5-8137-9DF3F51BA10A}">
+      <p15:sldGuideLst xmlns:p15="http://schemas.microsoft.com/office/powerpoint/2012/main"/>
+    </p:ext>
+  </p:extLst>
 </p:presentation>
 </file>
 
@@ -255,7 +262,7 @@
           <a:p>
             <a:fld id="{C7B55AED-C6B6-4E0B-8B85-8BD7BA803EB5}" type="datetimeFigureOut">
               <a:rPr lang="en-US" smtClean="0"/>
-              <a:t>12/6/2024</a:t>
+              <a:t>12/9/2024</a:t>
             </a:fld>
             <a:endParaRPr lang="en-US"/>
           </a:p>
@@ -453,7 +460,7 @@
           <a:p>
             <a:fld id="{C7B55AED-C6B6-4E0B-8B85-8BD7BA803EB5}" type="datetimeFigureOut">
               <a:rPr lang="en-US" smtClean="0"/>
-              <a:t>12/6/2024</a:t>
+              <a:t>12/9/2024</a:t>
             </a:fld>
             <a:endParaRPr lang="en-US"/>
           </a:p>
@@ -661,7 +668,7 @@
           <a:p>
             <a:fld id="{C7B55AED-C6B6-4E0B-8B85-8BD7BA803EB5}" type="datetimeFigureOut">
               <a:rPr lang="en-US" smtClean="0"/>
-              <a:t>12/6/2024</a:t>
+              <a:t>12/9/2024</a:t>
             </a:fld>
             <a:endParaRPr lang="en-US"/>
           </a:p>
@@ -859,7 +866,7 @@
           <a:p>
             <a:fld id="{C7B55AED-C6B6-4E0B-8B85-8BD7BA803EB5}" type="datetimeFigureOut">
               <a:rPr lang="en-US" smtClean="0"/>
-              <a:t>12/6/2024</a:t>
+              <a:t>12/9/2024</a:t>
             </a:fld>
             <a:endParaRPr lang="en-US"/>
           </a:p>
@@ -1134,7 +1141,7 @@
           <a:p>
             <a:fld id="{C7B55AED-C6B6-4E0B-8B85-8BD7BA803EB5}" type="datetimeFigureOut">
               <a:rPr lang="en-US" smtClean="0"/>
-              <a:t>12/6/2024</a:t>
+              <a:t>12/9/2024</a:t>
             </a:fld>
             <a:endParaRPr lang="en-US"/>
           </a:p>
@@ -1399,7 +1406,7 @@
           <a:p>
             <a:fld id="{C7B55AED-C6B6-4E0B-8B85-8BD7BA803EB5}" type="datetimeFigureOut">
               <a:rPr lang="en-US" smtClean="0"/>
-              <a:t>12/6/2024</a:t>
+              <a:t>12/9/2024</a:t>
             </a:fld>
             <a:endParaRPr lang="en-US"/>
           </a:p>
@@ -1811,7 +1818,7 @@
           <a:p>
             <a:fld id="{C7B55AED-C6B6-4E0B-8B85-8BD7BA803EB5}" type="datetimeFigureOut">
               <a:rPr lang="en-US" smtClean="0"/>
-              <a:t>12/6/2024</a:t>
+              <a:t>12/9/2024</a:t>
             </a:fld>
             <a:endParaRPr lang="en-US"/>
           </a:p>
@@ -1952,7 +1959,7 @@
           <a:p>
             <a:fld id="{C7B55AED-C6B6-4E0B-8B85-8BD7BA803EB5}" type="datetimeFigureOut">
               <a:rPr lang="en-US" smtClean="0"/>
-              <a:t>12/6/2024</a:t>
+              <a:t>12/9/2024</a:t>
             </a:fld>
             <a:endParaRPr lang="en-US"/>
           </a:p>
@@ -2065,7 +2072,7 @@
           <a:p>
             <a:fld id="{C7B55AED-C6B6-4E0B-8B85-8BD7BA803EB5}" type="datetimeFigureOut">
               <a:rPr lang="en-US" smtClean="0"/>
-              <a:t>12/6/2024</a:t>
+              <a:t>12/9/2024</a:t>
             </a:fld>
             <a:endParaRPr lang="en-US"/>
           </a:p>
@@ -2376,7 +2383,7 @@
           <a:p>
             <a:fld id="{C7B55AED-C6B6-4E0B-8B85-8BD7BA803EB5}" type="datetimeFigureOut">
               <a:rPr lang="en-US" smtClean="0"/>
-              <a:t>12/6/2024</a:t>
+              <a:t>12/9/2024</a:t>
             </a:fld>
             <a:endParaRPr lang="en-US"/>
           </a:p>
@@ -2664,7 +2671,7 @@
           <a:p>
             <a:fld id="{C7B55AED-C6B6-4E0B-8B85-8BD7BA803EB5}" type="datetimeFigureOut">
               <a:rPr lang="en-US" smtClean="0"/>
-              <a:t>12/6/2024</a:t>
+              <a:t>12/9/2024</a:t>
             </a:fld>
             <a:endParaRPr lang="en-US"/>
           </a:p>
@@ -2905,7 +2912,7 @@
           <a:p>
             <a:fld id="{C7B55AED-C6B6-4E0B-8B85-8BD7BA803EB5}" type="datetimeFigureOut">
               <a:rPr lang="en-US" smtClean="0"/>
-              <a:t>12/6/2024</a:t>
+              <a:t>12/9/2024</a:t>
             </a:fld>
             <a:endParaRPr lang="en-US"/>
           </a:p>
@@ -3486,14 +3493,6 @@
 <file path=ppt/slides/slide2.xml><?xml version="1.0" encoding="utf-8"?>
 <p:sld xmlns:a="http://schemas.openxmlformats.org/drawingml/2006/main" xmlns:r="http://schemas.openxmlformats.org/officeDocument/2006/relationships" xmlns:p="http://schemas.openxmlformats.org/presentationml/2006/main">
   <p:cSld>
-    <p:bg>
-      <p:bgPr>
-        <a:solidFill>
-          <a:srgbClr val="9E81E7"/>
-        </a:solidFill>
-        <a:effectLst/>
-      </p:bgPr>
-    </p:bg>
     <p:spTree>
       <p:nvGrpSpPr>
         <p:cNvPr id="1" name=""/>
@@ -5935,10 +5934,4620 @@
           </a:p>
         </p:txBody>
       </p:sp>
+      <p:sp>
+        <p:nvSpPr>
+          <p:cNvPr id="8" name="TextBox 7">
+            <a:extLst>
+              <a:ext uri="{FF2B5EF4-FFF2-40B4-BE49-F238E27FC236}">
+                <a16:creationId xmlns:a16="http://schemas.microsoft.com/office/drawing/2014/main" id="{B84DEBC1-5D17-B9BD-2C57-BD50E8AA460A}"/>
+              </a:ext>
+            </a:extLst>
+          </p:cNvPr>
+          <p:cNvSpPr txBox="1"/>
+          <p:nvPr/>
+        </p:nvSpPr>
+        <p:spPr>
+          <a:xfrm>
+            <a:off x="9093624" y="497356"/>
+            <a:ext cx="697652" cy="400110"/>
+          </a:xfrm>
+          <a:prstGeom prst="rect">
+            <a:avLst/>
+          </a:prstGeom>
+          <a:noFill/>
+        </p:spPr>
+        <p:txBody>
+          <a:bodyPr wrap="square" rtlCol="0">
+            <a:spAutoFit/>
+          </a:bodyPr>
+          <a:lstStyle/>
+          <a:p>
+            <a:r>
+              <a:rPr lang="en-US" sz="2000" dirty="0">
+                <a:latin typeface="Courier New" panose="02070309020205020404" pitchFamily="49" charset="0"/>
+                <a:cs typeface="Courier New" panose="02070309020205020404" pitchFamily="49" charset="0"/>
+              </a:rPr>
+              <a:t>KEY</a:t>
+            </a:r>
+          </a:p>
+        </p:txBody>
+      </p:sp>
     </p:spTree>
     <p:extLst>
       <p:ext uri="{BB962C8B-B14F-4D97-AF65-F5344CB8AC3E}">
         <p14:creationId xmlns:p14="http://schemas.microsoft.com/office/powerpoint/2010/main" val="3567373334"/>
+      </p:ext>
+    </p:extLst>
+  </p:cSld>
+  <p:clrMapOvr>
+    <a:masterClrMapping/>
+  </p:clrMapOvr>
+</p:sld>
+</file>
+
+<file path=ppt/slides/slide3.xml><?xml version="1.0" encoding="utf-8"?>
+<p:sld xmlns:a="http://schemas.openxmlformats.org/drawingml/2006/main" xmlns:r="http://schemas.openxmlformats.org/officeDocument/2006/relationships" xmlns:p="http://schemas.openxmlformats.org/presentationml/2006/main">
+  <p:cSld>
+    <p:spTree>
+      <p:nvGrpSpPr>
+        <p:cNvPr id="1" name=""/>
+        <p:cNvGrpSpPr/>
+        <p:nvPr/>
+      </p:nvGrpSpPr>
+      <p:grpSpPr>
+        <a:xfrm>
+          <a:off x="0" y="0"/>
+          <a:ext cx="0" cy="0"/>
+          <a:chOff x="0" y="0"/>
+          <a:chExt cx="0" cy="0"/>
+        </a:xfrm>
+      </p:grpSpPr>
+      <p:graphicFrame>
+        <p:nvGraphicFramePr>
+          <p:cNvPr id="2" name="Table 1">
+            <a:extLst>
+              <a:ext uri="{FF2B5EF4-FFF2-40B4-BE49-F238E27FC236}">
+                <a16:creationId xmlns:a16="http://schemas.microsoft.com/office/drawing/2014/main" id="{B798C459-6D97-D0D8-C4AA-235B6D32AE63}"/>
+              </a:ext>
+            </a:extLst>
+          </p:cNvPr>
+          <p:cNvGraphicFramePr>
+            <a:graphicFrameLocks noGrp="1"/>
+          </p:cNvGraphicFramePr>
+          <p:nvPr>
+            <p:extLst>
+              <p:ext uri="{D42A27DB-BD31-4B8C-83A1-F6EECF244321}">
+                <p14:modId xmlns:p14="http://schemas.microsoft.com/office/powerpoint/2010/main" val="2791854995"/>
+              </p:ext>
+            </p:extLst>
+          </p:nvPr>
+        </p:nvGraphicFramePr>
+        <p:xfrm>
+          <a:off x="783589" y="264848"/>
+          <a:ext cx="1790277" cy="6328304"/>
+        </p:xfrm>
+        <a:graphic>
+          <a:graphicData uri="http://schemas.openxmlformats.org/drawingml/2006/table">
+            <a:tbl>
+              <a:tblPr firstRow="1" bandRow="1">
+                <a:tableStyleId>{616DA210-FB5B-4158-B5E0-FEB733F419BA}</a:tableStyleId>
+              </a:tblPr>
+              <a:tblGrid>
+                <a:gridCol w="875247">
+                  <a:extLst>
+                    <a:ext uri="{9D8B030D-6E8A-4147-A177-3AD203B41FA5}">
+                      <a16:colId xmlns:a16="http://schemas.microsoft.com/office/drawing/2014/main" val="2279448199"/>
+                    </a:ext>
+                  </a:extLst>
+                </a:gridCol>
+                <a:gridCol w="915030">
+                  <a:extLst>
+                    <a:ext uri="{9D8B030D-6E8A-4147-A177-3AD203B41FA5}">
+                      <a16:colId xmlns:a16="http://schemas.microsoft.com/office/drawing/2014/main" val="3943847458"/>
+                    </a:ext>
+                  </a:extLst>
+                </a:gridCol>
+              </a:tblGrid>
+              <a:tr h="384704">
+                <a:tc>
+                  <a:txBody>
+                    <a:bodyPr/>
+                    <a:lstStyle/>
+                    <a:p>
+                      <a:pPr algn="ctr"/>
+                      <a:r>
+                        <a:rPr lang="en-US" sz="1400" b="0" dirty="0">
+                          <a:latin typeface="Courier New" panose="02070309020205020404" pitchFamily="49" charset="0"/>
+                          <a:cs typeface="Courier New" panose="02070309020205020404" pitchFamily="49" charset="0"/>
+                        </a:rPr>
+                        <a:t>HEX</a:t>
+                      </a:r>
+                    </a:p>
+                  </a:txBody>
+                  <a:tcPr anchor="ctr">
+                    <a:lnL w="12700" cap="flat" cmpd="sng" algn="ctr">
+                      <a:noFill/>
+                      <a:prstDash val="solid"/>
+                      <a:round/>
+                      <a:headEnd type="none" w="med" len="med"/>
+                      <a:tailEnd type="none" w="med" len="med"/>
+                    </a:lnL>
+                    <a:lnT w="12700" cap="flat" cmpd="sng" algn="ctr">
+                      <a:noFill/>
+                      <a:prstDash val="solid"/>
+                      <a:round/>
+                      <a:headEnd type="none" w="med" len="med"/>
+                      <a:tailEnd type="none" w="med" len="med"/>
+                    </a:lnT>
+                    <a:noFill/>
+                  </a:tcPr>
+                </a:tc>
+                <a:tc>
+                  <a:txBody>
+                    <a:bodyPr/>
+                    <a:lstStyle/>
+                    <a:p>
+                      <a:pPr algn="ctr"/>
+                      <a:r>
+                        <a:rPr lang="en-US" sz="1400" b="0" dirty="0">
+                          <a:latin typeface="Courier New" panose="02070309020205020404" pitchFamily="49" charset="0"/>
+                          <a:cs typeface="Courier New" panose="02070309020205020404" pitchFamily="49" charset="0"/>
+                        </a:rPr>
+                        <a:t>LETTER</a:t>
+                      </a:r>
+                    </a:p>
+                  </a:txBody>
+                  <a:tcPr anchor="ctr">
+                    <a:lnR w="12700" cap="flat" cmpd="sng" algn="ctr">
+                      <a:noFill/>
+                      <a:prstDash val="solid"/>
+                      <a:round/>
+                      <a:headEnd type="none" w="med" len="med"/>
+                      <a:tailEnd type="none" w="med" len="med"/>
+                    </a:lnR>
+                    <a:lnT w="12700" cap="flat" cmpd="sng" algn="ctr">
+                      <a:noFill/>
+                      <a:prstDash val="solid"/>
+                      <a:round/>
+                      <a:headEnd type="none" w="med" len="med"/>
+                      <a:tailEnd type="none" w="med" len="med"/>
+                    </a:lnT>
+                    <a:noFill/>
+                  </a:tcPr>
+                </a:tc>
+                <a:extLst>
+                  <a:ext uri="{0D108BD9-81ED-4DB2-BD59-A6C34878D82A}">
+                    <a16:rowId xmlns:a16="http://schemas.microsoft.com/office/drawing/2014/main" val="577741590"/>
+                  </a:ext>
+                </a:extLst>
+              </a:tr>
+              <a:tr h="384704">
+                <a:tc>
+                  <a:txBody>
+                    <a:bodyPr/>
+                    <a:lstStyle/>
+                    <a:p>
+                      <a:pPr algn="ctr"/>
+                      <a:r>
+                        <a:rPr lang="en-US" sz="2400" dirty="0">
+                          <a:latin typeface="Courier New" panose="02070309020205020404" pitchFamily="49" charset="0"/>
+                          <a:cs typeface="Courier New" panose="02070309020205020404" pitchFamily="49" charset="0"/>
+                        </a:rPr>
+                        <a:t>41</a:t>
+                      </a:r>
+                    </a:p>
+                  </a:txBody>
+                  <a:tcPr anchor="ctr">
+                    <a:lnL w="12700" cap="flat" cmpd="sng" algn="ctr">
+                      <a:noFill/>
+                      <a:prstDash val="solid"/>
+                      <a:round/>
+                      <a:headEnd type="none" w="med" len="med"/>
+                      <a:tailEnd type="none" w="med" len="med"/>
+                    </a:lnL>
+                    <a:noFill/>
+                  </a:tcPr>
+                </a:tc>
+                <a:tc>
+                  <a:txBody>
+                    <a:bodyPr/>
+                    <a:lstStyle/>
+                    <a:p>
+                      <a:pPr algn="ctr"/>
+                      <a:r>
+                        <a:rPr lang="en-US" sz="2400" dirty="0">
+                          <a:latin typeface="Courier New" panose="02070309020205020404" pitchFamily="49" charset="0"/>
+                          <a:cs typeface="Courier New" panose="02070309020205020404" pitchFamily="49" charset="0"/>
+                        </a:rPr>
+                        <a:t>A</a:t>
+                      </a:r>
+                    </a:p>
+                  </a:txBody>
+                  <a:tcPr anchor="ctr">
+                    <a:lnR w="12700" cap="flat" cmpd="sng" algn="ctr">
+                      <a:noFill/>
+                      <a:prstDash val="solid"/>
+                      <a:round/>
+                      <a:headEnd type="none" w="med" len="med"/>
+                      <a:tailEnd type="none" w="med" len="med"/>
+                    </a:lnR>
+                    <a:noFill/>
+                  </a:tcPr>
+                </a:tc>
+                <a:extLst>
+                  <a:ext uri="{0D108BD9-81ED-4DB2-BD59-A6C34878D82A}">
+                    <a16:rowId xmlns:a16="http://schemas.microsoft.com/office/drawing/2014/main" val="1574702707"/>
+                  </a:ext>
+                </a:extLst>
+              </a:tr>
+              <a:tr h="384704">
+                <a:tc>
+                  <a:txBody>
+                    <a:bodyPr/>
+                    <a:lstStyle/>
+                    <a:p>
+                      <a:pPr algn="ctr"/>
+                      <a:r>
+                        <a:rPr lang="en-US" sz="2400" dirty="0">
+                          <a:latin typeface="Courier New" panose="02070309020205020404" pitchFamily="49" charset="0"/>
+                          <a:cs typeface="Courier New" panose="02070309020205020404" pitchFamily="49" charset="0"/>
+                        </a:rPr>
+                        <a:t>42</a:t>
+                      </a:r>
+                    </a:p>
+                  </a:txBody>
+                  <a:tcPr anchor="ctr">
+                    <a:lnL w="12700" cap="flat" cmpd="sng" algn="ctr">
+                      <a:noFill/>
+                      <a:prstDash val="solid"/>
+                      <a:round/>
+                      <a:headEnd type="none" w="med" len="med"/>
+                      <a:tailEnd type="none" w="med" len="med"/>
+                    </a:lnL>
+                    <a:noFill/>
+                  </a:tcPr>
+                </a:tc>
+                <a:tc>
+                  <a:txBody>
+                    <a:bodyPr/>
+                    <a:lstStyle/>
+                    <a:p>
+                      <a:pPr algn="ctr"/>
+                      <a:r>
+                        <a:rPr lang="en-US" sz="2400" dirty="0">
+                          <a:latin typeface="Courier New" panose="02070309020205020404" pitchFamily="49" charset="0"/>
+                          <a:cs typeface="Courier New" panose="02070309020205020404" pitchFamily="49" charset="0"/>
+                        </a:rPr>
+                        <a:t>B</a:t>
+                      </a:r>
+                    </a:p>
+                  </a:txBody>
+                  <a:tcPr anchor="ctr">
+                    <a:lnR w="12700" cap="flat" cmpd="sng" algn="ctr">
+                      <a:noFill/>
+                      <a:prstDash val="solid"/>
+                      <a:round/>
+                      <a:headEnd type="none" w="med" len="med"/>
+                      <a:tailEnd type="none" w="med" len="med"/>
+                    </a:lnR>
+                    <a:noFill/>
+                  </a:tcPr>
+                </a:tc>
+                <a:extLst>
+                  <a:ext uri="{0D108BD9-81ED-4DB2-BD59-A6C34878D82A}">
+                    <a16:rowId xmlns:a16="http://schemas.microsoft.com/office/drawing/2014/main" val="1034101600"/>
+                  </a:ext>
+                </a:extLst>
+              </a:tr>
+              <a:tr h="384704">
+                <a:tc>
+                  <a:txBody>
+                    <a:bodyPr/>
+                    <a:lstStyle/>
+                    <a:p>
+                      <a:pPr algn="ctr"/>
+                      <a:r>
+                        <a:rPr lang="en-US" sz="2400" dirty="0">
+                          <a:latin typeface="Courier New" panose="02070309020205020404" pitchFamily="49" charset="0"/>
+                          <a:cs typeface="Courier New" panose="02070309020205020404" pitchFamily="49" charset="0"/>
+                        </a:rPr>
+                        <a:t>43</a:t>
+                      </a:r>
+                    </a:p>
+                  </a:txBody>
+                  <a:tcPr anchor="ctr">
+                    <a:lnL w="12700" cap="flat" cmpd="sng" algn="ctr">
+                      <a:noFill/>
+                      <a:prstDash val="solid"/>
+                      <a:round/>
+                      <a:headEnd type="none" w="med" len="med"/>
+                      <a:tailEnd type="none" w="med" len="med"/>
+                    </a:lnL>
+                    <a:noFill/>
+                  </a:tcPr>
+                </a:tc>
+                <a:tc>
+                  <a:txBody>
+                    <a:bodyPr/>
+                    <a:lstStyle/>
+                    <a:p>
+                      <a:pPr algn="ctr"/>
+                      <a:r>
+                        <a:rPr lang="en-US" sz="2400" dirty="0">
+                          <a:latin typeface="Courier New" panose="02070309020205020404" pitchFamily="49" charset="0"/>
+                          <a:cs typeface="Courier New" panose="02070309020205020404" pitchFamily="49" charset="0"/>
+                        </a:rPr>
+                        <a:t>C</a:t>
+                      </a:r>
+                    </a:p>
+                  </a:txBody>
+                  <a:tcPr anchor="ctr">
+                    <a:lnR w="12700" cap="flat" cmpd="sng" algn="ctr">
+                      <a:noFill/>
+                      <a:prstDash val="solid"/>
+                      <a:round/>
+                      <a:headEnd type="none" w="med" len="med"/>
+                      <a:tailEnd type="none" w="med" len="med"/>
+                    </a:lnR>
+                    <a:noFill/>
+                  </a:tcPr>
+                </a:tc>
+                <a:extLst>
+                  <a:ext uri="{0D108BD9-81ED-4DB2-BD59-A6C34878D82A}">
+                    <a16:rowId xmlns:a16="http://schemas.microsoft.com/office/drawing/2014/main" val="3721495223"/>
+                  </a:ext>
+                </a:extLst>
+              </a:tr>
+              <a:tr h="384704">
+                <a:tc>
+                  <a:txBody>
+                    <a:bodyPr/>
+                    <a:lstStyle/>
+                    <a:p>
+                      <a:pPr algn="ctr"/>
+                      <a:r>
+                        <a:rPr lang="en-US" sz="2400" dirty="0">
+                          <a:latin typeface="Courier New" panose="02070309020205020404" pitchFamily="49" charset="0"/>
+                          <a:cs typeface="Courier New" panose="02070309020205020404" pitchFamily="49" charset="0"/>
+                        </a:rPr>
+                        <a:t>44</a:t>
+                      </a:r>
+                    </a:p>
+                  </a:txBody>
+                  <a:tcPr anchor="ctr">
+                    <a:lnL w="12700" cap="flat" cmpd="sng" algn="ctr">
+                      <a:noFill/>
+                      <a:prstDash val="solid"/>
+                      <a:round/>
+                      <a:headEnd type="none" w="med" len="med"/>
+                      <a:tailEnd type="none" w="med" len="med"/>
+                    </a:lnL>
+                    <a:noFill/>
+                  </a:tcPr>
+                </a:tc>
+                <a:tc>
+                  <a:txBody>
+                    <a:bodyPr/>
+                    <a:lstStyle/>
+                    <a:p>
+                      <a:pPr algn="ctr"/>
+                      <a:r>
+                        <a:rPr lang="en-US" sz="2400" dirty="0">
+                          <a:latin typeface="Courier New" panose="02070309020205020404" pitchFamily="49" charset="0"/>
+                          <a:cs typeface="Courier New" panose="02070309020205020404" pitchFamily="49" charset="0"/>
+                        </a:rPr>
+                        <a:t>D</a:t>
+                      </a:r>
+                    </a:p>
+                  </a:txBody>
+                  <a:tcPr anchor="ctr">
+                    <a:lnR w="12700" cap="flat" cmpd="sng" algn="ctr">
+                      <a:noFill/>
+                      <a:prstDash val="solid"/>
+                      <a:round/>
+                      <a:headEnd type="none" w="med" len="med"/>
+                      <a:tailEnd type="none" w="med" len="med"/>
+                    </a:lnR>
+                    <a:noFill/>
+                  </a:tcPr>
+                </a:tc>
+                <a:extLst>
+                  <a:ext uri="{0D108BD9-81ED-4DB2-BD59-A6C34878D82A}">
+                    <a16:rowId xmlns:a16="http://schemas.microsoft.com/office/drawing/2014/main" val="2888288013"/>
+                  </a:ext>
+                </a:extLst>
+              </a:tr>
+              <a:tr h="384704">
+                <a:tc>
+                  <a:txBody>
+                    <a:bodyPr/>
+                    <a:lstStyle/>
+                    <a:p>
+                      <a:pPr algn="ctr"/>
+                      <a:r>
+                        <a:rPr lang="en-US" sz="2400" dirty="0">
+                          <a:latin typeface="Courier New" panose="02070309020205020404" pitchFamily="49" charset="0"/>
+                          <a:cs typeface="Courier New" panose="02070309020205020404" pitchFamily="49" charset="0"/>
+                        </a:rPr>
+                        <a:t>45</a:t>
+                      </a:r>
+                    </a:p>
+                  </a:txBody>
+                  <a:tcPr anchor="ctr">
+                    <a:lnL w="12700" cap="flat" cmpd="sng" algn="ctr">
+                      <a:noFill/>
+                      <a:prstDash val="solid"/>
+                      <a:round/>
+                      <a:headEnd type="none" w="med" len="med"/>
+                      <a:tailEnd type="none" w="med" len="med"/>
+                    </a:lnL>
+                    <a:noFill/>
+                  </a:tcPr>
+                </a:tc>
+                <a:tc>
+                  <a:txBody>
+                    <a:bodyPr/>
+                    <a:lstStyle/>
+                    <a:p>
+                      <a:pPr algn="ctr"/>
+                      <a:r>
+                        <a:rPr lang="en-US" sz="2400" dirty="0">
+                          <a:latin typeface="Courier New" panose="02070309020205020404" pitchFamily="49" charset="0"/>
+                          <a:cs typeface="Courier New" panose="02070309020205020404" pitchFamily="49" charset="0"/>
+                        </a:rPr>
+                        <a:t>E</a:t>
+                      </a:r>
+                    </a:p>
+                  </a:txBody>
+                  <a:tcPr anchor="ctr">
+                    <a:lnR w="12700" cap="flat" cmpd="sng" algn="ctr">
+                      <a:noFill/>
+                      <a:prstDash val="solid"/>
+                      <a:round/>
+                      <a:headEnd type="none" w="med" len="med"/>
+                      <a:tailEnd type="none" w="med" len="med"/>
+                    </a:lnR>
+                    <a:noFill/>
+                  </a:tcPr>
+                </a:tc>
+                <a:extLst>
+                  <a:ext uri="{0D108BD9-81ED-4DB2-BD59-A6C34878D82A}">
+                    <a16:rowId xmlns:a16="http://schemas.microsoft.com/office/drawing/2014/main" val="350298265"/>
+                  </a:ext>
+                </a:extLst>
+              </a:tr>
+              <a:tr h="384704">
+                <a:tc>
+                  <a:txBody>
+                    <a:bodyPr/>
+                    <a:lstStyle/>
+                    <a:p>
+                      <a:pPr algn="ctr"/>
+                      <a:r>
+                        <a:rPr lang="en-US" sz="2400" dirty="0">
+                          <a:latin typeface="Courier New" panose="02070309020205020404" pitchFamily="49" charset="0"/>
+                          <a:cs typeface="Courier New" panose="02070309020205020404" pitchFamily="49" charset="0"/>
+                        </a:rPr>
+                        <a:t>46</a:t>
+                      </a:r>
+                    </a:p>
+                  </a:txBody>
+                  <a:tcPr anchor="ctr">
+                    <a:lnL w="12700" cap="flat" cmpd="sng" algn="ctr">
+                      <a:noFill/>
+                      <a:prstDash val="solid"/>
+                      <a:round/>
+                      <a:headEnd type="none" w="med" len="med"/>
+                      <a:tailEnd type="none" w="med" len="med"/>
+                    </a:lnL>
+                    <a:noFill/>
+                  </a:tcPr>
+                </a:tc>
+                <a:tc>
+                  <a:txBody>
+                    <a:bodyPr/>
+                    <a:lstStyle/>
+                    <a:p>
+                      <a:pPr algn="ctr"/>
+                      <a:r>
+                        <a:rPr lang="en-US" sz="2400" dirty="0">
+                          <a:latin typeface="Courier New" panose="02070309020205020404" pitchFamily="49" charset="0"/>
+                          <a:cs typeface="Courier New" panose="02070309020205020404" pitchFamily="49" charset="0"/>
+                        </a:rPr>
+                        <a:t>F</a:t>
+                      </a:r>
+                    </a:p>
+                  </a:txBody>
+                  <a:tcPr anchor="ctr">
+                    <a:lnR w="12700" cap="flat" cmpd="sng" algn="ctr">
+                      <a:noFill/>
+                      <a:prstDash val="solid"/>
+                      <a:round/>
+                      <a:headEnd type="none" w="med" len="med"/>
+                      <a:tailEnd type="none" w="med" len="med"/>
+                    </a:lnR>
+                    <a:noFill/>
+                  </a:tcPr>
+                </a:tc>
+                <a:extLst>
+                  <a:ext uri="{0D108BD9-81ED-4DB2-BD59-A6C34878D82A}">
+                    <a16:rowId xmlns:a16="http://schemas.microsoft.com/office/drawing/2014/main" val="2842985489"/>
+                  </a:ext>
+                </a:extLst>
+              </a:tr>
+              <a:tr h="384704">
+                <a:tc>
+                  <a:txBody>
+                    <a:bodyPr/>
+                    <a:lstStyle/>
+                    <a:p>
+                      <a:pPr algn="ctr"/>
+                      <a:r>
+                        <a:rPr lang="en-US" sz="2400" dirty="0">
+                          <a:latin typeface="Courier New" panose="02070309020205020404" pitchFamily="49" charset="0"/>
+                          <a:cs typeface="Courier New" panose="02070309020205020404" pitchFamily="49" charset="0"/>
+                        </a:rPr>
+                        <a:t>47</a:t>
+                      </a:r>
+                    </a:p>
+                  </a:txBody>
+                  <a:tcPr anchor="ctr">
+                    <a:lnL w="12700" cap="flat" cmpd="sng" algn="ctr">
+                      <a:noFill/>
+                      <a:prstDash val="solid"/>
+                      <a:round/>
+                      <a:headEnd type="none" w="med" len="med"/>
+                      <a:tailEnd type="none" w="med" len="med"/>
+                    </a:lnL>
+                    <a:noFill/>
+                  </a:tcPr>
+                </a:tc>
+                <a:tc>
+                  <a:txBody>
+                    <a:bodyPr/>
+                    <a:lstStyle/>
+                    <a:p>
+                      <a:pPr algn="ctr"/>
+                      <a:r>
+                        <a:rPr lang="en-US" sz="2400" dirty="0">
+                          <a:latin typeface="Courier New" panose="02070309020205020404" pitchFamily="49" charset="0"/>
+                          <a:cs typeface="Courier New" panose="02070309020205020404" pitchFamily="49" charset="0"/>
+                        </a:rPr>
+                        <a:t>G</a:t>
+                      </a:r>
+                    </a:p>
+                  </a:txBody>
+                  <a:tcPr anchor="ctr">
+                    <a:lnR w="12700" cap="flat" cmpd="sng" algn="ctr">
+                      <a:noFill/>
+                      <a:prstDash val="solid"/>
+                      <a:round/>
+                      <a:headEnd type="none" w="med" len="med"/>
+                      <a:tailEnd type="none" w="med" len="med"/>
+                    </a:lnR>
+                    <a:noFill/>
+                  </a:tcPr>
+                </a:tc>
+                <a:extLst>
+                  <a:ext uri="{0D108BD9-81ED-4DB2-BD59-A6C34878D82A}">
+                    <a16:rowId xmlns:a16="http://schemas.microsoft.com/office/drawing/2014/main" val="2585885942"/>
+                  </a:ext>
+                </a:extLst>
+              </a:tr>
+              <a:tr h="384704">
+                <a:tc>
+                  <a:txBody>
+                    <a:bodyPr/>
+                    <a:lstStyle/>
+                    <a:p>
+                      <a:pPr algn="ctr"/>
+                      <a:r>
+                        <a:rPr lang="en-US" sz="2400" dirty="0">
+                          <a:latin typeface="Courier New" panose="02070309020205020404" pitchFamily="49" charset="0"/>
+                          <a:cs typeface="Courier New" panose="02070309020205020404" pitchFamily="49" charset="0"/>
+                        </a:rPr>
+                        <a:t>48</a:t>
+                      </a:r>
+                    </a:p>
+                  </a:txBody>
+                  <a:tcPr anchor="ctr">
+                    <a:lnL w="12700" cap="flat" cmpd="sng" algn="ctr">
+                      <a:noFill/>
+                      <a:prstDash val="solid"/>
+                      <a:round/>
+                      <a:headEnd type="none" w="med" len="med"/>
+                      <a:tailEnd type="none" w="med" len="med"/>
+                    </a:lnL>
+                    <a:noFill/>
+                  </a:tcPr>
+                </a:tc>
+                <a:tc>
+                  <a:txBody>
+                    <a:bodyPr/>
+                    <a:lstStyle/>
+                    <a:p>
+                      <a:pPr algn="ctr"/>
+                      <a:r>
+                        <a:rPr lang="en-US" sz="2400" dirty="0">
+                          <a:latin typeface="Courier New" panose="02070309020205020404" pitchFamily="49" charset="0"/>
+                          <a:cs typeface="Courier New" panose="02070309020205020404" pitchFamily="49" charset="0"/>
+                        </a:rPr>
+                        <a:t>H</a:t>
+                      </a:r>
+                    </a:p>
+                  </a:txBody>
+                  <a:tcPr anchor="ctr">
+                    <a:lnR w="12700" cap="flat" cmpd="sng" algn="ctr">
+                      <a:noFill/>
+                      <a:prstDash val="solid"/>
+                      <a:round/>
+                      <a:headEnd type="none" w="med" len="med"/>
+                      <a:tailEnd type="none" w="med" len="med"/>
+                    </a:lnR>
+                    <a:noFill/>
+                  </a:tcPr>
+                </a:tc>
+                <a:extLst>
+                  <a:ext uri="{0D108BD9-81ED-4DB2-BD59-A6C34878D82A}">
+                    <a16:rowId xmlns:a16="http://schemas.microsoft.com/office/drawing/2014/main" val="3898739342"/>
+                  </a:ext>
+                </a:extLst>
+              </a:tr>
+              <a:tr h="384704">
+                <a:tc>
+                  <a:txBody>
+                    <a:bodyPr/>
+                    <a:lstStyle/>
+                    <a:p>
+                      <a:pPr algn="ctr"/>
+                      <a:r>
+                        <a:rPr lang="en-US" sz="2400" dirty="0">
+                          <a:latin typeface="Courier New" panose="02070309020205020404" pitchFamily="49" charset="0"/>
+                          <a:cs typeface="Courier New" panose="02070309020205020404" pitchFamily="49" charset="0"/>
+                        </a:rPr>
+                        <a:t>49</a:t>
+                      </a:r>
+                    </a:p>
+                  </a:txBody>
+                  <a:tcPr anchor="ctr">
+                    <a:lnL w="12700" cap="flat" cmpd="sng" algn="ctr">
+                      <a:noFill/>
+                      <a:prstDash val="solid"/>
+                      <a:round/>
+                      <a:headEnd type="none" w="med" len="med"/>
+                      <a:tailEnd type="none" w="med" len="med"/>
+                    </a:lnL>
+                    <a:noFill/>
+                  </a:tcPr>
+                </a:tc>
+                <a:tc>
+                  <a:txBody>
+                    <a:bodyPr/>
+                    <a:lstStyle/>
+                    <a:p>
+                      <a:pPr algn="ctr"/>
+                      <a:r>
+                        <a:rPr lang="en-US" sz="2400" dirty="0">
+                          <a:latin typeface="Courier New" panose="02070309020205020404" pitchFamily="49" charset="0"/>
+                          <a:cs typeface="Courier New" panose="02070309020205020404" pitchFamily="49" charset="0"/>
+                        </a:rPr>
+                        <a:t>I</a:t>
+                      </a:r>
+                    </a:p>
+                  </a:txBody>
+                  <a:tcPr anchor="ctr">
+                    <a:lnR w="12700" cap="flat" cmpd="sng" algn="ctr">
+                      <a:noFill/>
+                      <a:prstDash val="solid"/>
+                      <a:round/>
+                      <a:headEnd type="none" w="med" len="med"/>
+                      <a:tailEnd type="none" w="med" len="med"/>
+                    </a:lnR>
+                    <a:noFill/>
+                  </a:tcPr>
+                </a:tc>
+                <a:extLst>
+                  <a:ext uri="{0D108BD9-81ED-4DB2-BD59-A6C34878D82A}">
+                    <a16:rowId xmlns:a16="http://schemas.microsoft.com/office/drawing/2014/main" val="2516648206"/>
+                  </a:ext>
+                </a:extLst>
+              </a:tr>
+              <a:tr h="384704">
+                <a:tc>
+                  <a:txBody>
+                    <a:bodyPr/>
+                    <a:lstStyle/>
+                    <a:p>
+                      <a:pPr algn="ctr"/>
+                      <a:r>
+                        <a:rPr lang="en-US" sz="2400" dirty="0">
+                          <a:latin typeface="Courier New" panose="02070309020205020404" pitchFamily="49" charset="0"/>
+                          <a:cs typeface="Courier New" panose="02070309020205020404" pitchFamily="49" charset="0"/>
+                        </a:rPr>
+                        <a:t>4A</a:t>
+                      </a:r>
+                    </a:p>
+                  </a:txBody>
+                  <a:tcPr anchor="ctr">
+                    <a:lnL w="12700" cap="flat" cmpd="sng" algn="ctr">
+                      <a:noFill/>
+                      <a:prstDash val="solid"/>
+                      <a:round/>
+                      <a:headEnd type="none" w="med" len="med"/>
+                      <a:tailEnd type="none" w="med" len="med"/>
+                    </a:lnL>
+                    <a:noFill/>
+                  </a:tcPr>
+                </a:tc>
+                <a:tc>
+                  <a:txBody>
+                    <a:bodyPr/>
+                    <a:lstStyle/>
+                    <a:p>
+                      <a:pPr algn="ctr"/>
+                      <a:r>
+                        <a:rPr lang="en-US" sz="2400" dirty="0">
+                          <a:latin typeface="Courier New" panose="02070309020205020404" pitchFamily="49" charset="0"/>
+                          <a:cs typeface="Courier New" panose="02070309020205020404" pitchFamily="49" charset="0"/>
+                        </a:rPr>
+                        <a:t>J</a:t>
+                      </a:r>
+                    </a:p>
+                  </a:txBody>
+                  <a:tcPr anchor="ctr">
+                    <a:lnR w="12700" cap="flat" cmpd="sng" algn="ctr">
+                      <a:noFill/>
+                      <a:prstDash val="solid"/>
+                      <a:round/>
+                      <a:headEnd type="none" w="med" len="med"/>
+                      <a:tailEnd type="none" w="med" len="med"/>
+                    </a:lnR>
+                    <a:noFill/>
+                  </a:tcPr>
+                </a:tc>
+                <a:extLst>
+                  <a:ext uri="{0D108BD9-81ED-4DB2-BD59-A6C34878D82A}">
+                    <a16:rowId xmlns:a16="http://schemas.microsoft.com/office/drawing/2014/main" val="3480683499"/>
+                  </a:ext>
+                </a:extLst>
+              </a:tr>
+              <a:tr h="384704">
+                <a:tc>
+                  <a:txBody>
+                    <a:bodyPr/>
+                    <a:lstStyle/>
+                    <a:p>
+                      <a:pPr algn="ctr"/>
+                      <a:r>
+                        <a:rPr lang="en-US" sz="2400" dirty="0">
+                          <a:latin typeface="Courier New" panose="02070309020205020404" pitchFamily="49" charset="0"/>
+                          <a:cs typeface="Courier New" panose="02070309020205020404" pitchFamily="49" charset="0"/>
+                        </a:rPr>
+                        <a:t>4B</a:t>
+                      </a:r>
+                    </a:p>
+                  </a:txBody>
+                  <a:tcPr anchor="ctr">
+                    <a:lnL w="12700" cap="flat" cmpd="sng" algn="ctr">
+                      <a:noFill/>
+                      <a:prstDash val="solid"/>
+                      <a:round/>
+                      <a:headEnd type="none" w="med" len="med"/>
+                      <a:tailEnd type="none" w="med" len="med"/>
+                    </a:lnL>
+                    <a:noFill/>
+                  </a:tcPr>
+                </a:tc>
+                <a:tc>
+                  <a:txBody>
+                    <a:bodyPr/>
+                    <a:lstStyle/>
+                    <a:p>
+                      <a:pPr algn="ctr"/>
+                      <a:r>
+                        <a:rPr lang="en-US" sz="2400" dirty="0">
+                          <a:latin typeface="Courier New" panose="02070309020205020404" pitchFamily="49" charset="0"/>
+                          <a:cs typeface="Courier New" panose="02070309020205020404" pitchFamily="49" charset="0"/>
+                        </a:rPr>
+                        <a:t>K</a:t>
+                      </a:r>
+                    </a:p>
+                  </a:txBody>
+                  <a:tcPr anchor="ctr">
+                    <a:lnR w="12700" cap="flat" cmpd="sng" algn="ctr">
+                      <a:noFill/>
+                      <a:prstDash val="solid"/>
+                      <a:round/>
+                      <a:headEnd type="none" w="med" len="med"/>
+                      <a:tailEnd type="none" w="med" len="med"/>
+                    </a:lnR>
+                    <a:noFill/>
+                  </a:tcPr>
+                </a:tc>
+                <a:extLst>
+                  <a:ext uri="{0D108BD9-81ED-4DB2-BD59-A6C34878D82A}">
+                    <a16:rowId xmlns:a16="http://schemas.microsoft.com/office/drawing/2014/main" val="945269057"/>
+                  </a:ext>
+                </a:extLst>
+              </a:tr>
+              <a:tr h="384704">
+                <a:tc>
+                  <a:txBody>
+                    <a:bodyPr/>
+                    <a:lstStyle/>
+                    <a:p>
+                      <a:pPr algn="ctr"/>
+                      <a:r>
+                        <a:rPr lang="en-US" sz="2400" dirty="0">
+                          <a:latin typeface="Courier New" panose="02070309020205020404" pitchFamily="49" charset="0"/>
+                          <a:cs typeface="Courier New" panose="02070309020205020404" pitchFamily="49" charset="0"/>
+                        </a:rPr>
+                        <a:t>4C</a:t>
+                      </a:r>
+                    </a:p>
+                  </a:txBody>
+                  <a:tcPr anchor="ctr">
+                    <a:lnL w="12700" cap="flat" cmpd="sng" algn="ctr">
+                      <a:noFill/>
+                      <a:prstDash val="solid"/>
+                      <a:round/>
+                      <a:headEnd type="none" w="med" len="med"/>
+                      <a:tailEnd type="none" w="med" len="med"/>
+                    </a:lnL>
+                    <a:noFill/>
+                  </a:tcPr>
+                </a:tc>
+                <a:tc>
+                  <a:txBody>
+                    <a:bodyPr/>
+                    <a:lstStyle/>
+                    <a:p>
+                      <a:pPr algn="ctr"/>
+                      <a:r>
+                        <a:rPr lang="en-US" sz="2400" dirty="0">
+                          <a:latin typeface="Courier New" panose="02070309020205020404" pitchFamily="49" charset="0"/>
+                          <a:cs typeface="Courier New" panose="02070309020205020404" pitchFamily="49" charset="0"/>
+                        </a:rPr>
+                        <a:t>L</a:t>
+                      </a:r>
+                    </a:p>
+                  </a:txBody>
+                  <a:tcPr anchor="ctr">
+                    <a:lnR w="12700" cap="flat" cmpd="sng" algn="ctr">
+                      <a:noFill/>
+                      <a:prstDash val="solid"/>
+                      <a:round/>
+                      <a:headEnd type="none" w="med" len="med"/>
+                      <a:tailEnd type="none" w="med" len="med"/>
+                    </a:lnR>
+                    <a:noFill/>
+                  </a:tcPr>
+                </a:tc>
+                <a:extLst>
+                  <a:ext uri="{0D108BD9-81ED-4DB2-BD59-A6C34878D82A}">
+                    <a16:rowId xmlns:a16="http://schemas.microsoft.com/office/drawing/2014/main" val="897014544"/>
+                  </a:ext>
+                </a:extLst>
+              </a:tr>
+              <a:tr h="384704">
+                <a:tc>
+                  <a:txBody>
+                    <a:bodyPr/>
+                    <a:lstStyle/>
+                    <a:p>
+                      <a:pPr algn="ctr"/>
+                      <a:r>
+                        <a:rPr lang="en-US" sz="2400" dirty="0">
+                          <a:latin typeface="Courier New" panose="02070309020205020404" pitchFamily="49" charset="0"/>
+                          <a:cs typeface="Courier New" panose="02070309020205020404" pitchFamily="49" charset="0"/>
+                        </a:rPr>
+                        <a:t>4D</a:t>
+                      </a:r>
+                    </a:p>
+                  </a:txBody>
+                  <a:tcPr anchor="ctr">
+                    <a:lnL w="12700" cap="flat" cmpd="sng" algn="ctr">
+                      <a:noFill/>
+                      <a:prstDash val="solid"/>
+                      <a:round/>
+                      <a:headEnd type="none" w="med" len="med"/>
+                      <a:tailEnd type="none" w="med" len="med"/>
+                    </a:lnL>
+                    <a:lnB w="12700" cap="flat" cmpd="sng" algn="ctr">
+                      <a:noFill/>
+                      <a:prstDash val="solid"/>
+                      <a:round/>
+                      <a:headEnd type="none" w="med" len="med"/>
+                      <a:tailEnd type="none" w="med" len="med"/>
+                    </a:lnB>
+                    <a:noFill/>
+                  </a:tcPr>
+                </a:tc>
+                <a:tc>
+                  <a:txBody>
+                    <a:bodyPr/>
+                    <a:lstStyle/>
+                    <a:p>
+                      <a:pPr algn="ctr"/>
+                      <a:r>
+                        <a:rPr lang="en-US" sz="2400" dirty="0">
+                          <a:latin typeface="Courier New" panose="02070309020205020404" pitchFamily="49" charset="0"/>
+                          <a:cs typeface="Courier New" panose="02070309020205020404" pitchFamily="49" charset="0"/>
+                        </a:rPr>
+                        <a:t>M</a:t>
+                      </a:r>
+                    </a:p>
+                  </a:txBody>
+                  <a:tcPr anchor="ctr">
+                    <a:lnR w="12700" cap="flat" cmpd="sng" algn="ctr">
+                      <a:noFill/>
+                      <a:prstDash val="solid"/>
+                      <a:round/>
+                      <a:headEnd type="none" w="med" len="med"/>
+                      <a:tailEnd type="none" w="med" len="med"/>
+                    </a:lnR>
+                    <a:lnB w="12700" cap="flat" cmpd="sng" algn="ctr">
+                      <a:noFill/>
+                      <a:prstDash val="solid"/>
+                      <a:round/>
+                      <a:headEnd type="none" w="med" len="med"/>
+                      <a:tailEnd type="none" w="med" len="med"/>
+                    </a:lnB>
+                    <a:noFill/>
+                  </a:tcPr>
+                </a:tc>
+                <a:extLst>
+                  <a:ext uri="{0D108BD9-81ED-4DB2-BD59-A6C34878D82A}">
+                    <a16:rowId xmlns:a16="http://schemas.microsoft.com/office/drawing/2014/main" val="3648943626"/>
+                  </a:ext>
+                </a:extLst>
+              </a:tr>
+            </a:tbl>
+          </a:graphicData>
+        </a:graphic>
+      </p:graphicFrame>
+      <p:graphicFrame>
+        <p:nvGraphicFramePr>
+          <p:cNvPr id="3" name="Table 2">
+            <a:extLst>
+              <a:ext uri="{FF2B5EF4-FFF2-40B4-BE49-F238E27FC236}">
+                <a16:creationId xmlns:a16="http://schemas.microsoft.com/office/drawing/2014/main" id="{A781C11F-4424-16DC-3477-2141D4C0771C}"/>
+              </a:ext>
+            </a:extLst>
+          </p:cNvPr>
+          <p:cNvGraphicFramePr>
+            <a:graphicFrameLocks noGrp="1"/>
+          </p:cNvGraphicFramePr>
+          <p:nvPr>
+            <p:extLst>
+              <p:ext uri="{D42A27DB-BD31-4B8C-83A1-F6EECF244321}">
+                <p14:modId xmlns:p14="http://schemas.microsoft.com/office/powerpoint/2010/main" val="4150499042"/>
+              </p:ext>
+            </p:extLst>
+          </p:nvPr>
+        </p:nvGraphicFramePr>
+        <p:xfrm>
+          <a:off x="2902373" y="264848"/>
+          <a:ext cx="1642534" cy="6328304"/>
+        </p:xfrm>
+        <a:graphic>
+          <a:graphicData uri="http://schemas.openxmlformats.org/drawingml/2006/table">
+            <a:tbl>
+              <a:tblPr firstRow="1" bandRow="1">
+                <a:tableStyleId>{616DA210-FB5B-4158-B5E0-FEB733F419BA}</a:tableStyleId>
+              </a:tblPr>
+              <a:tblGrid>
+                <a:gridCol w="803017">
+                  <a:extLst>
+                    <a:ext uri="{9D8B030D-6E8A-4147-A177-3AD203B41FA5}">
+                      <a16:colId xmlns:a16="http://schemas.microsoft.com/office/drawing/2014/main" val="2279448199"/>
+                    </a:ext>
+                  </a:extLst>
+                </a:gridCol>
+                <a:gridCol w="839517">
+                  <a:extLst>
+                    <a:ext uri="{9D8B030D-6E8A-4147-A177-3AD203B41FA5}">
+                      <a16:colId xmlns:a16="http://schemas.microsoft.com/office/drawing/2014/main" val="3943847458"/>
+                    </a:ext>
+                  </a:extLst>
+                </a:gridCol>
+              </a:tblGrid>
+              <a:tr h="384704">
+                <a:tc>
+                  <a:txBody>
+                    <a:bodyPr/>
+                    <a:lstStyle/>
+                    <a:p>
+                      <a:pPr algn="ctr"/>
+                      <a:r>
+                        <a:rPr lang="en-US" sz="1400" b="0" dirty="0">
+                          <a:latin typeface="Courier New" panose="02070309020205020404" pitchFamily="49" charset="0"/>
+                          <a:cs typeface="Courier New" panose="02070309020205020404" pitchFamily="49" charset="0"/>
+                        </a:rPr>
+                        <a:t>HEX</a:t>
+                      </a:r>
+                    </a:p>
+                  </a:txBody>
+                  <a:tcPr anchor="ctr">
+                    <a:lnL w="12700" cap="flat" cmpd="sng" algn="ctr">
+                      <a:noFill/>
+                      <a:prstDash val="solid"/>
+                      <a:round/>
+                      <a:headEnd type="none" w="med" len="med"/>
+                      <a:tailEnd type="none" w="med" len="med"/>
+                    </a:lnL>
+                    <a:lnT w="12700" cap="flat" cmpd="sng" algn="ctr">
+                      <a:noFill/>
+                      <a:prstDash val="solid"/>
+                      <a:round/>
+                      <a:headEnd type="none" w="med" len="med"/>
+                      <a:tailEnd type="none" w="med" len="med"/>
+                    </a:lnT>
+                    <a:noFill/>
+                  </a:tcPr>
+                </a:tc>
+                <a:tc>
+                  <a:txBody>
+                    <a:bodyPr/>
+                    <a:lstStyle/>
+                    <a:p>
+                      <a:pPr algn="ctr"/>
+                      <a:r>
+                        <a:rPr lang="en-US" sz="1400" b="0" dirty="0">
+                          <a:latin typeface="Courier New" panose="02070309020205020404" pitchFamily="49" charset="0"/>
+                          <a:cs typeface="Courier New" panose="02070309020205020404" pitchFamily="49" charset="0"/>
+                        </a:rPr>
+                        <a:t>LETTER</a:t>
+                      </a:r>
+                    </a:p>
+                  </a:txBody>
+                  <a:tcPr anchor="ctr">
+                    <a:lnR w="12700" cap="flat" cmpd="sng" algn="ctr">
+                      <a:noFill/>
+                      <a:prstDash val="solid"/>
+                      <a:round/>
+                      <a:headEnd type="none" w="med" len="med"/>
+                      <a:tailEnd type="none" w="med" len="med"/>
+                    </a:lnR>
+                    <a:lnT w="12700" cap="flat" cmpd="sng" algn="ctr">
+                      <a:noFill/>
+                      <a:prstDash val="solid"/>
+                      <a:round/>
+                      <a:headEnd type="none" w="med" len="med"/>
+                      <a:tailEnd type="none" w="med" len="med"/>
+                    </a:lnT>
+                    <a:noFill/>
+                  </a:tcPr>
+                </a:tc>
+                <a:extLst>
+                  <a:ext uri="{0D108BD9-81ED-4DB2-BD59-A6C34878D82A}">
+                    <a16:rowId xmlns:a16="http://schemas.microsoft.com/office/drawing/2014/main" val="577741590"/>
+                  </a:ext>
+                </a:extLst>
+              </a:tr>
+              <a:tr h="384704">
+                <a:tc>
+                  <a:txBody>
+                    <a:bodyPr/>
+                    <a:lstStyle/>
+                    <a:p>
+                      <a:pPr algn="ctr"/>
+                      <a:r>
+                        <a:rPr lang="en-US" sz="2400" dirty="0">
+                          <a:latin typeface="Courier New" panose="02070309020205020404" pitchFamily="49" charset="0"/>
+                          <a:cs typeface="Courier New" panose="02070309020205020404" pitchFamily="49" charset="0"/>
+                        </a:rPr>
+                        <a:t>4E</a:t>
+                      </a:r>
+                    </a:p>
+                  </a:txBody>
+                  <a:tcPr anchor="ctr">
+                    <a:lnL w="12700" cap="flat" cmpd="sng" algn="ctr">
+                      <a:noFill/>
+                      <a:prstDash val="solid"/>
+                      <a:round/>
+                      <a:headEnd type="none" w="med" len="med"/>
+                      <a:tailEnd type="none" w="med" len="med"/>
+                    </a:lnL>
+                    <a:noFill/>
+                  </a:tcPr>
+                </a:tc>
+                <a:tc>
+                  <a:txBody>
+                    <a:bodyPr/>
+                    <a:lstStyle/>
+                    <a:p>
+                      <a:pPr algn="ctr"/>
+                      <a:r>
+                        <a:rPr lang="en-US" sz="2400" dirty="0">
+                          <a:latin typeface="Courier New" panose="02070309020205020404" pitchFamily="49" charset="0"/>
+                          <a:cs typeface="Courier New" panose="02070309020205020404" pitchFamily="49" charset="0"/>
+                        </a:rPr>
+                        <a:t>N</a:t>
+                      </a:r>
+                    </a:p>
+                  </a:txBody>
+                  <a:tcPr anchor="ctr">
+                    <a:lnR w="12700" cap="flat" cmpd="sng" algn="ctr">
+                      <a:noFill/>
+                      <a:prstDash val="solid"/>
+                      <a:round/>
+                      <a:headEnd type="none" w="med" len="med"/>
+                      <a:tailEnd type="none" w="med" len="med"/>
+                    </a:lnR>
+                    <a:noFill/>
+                  </a:tcPr>
+                </a:tc>
+                <a:extLst>
+                  <a:ext uri="{0D108BD9-81ED-4DB2-BD59-A6C34878D82A}">
+                    <a16:rowId xmlns:a16="http://schemas.microsoft.com/office/drawing/2014/main" val="1574702707"/>
+                  </a:ext>
+                </a:extLst>
+              </a:tr>
+              <a:tr h="384704">
+                <a:tc>
+                  <a:txBody>
+                    <a:bodyPr/>
+                    <a:lstStyle/>
+                    <a:p>
+                      <a:pPr algn="ctr"/>
+                      <a:r>
+                        <a:rPr lang="en-US" sz="2400" dirty="0">
+                          <a:latin typeface="Courier New" panose="02070309020205020404" pitchFamily="49" charset="0"/>
+                          <a:cs typeface="Courier New" panose="02070309020205020404" pitchFamily="49" charset="0"/>
+                        </a:rPr>
+                        <a:t>4F</a:t>
+                      </a:r>
+                    </a:p>
+                  </a:txBody>
+                  <a:tcPr anchor="ctr">
+                    <a:lnL w="12700" cap="flat" cmpd="sng" algn="ctr">
+                      <a:noFill/>
+                      <a:prstDash val="solid"/>
+                      <a:round/>
+                      <a:headEnd type="none" w="med" len="med"/>
+                      <a:tailEnd type="none" w="med" len="med"/>
+                    </a:lnL>
+                    <a:noFill/>
+                  </a:tcPr>
+                </a:tc>
+                <a:tc>
+                  <a:txBody>
+                    <a:bodyPr/>
+                    <a:lstStyle/>
+                    <a:p>
+                      <a:pPr algn="ctr"/>
+                      <a:r>
+                        <a:rPr lang="en-US" sz="2400" dirty="0">
+                          <a:latin typeface="Courier New" panose="02070309020205020404" pitchFamily="49" charset="0"/>
+                          <a:cs typeface="Courier New" panose="02070309020205020404" pitchFamily="49" charset="0"/>
+                        </a:rPr>
+                        <a:t>O</a:t>
+                      </a:r>
+                    </a:p>
+                  </a:txBody>
+                  <a:tcPr anchor="ctr">
+                    <a:lnR w="12700" cap="flat" cmpd="sng" algn="ctr">
+                      <a:noFill/>
+                      <a:prstDash val="solid"/>
+                      <a:round/>
+                      <a:headEnd type="none" w="med" len="med"/>
+                      <a:tailEnd type="none" w="med" len="med"/>
+                    </a:lnR>
+                    <a:noFill/>
+                  </a:tcPr>
+                </a:tc>
+                <a:extLst>
+                  <a:ext uri="{0D108BD9-81ED-4DB2-BD59-A6C34878D82A}">
+                    <a16:rowId xmlns:a16="http://schemas.microsoft.com/office/drawing/2014/main" val="1034101600"/>
+                  </a:ext>
+                </a:extLst>
+              </a:tr>
+              <a:tr h="384704">
+                <a:tc>
+                  <a:txBody>
+                    <a:bodyPr/>
+                    <a:lstStyle/>
+                    <a:p>
+                      <a:pPr algn="ctr"/>
+                      <a:r>
+                        <a:rPr lang="en-US" sz="2400" dirty="0">
+                          <a:latin typeface="Courier New" panose="02070309020205020404" pitchFamily="49" charset="0"/>
+                          <a:cs typeface="Courier New" panose="02070309020205020404" pitchFamily="49" charset="0"/>
+                        </a:rPr>
+                        <a:t>50</a:t>
+                      </a:r>
+                    </a:p>
+                  </a:txBody>
+                  <a:tcPr anchor="ctr">
+                    <a:lnL w="12700" cap="flat" cmpd="sng" algn="ctr">
+                      <a:noFill/>
+                      <a:prstDash val="solid"/>
+                      <a:round/>
+                      <a:headEnd type="none" w="med" len="med"/>
+                      <a:tailEnd type="none" w="med" len="med"/>
+                    </a:lnL>
+                    <a:noFill/>
+                  </a:tcPr>
+                </a:tc>
+                <a:tc>
+                  <a:txBody>
+                    <a:bodyPr/>
+                    <a:lstStyle/>
+                    <a:p>
+                      <a:pPr algn="ctr"/>
+                      <a:r>
+                        <a:rPr lang="en-US" sz="2400" dirty="0">
+                          <a:latin typeface="Courier New" panose="02070309020205020404" pitchFamily="49" charset="0"/>
+                          <a:cs typeface="Courier New" panose="02070309020205020404" pitchFamily="49" charset="0"/>
+                        </a:rPr>
+                        <a:t>P</a:t>
+                      </a:r>
+                    </a:p>
+                  </a:txBody>
+                  <a:tcPr anchor="ctr">
+                    <a:lnR w="12700" cap="flat" cmpd="sng" algn="ctr">
+                      <a:noFill/>
+                      <a:prstDash val="solid"/>
+                      <a:round/>
+                      <a:headEnd type="none" w="med" len="med"/>
+                      <a:tailEnd type="none" w="med" len="med"/>
+                    </a:lnR>
+                    <a:noFill/>
+                  </a:tcPr>
+                </a:tc>
+                <a:extLst>
+                  <a:ext uri="{0D108BD9-81ED-4DB2-BD59-A6C34878D82A}">
+                    <a16:rowId xmlns:a16="http://schemas.microsoft.com/office/drawing/2014/main" val="3721495223"/>
+                  </a:ext>
+                </a:extLst>
+              </a:tr>
+              <a:tr h="384704">
+                <a:tc>
+                  <a:txBody>
+                    <a:bodyPr/>
+                    <a:lstStyle/>
+                    <a:p>
+                      <a:pPr algn="ctr"/>
+                      <a:r>
+                        <a:rPr lang="en-US" sz="2400" dirty="0">
+                          <a:latin typeface="Courier New" panose="02070309020205020404" pitchFamily="49" charset="0"/>
+                          <a:cs typeface="Courier New" panose="02070309020205020404" pitchFamily="49" charset="0"/>
+                        </a:rPr>
+                        <a:t>51</a:t>
+                      </a:r>
+                    </a:p>
+                  </a:txBody>
+                  <a:tcPr anchor="ctr">
+                    <a:lnL w="12700" cap="flat" cmpd="sng" algn="ctr">
+                      <a:noFill/>
+                      <a:prstDash val="solid"/>
+                      <a:round/>
+                      <a:headEnd type="none" w="med" len="med"/>
+                      <a:tailEnd type="none" w="med" len="med"/>
+                    </a:lnL>
+                    <a:noFill/>
+                  </a:tcPr>
+                </a:tc>
+                <a:tc>
+                  <a:txBody>
+                    <a:bodyPr/>
+                    <a:lstStyle/>
+                    <a:p>
+                      <a:pPr algn="ctr"/>
+                      <a:r>
+                        <a:rPr lang="en-US" sz="2400" dirty="0">
+                          <a:latin typeface="Courier New" panose="02070309020205020404" pitchFamily="49" charset="0"/>
+                          <a:cs typeface="Courier New" panose="02070309020205020404" pitchFamily="49" charset="0"/>
+                        </a:rPr>
+                        <a:t>Q</a:t>
+                      </a:r>
+                    </a:p>
+                  </a:txBody>
+                  <a:tcPr anchor="ctr">
+                    <a:lnR w="12700" cap="flat" cmpd="sng" algn="ctr">
+                      <a:noFill/>
+                      <a:prstDash val="solid"/>
+                      <a:round/>
+                      <a:headEnd type="none" w="med" len="med"/>
+                      <a:tailEnd type="none" w="med" len="med"/>
+                    </a:lnR>
+                    <a:noFill/>
+                  </a:tcPr>
+                </a:tc>
+                <a:extLst>
+                  <a:ext uri="{0D108BD9-81ED-4DB2-BD59-A6C34878D82A}">
+                    <a16:rowId xmlns:a16="http://schemas.microsoft.com/office/drawing/2014/main" val="2888288013"/>
+                  </a:ext>
+                </a:extLst>
+              </a:tr>
+              <a:tr h="384704">
+                <a:tc>
+                  <a:txBody>
+                    <a:bodyPr/>
+                    <a:lstStyle/>
+                    <a:p>
+                      <a:pPr algn="ctr"/>
+                      <a:r>
+                        <a:rPr lang="en-US" sz="2400" dirty="0">
+                          <a:latin typeface="Courier New" panose="02070309020205020404" pitchFamily="49" charset="0"/>
+                          <a:cs typeface="Courier New" panose="02070309020205020404" pitchFamily="49" charset="0"/>
+                        </a:rPr>
+                        <a:t>52</a:t>
+                      </a:r>
+                    </a:p>
+                  </a:txBody>
+                  <a:tcPr anchor="ctr">
+                    <a:lnL w="12700" cap="flat" cmpd="sng" algn="ctr">
+                      <a:noFill/>
+                      <a:prstDash val="solid"/>
+                      <a:round/>
+                      <a:headEnd type="none" w="med" len="med"/>
+                      <a:tailEnd type="none" w="med" len="med"/>
+                    </a:lnL>
+                    <a:noFill/>
+                  </a:tcPr>
+                </a:tc>
+                <a:tc>
+                  <a:txBody>
+                    <a:bodyPr/>
+                    <a:lstStyle/>
+                    <a:p>
+                      <a:pPr algn="ctr"/>
+                      <a:r>
+                        <a:rPr lang="en-US" sz="2400" dirty="0">
+                          <a:latin typeface="Courier New" panose="02070309020205020404" pitchFamily="49" charset="0"/>
+                          <a:cs typeface="Courier New" panose="02070309020205020404" pitchFamily="49" charset="0"/>
+                        </a:rPr>
+                        <a:t>R</a:t>
+                      </a:r>
+                    </a:p>
+                  </a:txBody>
+                  <a:tcPr anchor="ctr">
+                    <a:lnR w="12700" cap="flat" cmpd="sng" algn="ctr">
+                      <a:noFill/>
+                      <a:prstDash val="solid"/>
+                      <a:round/>
+                      <a:headEnd type="none" w="med" len="med"/>
+                      <a:tailEnd type="none" w="med" len="med"/>
+                    </a:lnR>
+                    <a:noFill/>
+                  </a:tcPr>
+                </a:tc>
+                <a:extLst>
+                  <a:ext uri="{0D108BD9-81ED-4DB2-BD59-A6C34878D82A}">
+                    <a16:rowId xmlns:a16="http://schemas.microsoft.com/office/drawing/2014/main" val="350298265"/>
+                  </a:ext>
+                </a:extLst>
+              </a:tr>
+              <a:tr h="384704">
+                <a:tc>
+                  <a:txBody>
+                    <a:bodyPr/>
+                    <a:lstStyle/>
+                    <a:p>
+                      <a:pPr algn="ctr"/>
+                      <a:r>
+                        <a:rPr lang="en-US" sz="2400" dirty="0">
+                          <a:latin typeface="Courier New" panose="02070309020205020404" pitchFamily="49" charset="0"/>
+                          <a:cs typeface="Courier New" panose="02070309020205020404" pitchFamily="49" charset="0"/>
+                        </a:rPr>
+                        <a:t>53</a:t>
+                      </a:r>
+                    </a:p>
+                  </a:txBody>
+                  <a:tcPr anchor="ctr">
+                    <a:lnL w="12700" cap="flat" cmpd="sng" algn="ctr">
+                      <a:noFill/>
+                      <a:prstDash val="solid"/>
+                      <a:round/>
+                      <a:headEnd type="none" w="med" len="med"/>
+                      <a:tailEnd type="none" w="med" len="med"/>
+                    </a:lnL>
+                    <a:noFill/>
+                  </a:tcPr>
+                </a:tc>
+                <a:tc>
+                  <a:txBody>
+                    <a:bodyPr/>
+                    <a:lstStyle/>
+                    <a:p>
+                      <a:pPr algn="ctr"/>
+                      <a:r>
+                        <a:rPr lang="en-US" sz="2400" dirty="0">
+                          <a:latin typeface="Courier New" panose="02070309020205020404" pitchFamily="49" charset="0"/>
+                          <a:cs typeface="Courier New" panose="02070309020205020404" pitchFamily="49" charset="0"/>
+                        </a:rPr>
+                        <a:t>S</a:t>
+                      </a:r>
+                    </a:p>
+                  </a:txBody>
+                  <a:tcPr anchor="ctr">
+                    <a:lnR w="12700" cap="flat" cmpd="sng" algn="ctr">
+                      <a:noFill/>
+                      <a:prstDash val="solid"/>
+                      <a:round/>
+                      <a:headEnd type="none" w="med" len="med"/>
+                      <a:tailEnd type="none" w="med" len="med"/>
+                    </a:lnR>
+                    <a:noFill/>
+                  </a:tcPr>
+                </a:tc>
+                <a:extLst>
+                  <a:ext uri="{0D108BD9-81ED-4DB2-BD59-A6C34878D82A}">
+                    <a16:rowId xmlns:a16="http://schemas.microsoft.com/office/drawing/2014/main" val="2842985489"/>
+                  </a:ext>
+                </a:extLst>
+              </a:tr>
+              <a:tr h="384704">
+                <a:tc>
+                  <a:txBody>
+                    <a:bodyPr/>
+                    <a:lstStyle/>
+                    <a:p>
+                      <a:pPr algn="ctr"/>
+                      <a:r>
+                        <a:rPr lang="en-US" sz="2400" dirty="0">
+                          <a:latin typeface="Courier New" panose="02070309020205020404" pitchFamily="49" charset="0"/>
+                          <a:cs typeface="Courier New" panose="02070309020205020404" pitchFamily="49" charset="0"/>
+                        </a:rPr>
+                        <a:t>54</a:t>
+                      </a:r>
+                    </a:p>
+                  </a:txBody>
+                  <a:tcPr anchor="ctr">
+                    <a:lnL w="12700" cap="flat" cmpd="sng" algn="ctr">
+                      <a:noFill/>
+                      <a:prstDash val="solid"/>
+                      <a:round/>
+                      <a:headEnd type="none" w="med" len="med"/>
+                      <a:tailEnd type="none" w="med" len="med"/>
+                    </a:lnL>
+                    <a:noFill/>
+                  </a:tcPr>
+                </a:tc>
+                <a:tc>
+                  <a:txBody>
+                    <a:bodyPr/>
+                    <a:lstStyle/>
+                    <a:p>
+                      <a:pPr algn="ctr"/>
+                      <a:r>
+                        <a:rPr lang="en-US" sz="2400" dirty="0">
+                          <a:latin typeface="Courier New" panose="02070309020205020404" pitchFamily="49" charset="0"/>
+                          <a:cs typeface="Courier New" panose="02070309020205020404" pitchFamily="49" charset="0"/>
+                        </a:rPr>
+                        <a:t>T</a:t>
+                      </a:r>
+                    </a:p>
+                  </a:txBody>
+                  <a:tcPr anchor="ctr">
+                    <a:lnR w="12700" cap="flat" cmpd="sng" algn="ctr">
+                      <a:noFill/>
+                      <a:prstDash val="solid"/>
+                      <a:round/>
+                      <a:headEnd type="none" w="med" len="med"/>
+                      <a:tailEnd type="none" w="med" len="med"/>
+                    </a:lnR>
+                    <a:noFill/>
+                  </a:tcPr>
+                </a:tc>
+                <a:extLst>
+                  <a:ext uri="{0D108BD9-81ED-4DB2-BD59-A6C34878D82A}">
+                    <a16:rowId xmlns:a16="http://schemas.microsoft.com/office/drawing/2014/main" val="2585885942"/>
+                  </a:ext>
+                </a:extLst>
+              </a:tr>
+              <a:tr h="384704">
+                <a:tc>
+                  <a:txBody>
+                    <a:bodyPr/>
+                    <a:lstStyle/>
+                    <a:p>
+                      <a:pPr algn="ctr"/>
+                      <a:r>
+                        <a:rPr lang="en-US" sz="2400" dirty="0">
+                          <a:latin typeface="Courier New" panose="02070309020205020404" pitchFamily="49" charset="0"/>
+                          <a:cs typeface="Courier New" panose="02070309020205020404" pitchFamily="49" charset="0"/>
+                        </a:rPr>
+                        <a:t>55</a:t>
+                      </a:r>
+                    </a:p>
+                  </a:txBody>
+                  <a:tcPr anchor="ctr">
+                    <a:lnL w="12700" cap="flat" cmpd="sng" algn="ctr">
+                      <a:noFill/>
+                      <a:prstDash val="solid"/>
+                      <a:round/>
+                      <a:headEnd type="none" w="med" len="med"/>
+                      <a:tailEnd type="none" w="med" len="med"/>
+                    </a:lnL>
+                    <a:noFill/>
+                  </a:tcPr>
+                </a:tc>
+                <a:tc>
+                  <a:txBody>
+                    <a:bodyPr/>
+                    <a:lstStyle/>
+                    <a:p>
+                      <a:pPr algn="ctr"/>
+                      <a:r>
+                        <a:rPr lang="en-US" sz="2400" dirty="0">
+                          <a:latin typeface="Courier New" panose="02070309020205020404" pitchFamily="49" charset="0"/>
+                          <a:cs typeface="Courier New" panose="02070309020205020404" pitchFamily="49" charset="0"/>
+                        </a:rPr>
+                        <a:t>U</a:t>
+                      </a:r>
+                    </a:p>
+                  </a:txBody>
+                  <a:tcPr anchor="ctr">
+                    <a:lnR w="12700" cap="flat" cmpd="sng" algn="ctr">
+                      <a:noFill/>
+                      <a:prstDash val="solid"/>
+                      <a:round/>
+                      <a:headEnd type="none" w="med" len="med"/>
+                      <a:tailEnd type="none" w="med" len="med"/>
+                    </a:lnR>
+                    <a:noFill/>
+                  </a:tcPr>
+                </a:tc>
+                <a:extLst>
+                  <a:ext uri="{0D108BD9-81ED-4DB2-BD59-A6C34878D82A}">
+                    <a16:rowId xmlns:a16="http://schemas.microsoft.com/office/drawing/2014/main" val="3898739342"/>
+                  </a:ext>
+                </a:extLst>
+              </a:tr>
+              <a:tr h="384704">
+                <a:tc>
+                  <a:txBody>
+                    <a:bodyPr/>
+                    <a:lstStyle/>
+                    <a:p>
+                      <a:pPr algn="ctr"/>
+                      <a:r>
+                        <a:rPr lang="en-US" sz="2400" dirty="0">
+                          <a:latin typeface="Courier New" panose="02070309020205020404" pitchFamily="49" charset="0"/>
+                          <a:cs typeface="Courier New" panose="02070309020205020404" pitchFamily="49" charset="0"/>
+                        </a:rPr>
+                        <a:t>56</a:t>
+                      </a:r>
+                    </a:p>
+                  </a:txBody>
+                  <a:tcPr anchor="ctr">
+                    <a:lnL w="12700" cap="flat" cmpd="sng" algn="ctr">
+                      <a:noFill/>
+                      <a:prstDash val="solid"/>
+                      <a:round/>
+                      <a:headEnd type="none" w="med" len="med"/>
+                      <a:tailEnd type="none" w="med" len="med"/>
+                    </a:lnL>
+                    <a:noFill/>
+                  </a:tcPr>
+                </a:tc>
+                <a:tc>
+                  <a:txBody>
+                    <a:bodyPr/>
+                    <a:lstStyle/>
+                    <a:p>
+                      <a:pPr algn="ctr"/>
+                      <a:r>
+                        <a:rPr lang="en-US" sz="2400" dirty="0">
+                          <a:latin typeface="Courier New" panose="02070309020205020404" pitchFamily="49" charset="0"/>
+                          <a:cs typeface="Courier New" panose="02070309020205020404" pitchFamily="49" charset="0"/>
+                        </a:rPr>
+                        <a:t>V</a:t>
+                      </a:r>
+                    </a:p>
+                  </a:txBody>
+                  <a:tcPr anchor="ctr">
+                    <a:lnR w="12700" cap="flat" cmpd="sng" algn="ctr">
+                      <a:noFill/>
+                      <a:prstDash val="solid"/>
+                      <a:round/>
+                      <a:headEnd type="none" w="med" len="med"/>
+                      <a:tailEnd type="none" w="med" len="med"/>
+                    </a:lnR>
+                    <a:noFill/>
+                  </a:tcPr>
+                </a:tc>
+                <a:extLst>
+                  <a:ext uri="{0D108BD9-81ED-4DB2-BD59-A6C34878D82A}">
+                    <a16:rowId xmlns:a16="http://schemas.microsoft.com/office/drawing/2014/main" val="2516648206"/>
+                  </a:ext>
+                </a:extLst>
+              </a:tr>
+              <a:tr h="384704">
+                <a:tc>
+                  <a:txBody>
+                    <a:bodyPr/>
+                    <a:lstStyle/>
+                    <a:p>
+                      <a:pPr algn="ctr"/>
+                      <a:r>
+                        <a:rPr lang="en-US" sz="2400" dirty="0">
+                          <a:latin typeface="Courier New" panose="02070309020205020404" pitchFamily="49" charset="0"/>
+                          <a:cs typeface="Courier New" panose="02070309020205020404" pitchFamily="49" charset="0"/>
+                        </a:rPr>
+                        <a:t>57</a:t>
+                      </a:r>
+                    </a:p>
+                  </a:txBody>
+                  <a:tcPr anchor="ctr">
+                    <a:lnL w="12700" cap="flat" cmpd="sng" algn="ctr">
+                      <a:noFill/>
+                      <a:prstDash val="solid"/>
+                      <a:round/>
+                      <a:headEnd type="none" w="med" len="med"/>
+                      <a:tailEnd type="none" w="med" len="med"/>
+                    </a:lnL>
+                    <a:noFill/>
+                  </a:tcPr>
+                </a:tc>
+                <a:tc>
+                  <a:txBody>
+                    <a:bodyPr/>
+                    <a:lstStyle/>
+                    <a:p>
+                      <a:pPr algn="ctr"/>
+                      <a:r>
+                        <a:rPr lang="en-US" sz="2400" dirty="0">
+                          <a:latin typeface="Courier New" panose="02070309020205020404" pitchFamily="49" charset="0"/>
+                          <a:cs typeface="Courier New" panose="02070309020205020404" pitchFamily="49" charset="0"/>
+                        </a:rPr>
+                        <a:t>W</a:t>
+                      </a:r>
+                    </a:p>
+                  </a:txBody>
+                  <a:tcPr anchor="ctr">
+                    <a:lnR w="12700" cap="flat" cmpd="sng" algn="ctr">
+                      <a:noFill/>
+                      <a:prstDash val="solid"/>
+                      <a:round/>
+                      <a:headEnd type="none" w="med" len="med"/>
+                      <a:tailEnd type="none" w="med" len="med"/>
+                    </a:lnR>
+                    <a:noFill/>
+                  </a:tcPr>
+                </a:tc>
+                <a:extLst>
+                  <a:ext uri="{0D108BD9-81ED-4DB2-BD59-A6C34878D82A}">
+                    <a16:rowId xmlns:a16="http://schemas.microsoft.com/office/drawing/2014/main" val="3480683499"/>
+                  </a:ext>
+                </a:extLst>
+              </a:tr>
+              <a:tr h="384704">
+                <a:tc>
+                  <a:txBody>
+                    <a:bodyPr/>
+                    <a:lstStyle/>
+                    <a:p>
+                      <a:pPr algn="ctr"/>
+                      <a:r>
+                        <a:rPr lang="en-US" sz="2400" dirty="0">
+                          <a:latin typeface="Courier New" panose="02070309020205020404" pitchFamily="49" charset="0"/>
+                          <a:cs typeface="Courier New" panose="02070309020205020404" pitchFamily="49" charset="0"/>
+                        </a:rPr>
+                        <a:t>58</a:t>
+                      </a:r>
+                    </a:p>
+                  </a:txBody>
+                  <a:tcPr anchor="ctr">
+                    <a:lnL w="12700" cap="flat" cmpd="sng" algn="ctr">
+                      <a:noFill/>
+                      <a:prstDash val="solid"/>
+                      <a:round/>
+                      <a:headEnd type="none" w="med" len="med"/>
+                      <a:tailEnd type="none" w="med" len="med"/>
+                    </a:lnL>
+                    <a:noFill/>
+                  </a:tcPr>
+                </a:tc>
+                <a:tc>
+                  <a:txBody>
+                    <a:bodyPr/>
+                    <a:lstStyle/>
+                    <a:p>
+                      <a:pPr algn="ctr"/>
+                      <a:r>
+                        <a:rPr lang="en-US" sz="2400" dirty="0">
+                          <a:latin typeface="Courier New" panose="02070309020205020404" pitchFamily="49" charset="0"/>
+                          <a:cs typeface="Courier New" panose="02070309020205020404" pitchFamily="49" charset="0"/>
+                        </a:rPr>
+                        <a:t>X</a:t>
+                      </a:r>
+                    </a:p>
+                  </a:txBody>
+                  <a:tcPr anchor="ctr">
+                    <a:lnR w="12700" cap="flat" cmpd="sng" algn="ctr">
+                      <a:noFill/>
+                      <a:prstDash val="solid"/>
+                      <a:round/>
+                      <a:headEnd type="none" w="med" len="med"/>
+                      <a:tailEnd type="none" w="med" len="med"/>
+                    </a:lnR>
+                    <a:noFill/>
+                  </a:tcPr>
+                </a:tc>
+                <a:extLst>
+                  <a:ext uri="{0D108BD9-81ED-4DB2-BD59-A6C34878D82A}">
+                    <a16:rowId xmlns:a16="http://schemas.microsoft.com/office/drawing/2014/main" val="945269057"/>
+                  </a:ext>
+                </a:extLst>
+              </a:tr>
+              <a:tr h="384704">
+                <a:tc>
+                  <a:txBody>
+                    <a:bodyPr/>
+                    <a:lstStyle/>
+                    <a:p>
+                      <a:pPr algn="ctr"/>
+                      <a:r>
+                        <a:rPr lang="en-US" sz="2400" dirty="0">
+                          <a:latin typeface="Courier New" panose="02070309020205020404" pitchFamily="49" charset="0"/>
+                          <a:cs typeface="Courier New" panose="02070309020205020404" pitchFamily="49" charset="0"/>
+                        </a:rPr>
+                        <a:t>59</a:t>
+                      </a:r>
+                    </a:p>
+                  </a:txBody>
+                  <a:tcPr anchor="ctr">
+                    <a:lnL w="12700" cap="flat" cmpd="sng" algn="ctr">
+                      <a:noFill/>
+                      <a:prstDash val="solid"/>
+                      <a:round/>
+                      <a:headEnd type="none" w="med" len="med"/>
+                      <a:tailEnd type="none" w="med" len="med"/>
+                    </a:lnL>
+                    <a:noFill/>
+                  </a:tcPr>
+                </a:tc>
+                <a:tc>
+                  <a:txBody>
+                    <a:bodyPr/>
+                    <a:lstStyle/>
+                    <a:p>
+                      <a:pPr algn="ctr"/>
+                      <a:r>
+                        <a:rPr lang="en-US" sz="2400" dirty="0">
+                          <a:latin typeface="Courier New" panose="02070309020205020404" pitchFamily="49" charset="0"/>
+                          <a:cs typeface="Courier New" panose="02070309020205020404" pitchFamily="49" charset="0"/>
+                        </a:rPr>
+                        <a:t>Y</a:t>
+                      </a:r>
+                    </a:p>
+                  </a:txBody>
+                  <a:tcPr anchor="ctr">
+                    <a:lnR w="12700" cap="flat" cmpd="sng" algn="ctr">
+                      <a:noFill/>
+                      <a:prstDash val="solid"/>
+                      <a:round/>
+                      <a:headEnd type="none" w="med" len="med"/>
+                      <a:tailEnd type="none" w="med" len="med"/>
+                    </a:lnR>
+                    <a:noFill/>
+                  </a:tcPr>
+                </a:tc>
+                <a:extLst>
+                  <a:ext uri="{0D108BD9-81ED-4DB2-BD59-A6C34878D82A}">
+                    <a16:rowId xmlns:a16="http://schemas.microsoft.com/office/drawing/2014/main" val="897014544"/>
+                  </a:ext>
+                </a:extLst>
+              </a:tr>
+              <a:tr h="384704">
+                <a:tc>
+                  <a:txBody>
+                    <a:bodyPr/>
+                    <a:lstStyle/>
+                    <a:p>
+                      <a:pPr algn="ctr"/>
+                      <a:r>
+                        <a:rPr lang="en-US" sz="2400" dirty="0">
+                          <a:latin typeface="Courier New" panose="02070309020205020404" pitchFamily="49" charset="0"/>
+                          <a:cs typeface="Courier New" panose="02070309020205020404" pitchFamily="49" charset="0"/>
+                        </a:rPr>
+                        <a:t>60</a:t>
+                      </a:r>
+                    </a:p>
+                  </a:txBody>
+                  <a:tcPr anchor="ctr">
+                    <a:lnL w="12700" cap="flat" cmpd="sng" algn="ctr">
+                      <a:noFill/>
+                      <a:prstDash val="solid"/>
+                      <a:round/>
+                      <a:headEnd type="none" w="med" len="med"/>
+                      <a:tailEnd type="none" w="med" len="med"/>
+                    </a:lnL>
+                    <a:lnB w="12700" cap="flat" cmpd="sng" algn="ctr">
+                      <a:noFill/>
+                      <a:prstDash val="solid"/>
+                      <a:round/>
+                      <a:headEnd type="none" w="med" len="med"/>
+                      <a:tailEnd type="none" w="med" len="med"/>
+                    </a:lnB>
+                    <a:noFill/>
+                  </a:tcPr>
+                </a:tc>
+                <a:tc>
+                  <a:txBody>
+                    <a:bodyPr/>
+                    <a:lstStyle/>
+                    <a:p>
+                      <a:pPr algn="ctr"/>
+                      <a:r>
+                        <a:rPr lang="en-US" sz="2400" dirty="0">
+                          <a:latin typeface="Courier New" panose="02070309020205020404" pitchFamily="49" charset="0"/>
+                          <a:cs typeface="Courier New" panose="02070309020205020404" pitchFamily="49" charset="0"/>
+                        </a:rPr>
+                        <a:t>Z</a:t>
+                      </a:r>
+                    </a:p>
+                  </a:txBody>
+                  <a:tcPr anchor="ctr">
+                    <a:lnR w="12700" cap="flat" cmpd="sng" algn="ctr">
+                      <a:noFill/>
+                      <a:prstDash val="solid"/>
+                      <a:round/>
+                      <a:headEnd type="none" w="med" len="med"/>
+                      <a:tailEnd type="none" w="med" len="med"/>
+                    </a:lnR>
+                    <a:lnB w="12700" cap="flat" cmpd="sng" algn="ctr">
+                      <a:noFill/>
+                      <a:prstDash val="solid"/>
+                      <a:round/>
+                      <a:headEnd type="none" w="med" len="med"/>
+                      <a:tailEnd type="none" w="med" len="med"/>
+                    </a:lnB>
+                    <a:noFill/>
+                  </a:tcPr>
+                </a:tc>
+                <a:extLst>
+                  <a:ext uri="{0D108BD9-81ED-4DB2-BD59-A6C34878D82A}">
+                    <a16:rowId xmlns:a16="http://schemas.microsoft.com/office/drawing/2014/main" val="3648943626"/>
+                  </a:ext>
+                </a:extLst>
+              </a:tr>
+            </a:tbl>
+          </a:graphicData>
+        </a:graphic>
+      </p:graphicFrame>
+      <p:cxnSp>
+        <p:nvCxnSpPr>
+          <p:cNvPr id="6" name="Straight Connector 5">
+            <a:extLst>
+              <a:ext uri="{FF2B5EF4-FFF2-40B4-BE49-F238E27FC236}">
+                <a16:creationId xmlns:a16="http://schemas.microsoft.com/office/drawing/2014/main" id="{37FDEEEB-95DD-0DC8-40D8-8983816F32A6}"/>
+              </a:ext>
+            </a:extLst>
+          </p:cNvPr>
+          <p:cNvCxnSpPr/>
+          <p:nvPr/>
+        </p:nvCxnSpPr>
+        <p:spPr>
+          <a:xfrm>
+            <a:off x="2749973" y="873760"/>
+            <a:ext cx="0" cy="5466080"/>
+          </a:xfrm>
+          <a:prstGeom prst="line">
+            <a:avLst/>
+          </a:prstGeom>
+        </p:spPr>
+        <p:style>
+          <a:lnRef idx="2">
+            <a:schemeClr val="dk1"/>
+          </a:lnRef>
+          <a:fillRef idx="0">
+            <a:schemeClr val="dk1"/>
+          </a:fillRef>
+          <a:effectRef idx="1">
+            <a:schemeClr val="dk1"/>
+          </a:effectRef>
+          <a:fontRef idx="minor">
+            <a:schemeClr val="tx1"/>
+          </a:fontRef>
+        </p:style>
+      </p:cxnSp>
+      <p:sp>
+        <p:nvSpPr>
+          <p:cNvPr id="7" name="TextBox 6">
+            <a:extLst>
+              <a:ext uri="{FF2B5EF4-FFF2-40B4-BE49-F238E27FC236}">
+                <a16:creationId xmlns:a16="http://schemas.microsoft.com/office/drawing/2014/main" id="{B478B294-F4E7-2E37-34C6-3C75E11E21D1}"/>
+              </a:ext>
+            </a:extLst>
+          </p:cNvPr>
+          <p:cNvSpPr txBox="1"/>
+          <p:nvPr/>
+        </p:nvSpPr>
+        <p:spPr>
+          <a:xfrm rot="16200000">
+            <a:off x="3519192" y="3290500"/>
+            <a:ext cx="2633226" cy="276999"/>
+          </a:xfrm>
+          <a:prstGeom prst="rect">
+            <a:avLst/>
+          </a:prstGeom>
+          <a:noFill/>
+        </p:spPr>
+        <p:txBody>
+          <a:bodyPr wrap="square" rtlCol="0">
+            <a:spAutoFit/>
+          </a:bodyPr>
+          <a:lstStyle/>
+          <a:p>
+            <a:r>
+              <a:rPr lang="en-US" sz="1200" dirty="0">
+                <a:latin typeface="Courier New" panose="02070309020205020404" pitchFamily="49" charset="0"/>
+                <a:cs typeface="Courier New" panose="02070309020205020404" pitchFamily="49" charset="0"/>
+              </a:rPr>
+              <a:t>Character Encoding: ASCII</a:t>
+            </a:r>
+          </a:p>
+        </p:txBody>
+      </p:sp>
+      <p:graphicFrame>
+        <p:nvGraphicFramePr>
+          <p:cNvPr id="8" name="Table 7">
+            <a:extLst>
+              <a:ext uri="{FF2B5EF4-FFF2-40B4-BE49-F238E27FC236}">
+                <a16:creationId xmlns:a16="http://schemas.microsoft.com/office/drawing/2014/main" id="{40CBD09B-8108-6A04-9625-FE91D6BBCFFA}"/>
+              </a:ext>
+            </a:extLst>
+          </p:cNvPr>
+          <p:cNvGraphicFramePr>
+            <a:graphicFrameLocks noGrp="1"/>
+          </p:cNvGraphicFramePr>
+          <p:nvPr>
+            <p:extLst>
+              <p:ext uri="{D42A27DB-BD31-4B8C-83A1-F6EECF244321}">
+                <p14:modId xmlns:p14="http://schemas.microsoft.com/office/powerpoint/2010/main" val="309970851"/>
+              </p:ext>
+            </p:extLst>
+          </p:nvPr>
+        </p:nvGraphicFramePr>
+        <p:xfrm>
+          <a:off x="6751956" y="264848"/>
+          <a:ext cx="1790277" cy="6328304"/>
+        </p:xfrm>
+        <a:graphic>
+          <a:graphicData uri="http://schemas.openxmlformats.org/drawingml/2006/table">
+            <a:tbl>
+              <a:tblPr firstRow="1" bandRow="1">
+                <a:tableStyleId>{616DA210-FB5B-4158-B5E0-FEB733F419BA}</a:tableStyleId>
+              </a:tblPr>
+              <a:tblGrid>
+                <a:gridCol w="875247">
+                  <a:extLst>
+                    <a:ext uri="{9D8B030D-6E8A-4147-A177-3AD203B41FA5}">
+                      <a16:colId xmlns:a16="http://schemas.microsoft.com/office/drawing/2014/main" val="2279448199"/>
+                    </a:ext>
+                  </a:extLst>
+                </a:gridCol>
+                <a:gridCol w="915030">
+                  <a:extLst>
+                    <a:ext uri="{9D8B030D-6E8A-4147-A177-3AD203B41FA5}">
+                      <a16:colId xmlns:a16="http://schemas.microsoft.com/office/drawing/2014/main" val="3943847458"/>
+                    </a:ext>
+                  </a:extLst>
+                </a:gridCol>
+              </a:tblGrid>
+              <a:tr h="384704">
+                <a:tc>
+                  <a:txBody>
+                    <a:bodyPr/>
+                    <a:lstStyle/>
+                    <a:p>
+                      <a:pPr algn="ctr"/>
+                      <a:r>
+                        <a:rPr lang="en-US" sz="1400" b="0" dirty="0">
+                          <a:latin typeface="Courier New" panose="02070309020205020404" pitchFamily="49" charset="0"/>
+                          <a:cs typeface="Courier New" panose="02070309020205020404" pitchFamily="49" charset="0"/>
+                        </a:rPr>
+                        <a:t>HEX</a:t>
+                      </a:r>
+                    </a:p>
+                  </a:txBody>
+                  <a:tcPr anchor="ctr">
+                    <a:lnL w="12700" cap="flat" cmpd="sng" algn="ctr">
+                      <a:noFill/>
+                      <a:prstDash val="solid"/>
+                      <a:round/>
+                      <a:headEnd type="none" w="med" len="med"/>
+                      <a:tailEnd type="none" w="med" len="med"/>
+                    </a:lnL>
+                    <a:lnT w="12700" cap="flat" cmpd="sng" algn="ctr">
+                      <a:noFill/>
+                      <a:prstDash val="solid"/>
+                      <a:round/>
+                      <a:headEnd type="none" w="med" len="med"/>
+                      <a:tailEnd type="none" w="med" len="med"/>
+                    </a:lnT>
+                    <a:noFill/>
+                  </a:tcPr>
+                </a:tc>
+                <a:tc>
+                  <a:txBody>
+                    <a:bodyPr/>
+                    <a:lstStyle/>
+                    <a:p>
+                      <a:pPr algn="ctr"/>
+                      <a:r>
+                        <a:rPr lang="en-US" sz="1400" b="0" dirty="0">
+                          <a:latin typeface="Courier New" panose="02070309020205020404" pitchFamily="49" charset="0"/>
+                          <a:cs typeface="Courier New" panose="02070309020205020404" pitchFamily="49" charset="0"/>
+                        </a:rPr>
+                        <a:t>LETTER</a:t>
+                      </a:r>
+                    </a:p>
+                  </a:txBody>
+                  <a:tcPr anchor="ctr">
+                    <a:lnR w="12700" cap="flat" cmpd="sng" algn="ctr">
+                      <a:noFill/>
+                      <a:prstDash val="solid"/>
+                      <a:round/>
+                      <a:headEnd type="none" w="med" len="med"/>
+                      <a:tailEnd type="none" w="med" len="med"/>
+                    </a:lnR>
+                    <a:lnT w="12700" cap="flat" cmpd="sng" algn="ctr">
+                      <a:noFill/>
+                      <a:prstDash val="solid"/>
+                      <a:round/>
+                      <a:headEnd type="none" w="med" len="med"/>
+                      <a:tailEnd type="none" w="med" len="med"/>
+                    </a:lnT>
+                    <a:noFill/>
+                  </a:tcPr>
+                </a:tc>
+                <a:extLst>
+                  <a:ext uri="{0D108BD9-81ED-4DB2-BD59-A6C34878D82A}">
+                    <a16:rowId xmlns:a16="http://schemas.microsoft.com/office/drawing/2014/main" val="577741590"/>
+                  </a:ext>
+                </a:extLst>
+              </a:tr>
+              <a:tr h="384704">
+                <a:tc>
+                  <a:txBody>
+                    <a:bodyPr/>
+                    <a:lstStyle/>
+                    <a:p>
+                      <a:pPr algn="ctr"/>
+                      <a:r>
+                        <a:rPr lang="en-US" sz="2400" dirty="0">
+                          <a:latin typeface="Courier New" panose="02070309020205020404" pitchFamily="49" charset="0"/>
+                          <a:cs typeface="Courier New" panose="02070309020205020404" pitchFamily="49" charset="0"/>
+                        </a:rPr>
+                        <a:t>41</a:t>
+                      </a:r>
+                    </a:p>
+                  </a:txBody>
+                  <a:tcPr anchor="ctr">
+                    <a:lnL w="12700" cap="flat" cmpd="sng" algn="ctr">
+                      <a:noFill/>
+                      <a:prstDash val="solid"/>
+                      <a:round/>
+                      <a:headEnd type="none" w="med" len="med"/>
+                      <a:tailEnd type="none" w="med" len="med"/>
+                    </a:lnL>
+                    <a:noFill/>
+                  </a:tcPr>
+                </a:tc>
+                <a:tc>
+                  <a:txBody>
+                    <a:bodyPr/>
+                    <a:lstStyle/>
+                    <a:p>
+                      <a:pPr algn="ctr"/>
+                      <a:r>
+                        <a:rPr lang="en-US" sz="2400" dirty="0">
+                          <a:latin typeface="Courier New" panose="02070309020205020404" pitchFamily="49" charset="0"/>
+                          <a:cs typeface="Courier New" panose="02070309020205020404" pitchFamily="49" charset="0"/>
+                        </a:rPr>
+                        <a:t>A</a:t>
+                      </a:r>
+                    </a:p>
+                  </a:txBody>
+                  <a:tcPr anchor="ctr">
+                    <a:lnR w="12700" cap="flat" cmpd="sng" algn="ctr">
+                      <a:noFill/>
+                      <a:prstDash val="solid"/>
+                      <a:round/>
+                      <a:headEnd type="none" w="med" len="med"/>
+                      <a:tailEnd type="none" w="med" len="med"/>
+                    </a:lnR>
+                    <a:noFill/>
+                  </a:tcPr>
+                </a:tc>
+                <a:extLst>
+                  <a:ext uri="{0D108BD9-81ED-4DB2-BD59-A6C34878D82A}">
+                    <a16:rowId xmlns:a16="http://schemas.microsoft.com/office/drawing/2014/main" val="1574702707"/>
+                  </a:ext>
+                </a:extLst>
+              </a:tr>
+              <a:tr h="384704">
+                <a:tc>
+                  <a:txBody>
+                    <a:bodyPr/>
+                    <a:lstStyle/>
+                    <a:p>
+                      <a:pPr algn="ctr"/>
+                      <a:r>
+                        <a:rPr lang="en-US" sz="2400" dirty="0">
+                          <a:latin typeface="Courier New" panose="02070309020205020404" pitchFamily="49" charset="0"/>
+                          <a:cs typeface="Courier New" panose="02070309020205020404" pitchFamily="49" charset="0"/>
+                        </a:rPr>
+                        <a:t>42</a:t>
+                      </a:r>
+                    </a:p>
+                  </a:txBody>
+                  <a:tcPr anchor="ctr">
+                    <a:lnL w="12700" cap="flat" cmpd="sng" algn="ctr">
+                      <a:noFill/>
+                      <a:prstDash val="solid"/>
+                      <a:round/>
+                      <a:headEnd type="none" w="med" len="med"/>
+                      <a:tailEnd type="none" w="med" len="med"/>
+                    </a:lnL>
+                    <a:noFill/>
+                  </a:tcPr>
+                </a:tc>
+                <a:tc>
+                  <a:txBody>
+                    <a:bodyPr/>
+                    <a:lstStyle/>
+                    <a:p>
+                      <a:pPr algn="ctr"/>
+                      <a:r>
+                        <a:rPr lang="en-US" sz="2400" dirty="0">
+                          <a:latin typeface="Courier New" panose="02070309020205020404" pitchFamily="49" charset="0"/>
+                          <a:cs typeface="Courier New" panose="02070309020205020404" pitchFamily="49" charset="0"/>
+                        </a:rPr>
+                        <a:t>B</a:t>
+                      </a:r>
+                    </a:p>
+                  </a:txBody>
+                  <a:tcPr anchor="ctr">
+                    <a:lnR w="12700" cap="flat" cmpd="sng" algn="ctr">
+                      <a:noFill/>
+                      <a:prstDash val="solid"/>
+                      <a:round/>
+                      <a:headEnd type="none" w="med" len="med"/>
+                      <a:tailEnd type="none" w="med" len="med"/>
+                    </a:lnR>
+                    <a:noFill/>
+                  </a:tcPr>
+                </a:tc>
+                <a:extLst>
+                  <a:ext uri="{0D108BD9-81ED-4DB2-BD59-A6C34878D82A}">
+                    <a16:rowId xmlns:a16="http://schemas.microsoft.com/office/drawing/2014/main" val="1034101600"/>
+                  </a:ext>
+                </a:extLst>
+              </a:tr>
+              <a:tr h="384704">
+                <a:tc>
+                  <a:txBody>
+                    <a:bodyPr/>
+                    <a:lstStyle/>
+                    <a:p>
+                      <a:pPr algn="ctr"/>
+                      <a:r>
+                        <a:rPr lang="en-US" sz="2400" dirty="0">
+                          <a:latin typeface="Courier New" panose="02070309020205020404" pitchFamily="49" charset="0"/>
+                          <a:cs typeface="Courier New" panose="02070309020205020404" pitchFamily="49" charset="0"/>
+                        </a:rPr>
+                        <a:t>43</a:t>
+                      </a:r>
+                    </a:p>
+                  </a:txBody>
+                  <a:tcPr anchor="ctr">
+                    <a:lnL w="12700" cap="flat" cmpd="sng" algn="ctr">
+                      <a:noFill/>
+                      <a:prstDash val="solid"/>
+                      <a:round/>
+                      <a:headEnd type="none" w="med" len="med"/>
+                      <a:tailEnd type="none" w="med" len="med"/>
+                    </a:lnL>
+                    <a:noFill/>
+                  </a:tcPr>
+                </a:tc>
+                <a:tc>
+                  <a:txBody>
+                    <a:bodyPr/>
+                    <a:lstStyle/>
+                    <a:p>
+                      <a:pPr algn="ctr"/>
+                      <a:r>
+                        <a:rPr lang="en-US" sz="2400" dirty="0">
+                          <a:latin typeface="Courier New" panose="02070309020205020404" pitchFamily="49" charset="0"/>
+                          <a:cs typeface="Courier New" panose="02070309020205020404" pitchFamily="49" charset="0"/>
+                        </a:rPr>
+                        <a:t>C</a:t>
+                      </a:r>
+                    </a:p>
+                  </a:txBody>
+                  <a:tcPr anchor="ctr">
+                    <a:lnR w="12700" cap="flat" cmpd="sng" algn="ctr">
+                      <a:noFill/>
+                      <a:prstDash val="solid"/>
+                      <a:round/>
+                      <a:headEnd type="none" w="med" len="med"/>
+                      <a:tailEnd type="none" w="med" len="med"/>
+                    </a:lnR>
+                    <a:noFill/>
+                  </a:tcPr>
+                </a:tc>
+                <a:extLst>
+                  <a:ext uri="{0D108BD9-81ED-4DB2-BD59-A6C34878D82A}">
+                    <a16:rowId xmlns:a16="http://schemas.microsoft.com/office/drawing/2014/main" val="3721495223"/>
+                  </a:ext>
+                </a:extLst>
+              </a:tr>
+              <a:tr h="384704">
+                <a:tc>
+                  <a:txBody>
+                    <a:bodyPr/>
+                    <a:lstStyle/>
+                    <a:p>
+                      <a:pPr algn="ctr"/>
+                      <a:r>
+                        <a:rPr lang="en-US" sz="2400" dirty="0">
+                          <a:latin typeface="Courier New" panose="02070309020205020404" pitchFamily="49" charset="0"/>
+                          <a:cs typeface="Courier New" panose="02070309020205020404" pitchFamily="49" charset="0"/>
+                        </a:rPr>
+                        <a:t>44</a:t>
+                      </a:r>
+                    </a:p>
+                  </a:txBody>
+                  <a:tcPr anchor="ctr">
+                    <a:lnL w="12700" cap="flat" cmpd="sng" algn="ctr">
+                      <a:noFill/>
+                      <a:prstDash val="solid"/>
+                      <a:round/>
+                      <a:headEnd type="none" w="med" len="med"/>
+                      <a:tailEnd type="none" w="med" len="med"/>
+                    </a:lnL>
+                    <a:noFill/>
+                  </a:tcPr>
+                </a:tc>
+                <a:tc>
+                  <a:txBody>
+                    <a:bodyPr/>
+                    <a:lstStyle/>
+                    <a:p>
+                      <a:pPr algn="ctr"/>
+                      <a:r>
+                        <a:rPr lang="en-US" sz="2400" dirty="0">
+                          <a:latin typeface="Courier New" panose="02070309020205020404" pitchFamily="49" charset="0"/>
+                          <a:cs typeface="Courier New" panose="02070309020205020404" pitchFamily="49" charset="0"/>
+                        </a:rPr>
+                        <a:t>D</a:t>
+                      </a:r>
+                    </a:p>
+                  </a:txBody>
+                  <a:tcPr anchor="ctr">
+                    <a:lnR w="12700" cap="flat" cmpd="sng" algn="ctr">
+                      <a:noFill/>
+                      <a:prstDash val="solid"/>
+                      <a:round/>
+                      <a:headEnd type="none" w="med" len="med"/>
+                      <a:tailEnd type="none" w="med" len="med"/>
+                    </a:lnR>
+                    <a:noFill/>
+                  </a:tcPr>
+                </a:tc>
+                <a:extLst>
+                  <a:ext uri="{0D108BD9-81ED-4DB2-BD59-A6C34878D82A}">
+                    <a16:rowId xmlns:a16="http://schemas.microsoft.com/office/drawing/2014/main" val="2888288013"/>
+                  </a:ext>
+                </a:extLst>
+              </a:tr>
+              <a:tr h="384704">
+                <a:tc>
+                  <a:txBody>
+                    <a:bodyPr/>
+                    <a:lstStyle/>
+                    <a:p>
+                      <a:pPr algn="ctr"/>
+                      <a:r>
+                        <a:rPr lang="en-US" sz="2400" dirty="0">
+                          <a:latin typeface="Courier New" panose="02070309020205020404" pitchFamily="49" charset="0"/>
+                          <a:cs typeface="Courier New" panose="02070309020205020404" pitchFamily="49" charset="0"/>
+                        </a:rPr>
+                        <a:t>45</a:t>
+                      </a:r>
+                    </a:p>
+                  </a:txBody>
+                  <a:tcPr anchor="ctr">
+                    <a:lnL w="12700" cap="flat" cmpd="sng" algn="ctr">
+                      <a:noFill/>
+                      <a:prstDash val="solid"/>
+                      <a:round/>
+                      <a:headEnd type="none" w="med" len="med"/>
+                      <a:tailEnd type="none" w="med" len="med"/>
+                    </a:lnL>
+                    <a:noFill/>
+                  </a:tcPr>
+                </a:tc>
+                <a:tc>
+                  <a:txBody>
+                    <a:bodyPr/>
+                    <a:lstStyle/>
+                    <a:p>
+                      <a:pPr algn="ctr"/>
+                      <a:r>
+                        <a:rPr lang="en-US" sz="2400" dirty="0">
+                          <a:latin typeface="Courier New" panose="02070309020205020404" pitchFamily="49" charset="0"/>
+                          <a:cs typeface="Courier New" panose="02070309020205020404" pitchFamily="49" charset="0"/>
+                        </a:rPr>
+                        <a:t>E</a:t>
+                      </a:r>
+                    </a:p>
+                  </a:txBody>
+                  <a:tcPr anchor="ctr">
+                    <a:lnR w="12700" cap="flat" cmpd="sng" algn="ctr">
+                      <a:noFill/>
+                      <a:prstDash val="solid"/>
+                      <a:round/>
+                      <a:headEnd type="none" w="med" len="med"/>
+                      <a:tailEnd type="none" w="med" len="med"/>
+                    </a:lnR>
+                    <a:noFill/>
+                  </a:tcPr>
+                </a:tc>
+                <a:extLst>
+                  <a:ext uri="{0D108BD9-81ED-4DB2-BD59-A6C34878D82A}">
+                    <a16:rowId xmlns:a16="http://schemas.microsoft.com/office/drawing/2014/main" val="350298265"/>
+                  </a:ext>
+                </a:extLst>
+              </a:tr>
+              <a:tr h="384704">
+                <a:tc>
+                  <a:txBody>
+                    <a:bodyPr/>
+                    <a:lstStyle/>
+                    <a:p>
+                      <a:pPr algn="ctr"/>
+                      <a:r>
+                        <a:rPr lang="en-US" sz="2400" dirty="0">
+                          <a:latin typeface="Courier New" panose="02070309020205020404" pitchFamily="49" charset="0"/>
+                          <a:cs typeface="Courier New" panose="02070309020205020404" pitchFamily="49" charset="0"/>
+                        </a:rPr>
+                        <a:t>46</a:t>
+                      </a:r>
+                    </a:p>
+                  </a:txBody>
+                  <a:tcPr anchor="ctr">
+                    <a:lnL w="12700" cap="flat" cmpd="sng" algn="ctr">
+                      <a:noFill/>
+                      <a:prstDash val="solid"/>
+                      <a:round/>
+                      <a:headEnd type="none" w="med" len="med"/>
+                      <a:tailEnd type="none" w="med" len="med"/>
+                    </a:lnL>
+                    <a:noFill/>
+                  </a:tcPr>
+                </a:tc>
+                <a:tc>
+                  <a:txBody>
+                    <a:bodyPr/>
+                    <a:lstStyle/>
+                    <a:p>
+                      <a:pPr algn="ctr"/>
+                      <a:r>
+                        <a:rPr lang="en-US" sz="2400" dirty="0">
+                          <a:latin typeface="Courier New" panose="02070309020205020404" pitchFamily="49" charset="0"/>
+                          <a:cs typeface="Courier New" panose="02070309020205020404" pitchFamily="49" charset="0"/>
+                        </a:rPr>
+                        <a:t>F</a:t>
+                      </a:r>
+                    </a:p>
+                  </a:txBody>
+                  <a:tcPr anchor="ctr">
+                    <a:lnR w="12700" cap="flat" cmpd="sng" algn="ctr">
+                      <a:noFill/>
+                      <a:prstDash val="solid"/>
+                      <a:round/>
+                      <a:headEnd type="none" w="med" len="med"/>
+                      <a:tailEnd type="none" w="med" len="med"/>
+                    </a:lnR>
+                    <a:noFill/>
+                  </a:tcPr>
+                </a:tc>
+                <a:extLst>
+                  <a:ext uri="{0D108BD9-81ED-4DB2-BD59-A6C34878D82A}">
+                    <a16:rowId xmlns:a16="http://schemas.microsoft.com/office/drawing/2014/main" val="2842985489"/>
+                  </a:ext>
+                </a:extLst>
+              </a:tr>
+              <a:tr h="384704">
+                <a:tc>
+                  <a:txBody>
+                    <a:bodyPr/>
+                    <a:lstStyle/>
+                    <a:p>
+                      <a:pPr algn="ctr"/>
+                      <a:r>
+                        <a:rPr lang="en-US" sz="2400" dirty="0">
+                          <a:latin typeface="Courier New" panose="02070309020205020404" pitchFamily="49" charset="0"/>
+                          <a:cs typeface="Courier New" panose="02070309020205020404" pitchFamily="49" charset="0"/>
+                        </a:rPr>
+                        <a:t>47</a:t>
+                      </a:r>
+                    </a:p>
+                  </a:txBody>
+                  <a:tcPr anchor="ctr">
+                    <a:lnL w="12700" cap="flat" cmpd="sng" algn="ctr">
+                      <a:noFill/>
+                      <a:prstDash val="solid"/>
+                      <a:round/>
+                      <a:headEnd type="none" w="med" len="med"/>
+                      <a:tailEnd type="none" w="med" len="med"/>
+                    </a:lnL>
+                    <a:noFill/>
+                  </a:tcPr>
+                </a:tc>
+                <a:tc>
+                  <a:txBody>
+                    <a:bodyPr/>
+                    <a:lstStyle/>
+                    <a:p>
+                      <a:pPr algn="ctr"/>
+                      <a:r>
+                        <a:rPr lang="en-US" sz="2400" dirty="0">
+                          <a:latin typeface="Courier New" panose="02070309020205020404" pitchFamily="49" charset="0"/>
+                          <a:cs typeface="Courier New" panose="02070309020205020404" pitchFamily="49" charset="0"/>
+                        </a:rPr>
+                        <a:t>G</a:t>
+                      </a:r>
+                    </a:p>
+                  </a:txBody>
+                  <a:tcPr anchor="ctr">
+                    <a:lnR w="12700" cap="flat" cmpd="sng" algn="ctr">
+                      <a:noFill/>
+                      <a:prstDash val="solid"/>
+                      <a:round/>
+                      <a:headEnd type="none" w="med" len="med"/>
+                      <a:tailEnd type="none" w="med" len="med"/>
+                    </a:lnR>
+                    <a:noFill/>
+                  </a:tcPr>
+                </a:tc>
+                <a:extLst>
+                  <a:ext uri="{0D108BD9-81ED-4DB2-BD59-A6C34878D82A}">
+                    <a16:rowId xmlns:a16="http://schemas.microsoft.com/office/drawing/2014/main" val="2585885942"/>
+                  </a:ext>
+                </a:extLst>
+              </a:tr>
+              <a:tr h="384704">
+                <a:tc>
+                  <a:txBody>
+                    <a:bodyPr/>
+                    <a:lstStyle/>
+                    <a:p>
+                      <a:pPr algn="ctr"/>
+                      <a:r>
+                        <a:rPr lang="en-US" sz="2400" dirty="0">
+                          <a:latin typeface="Courier New" panose="02070309020205020404" pitchFamily="49" charset="0"/>
+                          <a:cs typeface="Courier New" panose="02070309020205020404" pitchFamily="49" charset="0"/>
+                        </a:rPr>
+                        <a:t>48</a:t>
+                      </a:r>
+                    </a:p>
+                  </a:txBody>
+                  <a:tcPr anchor="ctr">
+                    <a:lnL w="12700" cap="flat" cmpd="sng" algn="ctr">
+                      <a:noFill/>
+                      <a:prstDash val="solid"/>
+                      <a:round/>
+                      <a:headEnd type="none" w="med" len="med"/>
+                      <a:tailEnd type="none" w="med" len="med"/>
+                    </a:lnL>
+                    <a:noFill/>
+                  </a:tcPr>
+                </a:tc>
+                <a:tc>
+                  <a:txBody>
+                    <a:bodyPr/>
+                    <a:lstStyle/>
+                    <a:p>
+                      <a:pPr algn="ctr"/>
+                      <a:r>
+                        <a:rPr lang="en-US" sz="2400" dirty="0">
+                          <a:latin typeface="Courier New" panose="02070309020205020404" pitchFamily="49" charset="0"/>
+                          <a:cs typeface="Courier New" panose="02070309020205020404" pitchFamily="49" charset="0"/>
+                        </a:rPr>
+                        <a:t>H</a:t>
+                      </a:r>
+                    </a:p>
+                  </a:txBody>
+                  <a:tcPr anchor="ctr">
+                    <a:lnR w="12700" cap="flat" cmpd="sng" algn="ctr">
+                      <a:noFill/>
+                      <a:prstDash val="solid"/>
+                      <a:round/>
+                      <a:headEnd type="none" w="med" len="med"/>
+                      <a:tailEnd type="none" w="med" len="med"/>
+                    </a:lnR>
+                    <a:noFill/>
+                  </a:tcPr>
+                </a:tc>
+                <a:extLst>
+                  <a:ext uri="{0D108BD9-81ED-4DB2-BD59-A6C34878D82A}">
+                    <a16:rowId xmlns:a16="http://schemas.microsoft.com/office/drawing/2014/main" val="3898739342"/>
+                  </a:ext>
+                </a:extLst>
+              </a:tr>
+              <a:tr h="384704">
+                <a:tc>
+                  <a:txBody>
+                    <a:bodyPr/>
+                    <a:lstStyle/>
+                    <a:p>
+                      <a:pPr algn="ctr"/>
+                      <a:r>
+                        <a:rPr lang="en-US" sz="2400" dirty="0">
+                          <a:latin typeface="Courier New" panose="02070309020205020404" pitchFamily="49" charset="0"/>
+                          <a:cs typeface="Courier New" panose="02070309020205020404" pitchFamily="49" charset="0"/>
+                        </a:rPr>
+                        <a:t>49</a:t>
+                      </a:r>
+                    </a:p>
+                  </a:txBody>
+                  <a:tcPr anchor="ctr">
+                    <a:lnL w="12700" cap="flat" cmpd="sng" algn="ctr">
+                      <a:noFill/>
+                      <a:prstDash val="solid"/>
+                      <a:round/>
+                      <a:headEnd type="none" w="med" len="med"/>
+                      <a:tailEnd type="none" w="med" len="med"/>
+                    </a:lnL>
+                    <a:noFill/>
+                  </a:tcPr>
+                </a:tc>
+                <a:tc>
+                  <a:txBody>
+                    <a:bodyPr/>
+                    <a:lstStyle/>
+                    <a:p>
+                      <a:pPr algn="ctr"/>
+                      <a:r>
+                        <a:rPr lang="en-US" sz="2400" dirty="0">
+                          <a:latin typeface="Courier New" panose="02070309020205020404" pitchFamily="49" charset="0"/>
+                          <a:cs typeface="Courier New" panose="02070309020205020404" pitchFamily="49" charset="0"/>
+                        </a:rPr>
+                        <a:t>I</a:t>
+                      </a:r>
+                    </a:p>
+                  </a:txBody>
+                  <a:tcPr anchor="ctr">
+                    <a:lnR w="12700" cap="flat" cmpd="sng" algn="ctr">
+                      <a:noFill/>
+                      <a:prstDash val="solid"/>
+                      <a:round/>
+                      <a:headEnd type="none" w="med" len="med"/>
+                      <a:tailEnd type="none" w="med" len="med"/>
+                    </a:lnR>
+                    <a:noFill/>
+                  </a:tcPr>
+                </a:tc>
+                <a:extLst>
+                  <a:ext uri="{0D108BD9-81ED-4DB2-BD59-A6C34878D82A}">
+                    <a16:rowId xmlns:a16="http://schemas.microsoft.com/office/drawing/2014/main" val="2516648206"/>
+                  </a:ext>
+                </a:extLst>
+              </a:tr>
+              <a:tr h="384704">
+                <a:tc>
+                  <a:txBody>
+                    <a:bodyPr/>
+                    <a:lstStyle/>
+                    <a:p>
+                      <a:pPr algn="ctr"/>
+                      <a:r>
+                        <a:rPr lang="en-US" sz="2400" dirty="0">
+                          <a:latin typeface="Courier New" panose="02070309020205020404" pitchFamily="49" charset="0"/>
+                          <a:cs typeface="Courier New" panose="02070309020205020404" pitchFamily="49" charset="0"/>
+                        </a:rPr>
+                        <a:t>4A</a:t>
+                      </a:r>
+                    </a:p>
+                  </a:txBody>
+                  <a:tcPr anchor="ctr">
+                    <a:lnL w="12700" cap="flat" cmpd="sng" algn="ctr">
+                      <a:noFill/>
+                      <a:prstDash val="solid"/>
+                      <a:round/>
+                      <a:headEnd type="none" w="med" len="med"/>
+                      <a:tailEnd type="none" w="med" len="med"/>
+                    </a:lnL>
+                    <a:noFill/>
+                  </a:tcPr>
+                </a:tc>
+                <a:tc>
+                  <a:txBody>
+                    <a:bodyPr/>
+                    <a:lstStyle/>
+                    <a:p>
+                      <a:pPr algn="ctr"/>
+                      <a:r>
+                        <a:rPr lang="en-US" sz="2400" dirty="0">
+                          <a:latin typeface="Courier New" panose="02070309020205020404" pitchFamily="49" charset="0"/>
+                          <a:cs typeface="Courier New" panose="02070309020205020404" pitchFamily="49" charset="0"/>
+                        </a:rPr>
+                        <a:t>J</a:t>
+                      </a:r>
+                    </a:p>
+                  </a:txBody>
+                  <a:tcPr anchor="ctr">
+                    <a:lnR w="12700" cap="flat" cmpd="sng" algn="ctr">
+                      <a:noFill/>
+                      <a:prstDash val="solid"/>
+                      <a:round/>
+                      <a:headEnd type="none" w="med" len="med"/>
+                      <a:tailEnd type="none" w="med" len="med"/>
+                    </a:lnR>
+                    <a:noFill/>
+                  </a:tcPr>
+                </a:tc>
+                <a:extLst>
+                  <a:ext uri="{0D108BD9-81ED-4DB2-BD59-A6C34878D82A}">
+                    <a16:rowId xmlns:a16="http://schemas.microsoft.com/office/drawing/2014/main" val="3480683499"/>
+                  </a:ext>
+                </a:extLst>
+              </a:tr>
+              <a:tr h="384704">
+                <a:tc>
+                  <a:txBody>
+                    <a:bodyPr/>
+                    <a:lstStyle/>
+                    <a:p>
+                      <a:pPr algn="ctr"/>
+                      <a:r>
+                        <a:rPr lang="en-US" sz="2400" dirty="0">
+                          <a:latin typeface="Courier New" panose="02070309020205020404" pitchFamily="49" charset="0"/>
+                          <a:cs typeface="Courier New" panose="02070309020205020404" pitchFamily="49" charset="0"/>
+                        </a:rPr>
+                        <a:t>4B</a:t>
+                      </a:r>
+                    </a:p>
+                  </a:txBody>
+                  <a:tcPr anchor="ctr">
+                    <a:lnL w="12700" cap="flat" cmpd="sng" algn="ctr">
+                      <a:noFill/>
+                      <a:prstDash val="solid"/>
+                      <a:round/>
+                      <a:headEnd type="none" w="med" len="med"/>
+                      <a:tailEnd type="none" w="med" len="med"/>
+                    </a:lnL>
+                    <a:noFill/>
+                  </a:tcPr>
+                </a:tc>
+                <a:tc>
+                  <a:txBody>
+                    <a:bodyPr/>
+                    <a:lstStyle/>
+                    <a:p>
+                      <a:pPr algn="ctr"/>
+                      <a:r>
+                        <a:rPr lang="en-US" sz="2400" dirty="0">
+                          <a:latin typeface="Courier New" panose="02070309020205020404" pitchFamily="49" charset="0"/>
+                          <a:cs typeface="Courier New" panose="02070309020205020404" pitchFamily="49" charset="0"/>
+                        </a:rPr>
+                        <a:t>K</a:t>
+                      </a:r>
+                    </a:p>
+                  </a:txBody>
+                  <a:tcPr anchor="ctr">
+                    <a:lnR w="12700" cap="flat" cmpd="sng" algn="ctr">
+                      <a:noFill/>
+                      <a:prstDash val="solid"/>
+                      <a:round/>
+                      <a:headEnd type="none" w="med" len="med"/>
+                      <a:tailEnd type="none" w="med" len="med"/>
+                    </a:lnR>
+                    <a:noFill/>
+                  </a:tcPr>
+                </a:tc>
+                <a:extLst>
+                  <a:ext uri="{0D108BD9-81ED-4DB2-BD59-A6C34878D82A}">
+                    <a16:rowId xmlns:a16="http://schemas.microsoft.com/office/drawing/2014/main" val="945269057"/>
+                  </a:ext>
+                </a:extLst>
+              </a:tr>
+              <a:tr h="384704">
+                <a:tc>
+                  <a:txBody>
+                    <a:bodyPr/>
+                    <a:lstStyle/>
+                    <a:p>
+                      <a:pPr algn="ctr"/>
+                      <a:r>
+                        <a:rPr lang="en-US" sz="2400" dirty="0">
+                          <a:latin typeface="Courier New" panose="02070309020205020404" pitchFamily="49" charset="0"/>
+                          <a:cs typeface="Courier New" panose="02070309020205020404" pitchFamily="49" charset="0"/>
+                        </a:rPr>
+                        <a:t>4C</a:t>
+                      </a:r>
+                    </a:p>
+                  </a:txBody>
+                  <a:tcPr anchor="ctr">
+                    <a:lnL w="12700" cap="flat" cmpd="sng" algn="ctr">
+                      <a:noFill/>
+                      <a:prstDash val="solid"/>
+                      <a:round/>
+                      <a:headEnd type="none" w="med" len="med"/>
+                      <a:tailEnd type="none" w="med" len="med"/>
+                    </a:lnL>
+                    <a:noFill/>
+                  </a:tcPr>
+                </a:tc>
+                <a:tc>
+                  <a:txBody>
+                    <a:bodyPr/>
+                    <a:lstStyle/>
+                    <a:p>
+                      <a:pPr algn="ctr"/>
+                      <a:r>
+                        <a:rPr lang="en-US" sz="2400" dirty="0">
+                          <a:latin typeface="Courier New" panose="02070309020205020404" pitchFamily="49" charset="0"/>
+                          <a:cs typeface="Courier New" panose="02070309020205020404" pitchFamily="49" charset="0"/>
+                        </a:rPr>
+                        <a:t>L</a:t>
+                      </a:r>
+                    </a:p>
+                  </a:txBody>
+                  <a:tcPr anchor="ctr">
+                    <a:lnR w="12700" cap="flat" cmpd="sng" algn="ctr">
+                      <a:noFill/>
+                      <a:prstDash val="solid"/>
+                      <a:round/>
+                      <a:headEnd type="none" w="med" len="med"/>
+                      <a:tailEnd type="none" w="med" len="med"/>
+                    </a:lnR>
+                    <a:noFill/>
+                  </a:tcPr>
+                </a:tc>
+                <a:extLst>
+                  <a:ext uri="{0D108BD9-81ED-4DB2-BD59-A6C34878D82A}">
+                    <a16:rowId xmlns:a16="http://schemas.microsoft.com/office/drawing/2014/main" val="897014544"/>
+                  </a:ext>
+                </a:extLst>
+              </a:tr>
+              <a:tr h="384704">
+                <a:tc>
+                  <a:txBody>
+                    <a:bodyPr/>
+                    <a:lstStyle/>
+                    <a:p>
+                      <a:pPr algn="ctr"/>
+                      <a:r>
+                        <a:rPr lang="en-US" sz="2400" dirty="0">
+                          <a:latin typeface="Courier New" panose="02070309020205020404" pitchFamily="49" charset="0"/>
+                          <a:cs typeface="Courier New" panose="02070309020205020404" pitchFamily="49" charset="0"/>
+                        </a:rPr>
+                        <a:t>4D</a:t>
+                      </a:r>
+                    </a:p>
+                  </a:txBody>
+                  <a:tcPr anchor="ctr">
+                    <a:lnL w="12700" cap="flat" cmpd="sng" algn="ctr">
+                      <a:noFill/>
+                      <a:prstDash val="solid"/>
+                      <a:round/>
+                      <a:headEnd type="none" w="med" len="med"/>
+                      <a:tailEnd type="none" w="med" len="med"/>
+                    </a:lnL>
+                    <a:lnB w="12700" cap="flat" cmpd="sng" algn="ctr">
+                      <a:noFill/>
+                      <a:prstDash val="solid"/>
+                      <a:round/>
+                      <a:headEnd type="none" w="med" len="med"/>
+                      <a:tailEnd type="none" w="med" len="med"/>
+                    </a:lnB>
+                    <a:noFill/>
+                  </a:tcPr>
+                </a:tc>
+                <a:tc>
+                  <a:txBody>
+                    <a:bodyPr/>
+                    <a:lstStyle/>
+                    <a:p>
+                      <a:pPr algn="ctr"/>
+                      <a:r>
+                        <a:rPr lang="en-US" sz="2400" dirty="0">
+                          <a:latin typeface="Courier New" panose="02070309020205020404" pitchFamily="49" charset="0"/>
+                          <a:cs typeface="Courier New" panose="02070309020205020404" pitchFamily="49" charset="0"/>
+                        </a:rPr>
+                        <a:t>M</a:t>
+                      </a:r>
+                    </a:p>
+                  </a:txBody>
+                  <a:tcPr anchor="ctr">
+                    <a:lnR w="12700" cap="flat" cmpd="sng" algn="ctr">
+                      <a:noFill/>
+                      <a:prstDash val="solid"/>
+                      <a:round/>
+                      <a:headEnd type="none" w="med" len="med"/>
+                      <a:tailEnd type="none" w="med" len="med"/>
+                    </a:lnR>
+                    <a:lnB w="12700" cap="flat" cmpd="sng" algn="ctr">
+                      <a:noFill/>
+                      <a:prstDash val="solid"/>
+                      <a:round/>
+                      <a:headEnd type="none" w="med" len="med"/>
+                      <a:tailEnd type="none" w="med" len="med"/>
+                    </a:lnB>
+                    <a:noFill/>
+                  </a:tcPr>
+                </a:tc>
+                <a:extLst>
+                  <a:ext uri="{0D108BD9-81ED-4DB2-BD59-A6C34878D82A}">
+                    <a16:rowId xmlns:a16="http://schemas.microsoft.com/office/drawing/2014/main" val="3648943626"/>
+                  </a:ext>
+                </a:extLst>
+              </a:tr>
+            </a:tbl>
+          </a:graphicData>
+        </a:graphic>
+      </p:graphicFrame>
+      <p:graphicFrame>
+        <p:nvGraphicFramePr>
+          <p:cNvPr id="9" name="Table 8">
+            <a:extLst>
+              <a:ext uri="{FF2B5EF4-FFF2-40B4-BE49-F238E27FC236}">
+                <a16:creationId xmlns:a16="http://schemas.microsoft.com/office/drawing/2014/main" id="{23251A5B-9B30-3F7D-11BB-31B6C32269F7}"/>
+              </a:ext>
+            </a:extLst>
+          </p:cNvPr>
+          <p:cNvGraphicFramePr>
+            <a:graphicFrameLocks noGrp="1"/>
+          </p:cNvGraphicFramePr>
+          <p:nvPr>
+            <p:extLst>
+              <p:ext uri="{D42A27DB-BD31-4B8C-83A1-F6EECF244321}">
+                <p14:modId xmlns:p14="http://schemas.microsoft.com/office/powerpoint/2010/main" val="1962420917"/>
+              </p:ext>
+            </p:extLst>
+          </p:nvPr>
+        </p:nvGraphicFramePr>
+        <p:xfrm>
+          <a:off x="8870740" y="264848"/>
+          <a:ext cx="1642534" cy="6328304"/>
+        </p:xfrm>
+        <a:graphic>
+          <a:graphicData uri="http://schemas.openxmlformats.org/drawingml/2006/table">
+            <a:tbl>
+              <a:tblPr firstRow="1" bandRow="1">
+                <a:tableStyleId>{616DA210-FB5B-4158-B5E0-FEB733F419BA}</a:tableStyleId>
+              </a:tblPr>
+              <a:tblGrid>
+                <a:gridCol w="803017">
+                  <a:extLst>
+                    <a:ext uri="{9D8B030D-6E8A-4147-A177-3AD203B41FA5}">
+                      <a16:colId xmlns:a16="http://schemas.microsoft.com/office/drawing/2014/main" val="2279448199"/>
+                    </a:ext>
+                  </a:extLst>
+                </a:gridCol>
+                <a:gridCol w="839517">
+                  <a:extLst>
+                    <a:ext uri="{9D8B030D-6E8A-4147-A177-3AD203B41FA5}">
+                      <a16:colId xmlns:a16="http://schemas.microsoft.com/office/drawing/2014/main" val="3943847458"/>
+                    </a:ext>
+                  </a:extLst>
+                </a:gridCol>
+              </a:tblGrid>
+              <a:tr h="384704">
+                <a:tc>
+                  <a:txBody>
+                    <a:bodyPr/>
+                    <a:lstStyle/>
+                    <a:p>
+                      <a:pPr algn="ctr"/>
+                      <a:r>
+                        <a:rPr lang="en-US" sz="1400" b="0" dirty="0">
+                          <a:latin typeface="Courier New" panose="02070309020205020404" pitchFamily="49" charset="0"/>
+                          <a:cs typeface="Courier New" panose="02070309020205020404" pitchFamily="49" charset="0"/>
+                        </a:rPr>
+                        <a:t>HEX</a:t>
+                      </a:r>
+                    </a:p>
+                  </a:txBody>
+                  <a:tcPr anchor="ctr">
+                    <a:lnL w="12700" cap="flat" cmpd="sng" algn="ctr">
+                      <a:noFill/>
+                      <a:prstDash val="solid"/>
+                      <a:round/>
+                      <a:headEnd type="none" w="med" len="med"/>
+                      <a:tailEnd type="none" w="med" len="med"/>
+                    </a:lnL>
+                    <a:lnT w="12700" cap="flat" cmpd="sng" algn="ctr">
+                      <a:noFill/>
+                      <a:prstDash val="solid"/>
+                      <a:round/>
+                      <a:headEnd type="none" w="med" len="med"/>
+                      <a:tailEnd type="none" w="med" len="med"/>
+                    </a:lnT>
+                    <a:noFill/>
+                  </a:tcPr>
+                </a:tc>
+                <a:tc>
+                  <a:txBody>
+                    <a:bodyPr/>
+                    <a:lstStyle/>
+                    <a:p>
+                      <a:pPr algn="ctr"/>
+                      <a:r>
+                        <a:rPr lang="en-US" sz="1400" b="0" dirty="0">
+                          <a:latin typeface="Courier New" panose="02070309020205020404" pitchFamily="49" charset="0"/>
+                          <a:cs typeface="Courier New" panose="02070309020205020404" pitchFamily="49" charset="0"/>
+                        </a:rPr>
+                        <a:t>LETTER</a:t>
+                      </a:r>
+                    </a:p>
+                  </a:txBody>
+                  <a:tcPr anchor="ctr">
+                    <a:lnR w="12700" cap="flat" cmpd="sng" algn="ctr">
+                      <a:noFill/>
+                      <a:prstDash val="solid"/>
+                      <a:round/>
+                      <a:headEnd type="none" w="med" len="med"/>
+                      <a:tailEnd type="none" w="med" len="med"/>
+                    </a:lnR>
+                    <a:lnT w="12700" cap="flat" cmpd="sng" algn="ctr">
+                      <a:noFill/>
+                      <a:prstDash val="solid"/>
+                      <a:round/>
+                      <a:headEnd type="none" w="med" len="med"/>
+                      <a:tailEnd type="none" w="med" len="med"/>
+                    </a:lnT>
+                    <a:noFill/>
+                  </a:tcPr>
+                </a:tc>
+                <a:extLst>
+                  <a:ext uri="{0D108BD9-81ED-4DB2-BD59-A6C34878D82A}">
+                    <a16:rowId xmlns:a16="http://schemas.microsoft.com/office/drawing/2014/main" val="577741590"/>
+                  </a:ext>
+                </a:extLst>
+              </a:tr>
+              <a:tr h="384704">
+                <a:tc>
+                  <a:txBody>
+                    <a:bodyPr/>
+                    <a:lstStyle/>
+                    <a:p>
+                      <a:pPr algn="ctr"/>
+                      <a:r>
+                        <a:rPr lang="en-US" sz="2400" dirty="0">
+                          <a:latin typeface="Courier New" panose="02070309020205020404" pitchFamily="49" charset="0"/>
+                          <a:cs typeface="Courier New" panose="02070309020205020404" pitchFamily="49" charset="0"/>
+                        </a:rPr>
+                        <a:t>4E</a:t>
+                      </a:r>
+                    </a:p>
+                  </a:txBody>
+                  <a:tcPr anchor="ctr">
+                    <a:lnL w="12700" cap="flat" cmpd="sng" algn="ctr">
+                      <a:noFill/>
+                      <a:prstDash val="solid"/>
+                      <a:round/>
+                      <a:headEnd type="none" w="med" len="med"/>
+                      <a:tailEnd type="none" w="med" len="med"/>
+                    </a:lnL>
+                    <a:noFill/>
+                  </a:tcPr>
+                </a:tc>
+                <a:tc>
+                  <a:txBody>
+                    <a:bodyPr/>
+                    <a:lstStyle/>
+                    <a:p>
+                      <a:pPr algn="ctr"/>
+                      <a:r>
+                        <a:rPr lang="en-US" sz="2400" dirty="0">
+                          <a:latin typeface="Courier New" panose="02070309020205020404" pitchFamily="49" charset="0"/>
+                          <a:cs typeface="Courier New" panose="02070309020205020404" pitchFamily="49" charset="0"/>
+                        </a:rPr>
+                        <a:t>N</a:t>
+                      </a:r>
+                    </a:p>
+                  </a:txBody>
+                  <a:tcPr anchor="ctr">
+                    <a:lnR w="12700" cap="flat" cmpd="sng" algn="ctr">
+                      <a:noFill/>
+                      <a:prstDash val="solid"/>
+                      <a:round/>
+                      <a:headEnd type="none" w="med" len="med"/>
+                      <a:tailEnd type="none" w="med" len="med"/>
+                    </a:lnR>
+                    <a:noFill/>
+                  </a:tcPr>
+                </a:tc>
+                <a:extLst>
+                  <a:ext uri="{0D108BD9-81ED-4DB2-BD59-A6C34878D82A}">
+                    <a16:rowId xmlns:a16="http://schemas.microsoft.com/office/drawing/2014/main" val="1574702707"/>
+                  </a:ext>
+                </a:extLst>
+              </a:tr>
+              <a:tr h="384704">
+                <a:tc>
+                  <a:txBody>
+                    <a:bodyPr/>
+                    <a:lstStyle/>
+                    <a:p>
+                      <a:pPr algn="ctr"/>
+                      <a:r>
+                        <a:rPr lang="en-US" sz="2400" dirty="0">
+                          <a:latin typeface="Courier New" panose="02070309020205020404" pitchFamily="49" charset="0"/>
+                          <a:cs typeface="Courier New" panose="02070309020205020404" pitchFamily="49" charset="0"/>
+                        </a:rPr>
+                        <a:t>4F</a:t>
+                      </a:r>
+                    </a:p>
+                  </a:txBody>
+                  <a:tcPr anchor="ctr">
+                    <a:lnL w="12700" cap="flat" cmpd="sng" algn="ctr">
+                      <a:noFill/>
+                      <a:prstDash val="solid"/>
+                      <a:round/>
+                      <a:headEnd type="none" w="med" len="med"/>
+                      <a:tailEnd type="none" w="med" len="med"/>
+                    </a:lnL>
+                    <a:noFill/>
+                  </a:tcPr>
+                </a:tc>
+                <a:tc>
+                  <a:txBody>
+                    <a:bodyPr/>
+                    <a:lstStyle/>
+                    <a:p>
+                      <a:pPr algn="ctr"/>
+                      <a:r>
+                        <a:rPr lang="en-US" sz="2400" dirty="0">
+                          <a:latin typeface="Courier New" panose="02070309020205020404" pitchFamily="49" charset="0"/>
+                          <a:cs typeface="Courier New" panose="02070309020205020404" pitchFamily="49" charset="0"/>
+                        </a:rPr>
+                        <a:t>O</a:t>
+                      </a:r>
+                    </a:p>
+                  </a:txBody>
+                  <a:tcPr anchor="ctr">
+                    <a:lnR w="12700" cap="flat" cmpd="sng" algn="ctr">
+                      <a:noFill/>
+                      <a:prstDash val="solid"/>
+                      <a:round/>
+                      <a:headEnd type="none" w="med" len="med"/>
+                      <a:tailEnd type="none" w="med" len="med"/>
+                    </a:lnR>
+                    <a:noFill/>
+                  </a:tcPr>
+                </a:tc>
+                <a:extLst>
+                  <a:ext uri="{0D108BD9-81ED-4DB2-BD59-A6C34878D82A}">
+                    <a16:rowId xmlns:a16="http://schemas.microsoft.com/office/drawing/2014/main" val="1034101600"/>
+                  </a:ext>
+                </a:extLst>
+              </a:tr>
+              <a:tr h="384704">
+                <a:tc>
+                  <a:txBody>
+                    <a:bodyPr/>
+                    <a:lstStyle/>
+                    <a:p>
+                      <a:pPr algn="ctr"/>
+                      <a:r>
+                        <a:rPr lang="en-US" sz="2400" dirty="0">
+                          <a:latin typeface="Courier New" panose="02070309020205020404" pitchFamily="49" charset="0"/>
+                          <a:cs typeface="Courier New" panose="02070309020205020404" pitchFamily="49" charset="0"/>
+                        </a:rPr>
+                        <a:t>50</a:t>
+                      </a:r>
+                    </a:p>
+                  </a:txBody>
+                  <a:tcPr anchor="ctr">
+                    <a:lnL w="12700" cap="flat" cmpd="sng" algn="ctr">
+                      <a:noFill/>
+                      <a:prstDash val="solid"/>
+                      <a:round/>
+                      <a:headEnd type="none" w="med" len="med"/>
+                      <a:tailEnd type="none" w="med" len="med"/>
+                    </a:lnL>
+                    <a:noFill/>
+                  </a:tcPr>
+                </a:tc>
+                <a:tc>
+                  <a:txBody>
+                    <a:bodyPr/>
+                    <a:lstStyle/>
+                    <a:p>
+                      <a:pPr algn="ctr"/>
+                      <a:r>
+                        <a:rPr lang="en-US" sz="2400" dirty="0">
+                          <a:latin typeface="Courier New" panose="02070309020205020404" pitchFamily="49" charset="0"/>
+                          <a:cs typeface="Courier New" panose="02070309020205020404" pitchFamily="49" charset="0"/>
+                        </a:rPr>
+                        <a:t>P</a:t>
+                      </a:r>
+                    </a:p>
+                  </a:txBody>
+                  <a:tcPr anchor="ctr">
+                    <a:lnR w="12700" cap="flat" cmpd="sng" algn="ctr">
+                      <a:noFill/>
+                      <a:prstDash val="solid"/>
+                      <a:round/>
+                      <a:headEnd type="none" w="med" len="med"/>
+                      <a:tailEnd type="none" w="med" len="med"/>
+                    </a:lnR>
+                    <a:noFill/>
+                  </a:tcPr>
+                </a:tc>
+                <a:extLst>
+                  <a:ext uri="{0D108BD9-81ED-4DB2-BD59-A6C34878D82A}">
+                    <a16:rowId xmlns:a16="http://schemas.microsoft.com/office/drawing/2014/main" val="3721495223"/>
+                  </a:ext>
+                </a:extLst>
+              </a:tr>
+              <a:tr h="384704">
+                <a:tc>
+                  <a:txBody>
+                    <a:bodyPr/>
+                    <a:lstStyle/>
+                    <a:p>
+                      <a:pPr algn="ctr"/>
+                      <a:r>
+                        <a:rPr lang="en-US" sz="2400" dirty="0">
+                          <a:latin typeface="Courier New" panose="02070309020205020404" pitchFamily="49" charset="0"/>
+                          <a:cs typeface="Courier New" panose="02070309020205020404" pitchFamily="49" charset="0"/>
+                        </a:rPr>
+                        <a:t>51</a:t>
+                      </a:r>
+                    </a:p>
+                  </a:txBody>
+                  <a:tcPr anchor="ctr">
+                    <a:lnL w="12700" cap="flat" cmpd="sng" algn="ctr">
+                      <a:noFill/>
+                      <a:prstDash val="solid"/>
+                      <a:round/>
+                      <a:headEnd type="none" w="med" len="med"/>
+                      <a:tailEnd type="none" w="med" len="med"/>
+                    </a:lnL>
+                    <a:noFill/>
+                  </a:tcPr>
+                </a:tc>
+                <a:tc>
+                  <a:txBody>
+                    <a:bodyPr/>
+                    <a:lstStyle/>
+                    <a:p>
+                      <a:pPr algn="ctr"/>
+                      <a:r>
+                        <a:rPr lang="en-US" sz="2400" dirty="0">
+                          <a:latin typeface="Courier New" panose="02070309020205020404" pitchFamily="49" charset="0"/>
+                          <a:cs typeface="Courier New" panose="02070309020205020404" pitchFamily="49" charset="0"/>
+                        </a:rPr>
+                        <a:t>Q</a:t>
+                      </a:r>
+                    </a:p>
+                  </a:txBody>
+                  <a:tcPr anchor="ctr">
+                    <a:lnR w="12700" cap="flat" cmpd="sng" algn="ctr">
+                      <a:noFill/>
+                      <a:prstDash val="solid"/>
+                      <a:round/>
+                      <a:headEnd type="none" w="med" len="med"/>
+                      <a:tailEnd type="none" w="med" len="med"/>
+                    </a:lnR>
+                    <a:noFill/>
+                  </a:tcPr>
+                </a:tc>
+                <a:extLst>
+                  <a:ext uri="{0D108BD9-81ED-4DB2-BD59-A6C34878D82A}">
+                    <a16:rowId xmlns:a16="http://schemas.microsoft.com/office/drawing/2014/main" val="2888288013"/>
+                  </a:ext>
+                </a:extLst>
+              </a:tr>
+              <a:tr h="384704">
+                <a:tc>
+                  <a:txBody>
+                    <a:bodyPr/>
+                    <a:lstStyle/>
+                    <a:p>
+                      <a:pPr algn="ctr"/>
+                      <a:r>
+                        <a:rPr lang="en-US" sz="2400" dirty="0">
+                          <a:latin typeface="Courier New" panose="02070309020205020404" pitchFamily="49" charset="0"/>
+                          <a:cs typeface="Courier New" panose="02070309020205020404" pitchFamily="49" charset="0"/>
+                        </a:rPr>
+                        <a:t>52</a:t>
+                      </a:r>
+                    </a:p>
+                  </a:txBody>
+                  <a:tcPr anchor="ctr">
+                    <a:lnL w="12700" cap="flat" cmpd="sng" algn="ctr">
+                      <a:noFill/>
+                      <a:prstDash val="solid"/>
+                      <a:round/>
+                      <a:headEnd type="none" w="med" len="med"/>
+                      <a:tailEnd type="none" w="med" len="med"/>
+                    </a:lnL>
+                    <a:noFill/>
+                  </a:tcPr>
+                </a:tc>
+                <a:tc>
+                  <a:txBody>
+                    <a:bodyPr/>
+                    <a:lstStyle/>
+                    <a:p>
+                      <a:pPr algn="ctr"/>
+                      <a:r>
+                        <a:rPr lang="en-US" sz="2400" dirty="0">
+                          <a:latin typeface="Courier New" panose="02070309020205020404" pitchFamily="49" charset="0"/>
+                          <a:cs typeface="Courier New" panose="02070309020205020404" pitchFamily="49" charset="0"/>
+                        </a:rPr>
+                        <a:t>R</a:t>
+                      </a:r>
+                    </a:p>
+                  </a:txBody>
+                  <a:tcPr anchor="ctr">
+                    <a:lnR w="12700" cap="flat" cmpd="sng" algn="ctr">
+                      <a:noFill/>
+                      <a:prstDash val="solid"/>
+                      <a:round/>
+                      <a:headEnd type="none" w="med" len="med"/>
+                      <a:tailEnd type="none" w="med" len="med"/>
+                    </a:lnR>
+                    <a:noFill/>
+                  </a:tcPr>
+                </a:tc>
+                <a:extLst>
+                  <a:ext uri="{0D108BD9-81ED-4DB2-BD59-A6C34878D82A}">
+                    <a16:rowId xmlns:a16="http://schemas.microsoft.com/office/drawing/2014/main" val="350298265"/>
+                  </a:ext>
+                </a:extLst>
+              </a:tr>
+              <a:tr h="384704">
+                <a:tc>
+                  <a:txBody>
+                    <a:bodyPr/>
+                    <a:lstStyle/>
+                    <a:p>
+                      <a:pPr algn="ctr"/>
+                      <a:r>
+                        <a:rPr lang="en-US" sz="2400" dirty="0">
+                          <a:latin typeface="Courier New" panose="02070309020205020404" pitchFamily="49" charset="0"/>
+                          <a:cs typeface="Courier New" panose="02070309020205020404" pitchFamily="49" charset="0"/>
+                        </a:rPr>
+                        <a:t>53</a:t>
+                      </a:r>
+                    </a:p>
+                  </a:txBody>
+                  <a:tcPr anchor="ctr">
+                    <a:lnL w="12700" cap="flat" cmpd="sng" algn="ctr">
+                      <a:noFill/>
+                      <a:prstDash val="solid"/>
+                      <a:round/>
+                      <a:headEnd type="none" w="med" len="med"/>
+                      <a:tailEnd type="none" w="med" len="med"/>
+                    </a:lnL>
+                    <a:noFill/>
+                  </a:tcPr>
+                </a:tc>
+                <a:tc>
+                  <a:txBody>
+                    <a:bodyPr/>
+                    <a:lstStyle/>
+                    <a:p>
+                      <a:pPr algn="ctr"/>
+                      <a:r>
+                        <a:rPr lang="en-US" sz="2400" dirty="0">
+                          <a:latin typeface="Courier New" panose="02070309020205020404" pitchFamily="49" charset="0"/>
+                          <a:cs typeface="Courier New" panose="02070309020205020404" pitchFamily="49" charset="0"/>
+                        </a:rPr>
+                        <a:t>S</a:t>
+                      </a:r>
+                    </a:p>
+                  </a:txBody>
+                  <a:tcPr anchor="ctr">
+                    <a:lnR w="12700" cap="flat" cmpd="sng" algn="ctr">
+                      <a:noFill/>
+                      <a:prstDash val="solid"/>
+                      <a:round/>
+                      <a:headEnd type="none" w="med" len="med"/>
+                      <a:tailEnd type="none" w="med" len="med"/>
+                    </a:lnR>
+                    <a:noFill/>
+                  </a:tcPr>
+                </a:tc>
+                <a:extLst>
+                  <a:ext uri="{0D108BD9-81ED-4DB2-BD59-A6C34878D82A}">
+                    <a16:rowId xmlns:a16="http://schemas.microsoft.com/office/drawing/2014/main" val="2842985489"/>
+                  </a:ext>
+                </a:extLst>
+              </a:tr>
+              <a:tr h="384704">
+                <a:tc>
+                  <a:txBody>
+                    <a:bodyPr/>
+                    <a:lstStyle/>
+                    <a:p>
+                      <a:pPr algn="ctr"/>
+                      <a:r>
+                        <a:rPr lang="en-US" sz="2400" dirty="0">
+                          <a:latin typeface="Courier New" panose="02070309020205020404" pitchFamily="49" charset="0"/>
+                          <a:cs typeface="Courier New" panose="02070309020205020404" pitchFamily="49" charset="0"/>
+                        </a:rPr>
+                        <a:t>54</a:t>
+                      </a:r>
+                    </a:p>
+                  </a:txBody>
+                  <a:tcPr anchor="ctr">
+                    <a:lnL w="12700" cap="flat" cmpd="sng" algn="ctr">
+                      <a:noFill/>
+                      <a:prstDash val="solid"/>
+                      <a:round/>
+                      <a:headEnd type="none" w="med" len="med"/>
+                      <a:tailEnd type="none" w="med" len="med"/>
+                    </a:lnL>
+                    <a:noFill/>
+                  </a:tcPr>
+                </a:tc>
+                <a:tc>
+                  <a:txBody>
+                    <a:bodyPr/>
+                    <a:lstStyle/>
+                    <a:p>
+                      <a:pPr algn="ctr"/>
+                      <a:r>
+                        <a:rPr lang="en-US" sz="2400" dirty="0">
+                          <a:latin typeface="Courier New" panose="02070309020205020404" pitchFamily="49" charset="0"/>
+                          <a:cs typeface="Courier New" panose="02070309020205020404" pitchFamily="49" charset="0"/>
+                        </a:rPr>
+                        <a:t>T</a:t>
+                      </a:r>
+                    </a:p>
+                  </a:txBody>
+                  <a:tcPr anchor="ctr">
+                    <a:lnR w="12700" cap="flat" cmpd="sng" algn="ctr">
+                      <a:noFill/>
+                      <a:prstDash val="solid"/>
+                      <a:round/>
+                      <a:headEnd type="none" w="med" len="med"/>
+                      <a:tailEnd type="none" w="med" len="med"/>
+                    </a:lnR>
+                    <a:noFill/>
+                  </a:tcPr>
+                </a:tc>
+                <a:extLst>
+                  <a:ext uri="{0D108BD9-81ED-4DB2-BD59-A6C34878D82A}">
+                    <a16:rowId xmlns:a16="http://schemas.microsoft.com/office/drawing/2014/main" val="2585885942"/>
+                  </a:ext>
+                </a:extLst>
+              </a:tr>
+              <a:tr h="384704">
+                <a:tc>
+                  <a:txBody>
+                    <a:bodyPr/>
+                    <a:lstStyle/>
+                    <a:p>
+                      <a:pPr algn="ctr"/>
+                      <a:r>
+                        <a:rPr lang="en-US" sz="2400" dirty="0">
+                          <a:latin typeface="Courier New" panose="02070309020205020404" pitchFamily="49" charset="0"/>
+                          <a:cs typeface="Courier New" panose="02070309020205020404" pitchFamily="49" charset="0"/>
+                        </a:rPr>
+                        <a:t>55</a:t>
+                      </a:r>
+                    </a:p>
+                  </a:txBody>
+                  <a:tcPr anchor="ctr">
+                    <a:lnL w="12700" cap="flat" cmpd="sng" algn="ctr">
+                      <a:noFill/>
+                      <a:prstDash val="solid"/>
+                      <a:round/>
+                      <a:headEnd type="none" w="med" len="med"/>
+                      <a:tailEnd type="none" w="med" len="med"/>
+                    </a:lnL>
+                    <a:noFill/>
+                  </a:tcPr>
+                </a:tc>
+                <a:tc>
+                  <a:txBody>
+                    <a:bodyPr/>
+                    <a:lstStyle/>
+                    <a:p>
+                      <a:pPr algn="ctr"/>
+                      <a:r>
+                        <a:rPr lang="en-US" sz="2400" dirty="0">
+                          <a:latin typeface="Courier New" panose="02070309020205020404" pitchFamily="49" charset="0"/>
+                          <a:cs typeface="Courier New" panose="02070309020205020404" pitchFamily="49" charset="0"/>
+                        </a:rPr>
+                        <a:t>U</a:t>
+                      </a:r>
+                    </a:p>
+                  </a:txBody>
+                  <a:tcPr anchor="ctr">
+                    <a:lnR w="12700" cap="flat" cmpd="sng" algn="ctr">
+                      <a:noFill/>
+                      <a:prstDash val="solid"/>
+                      <a:round/>
+                      <a:headEnd type="none" w="med" len="med"/>
+                      <a:tailEnd type="none" w="med" len="med"/>
+                    </a:lnR>
+                    <a:noFill/>
+                  </a:tcPr>
+                </a:tc>
+                <a:extLst>
+                  <a:ext uri="{0D108BD9-81ED-4DB2-BD59-A6C34878D82A}">
+                    <a16:rowId xmlns:a16="http://schemas.microsoft.com/office/drawing/2014/main" val="3898739342"/>
+                  </a:ext>
+                </a:extLst>
+              </a:tr>
+              <a:tr h="384704">
+                <a:tc>
+                  <a:txBody>
+                    <a:bodyPr/>
+                    <a:lstStyle/>
+                    <a:p>
+                      <a:pPr algn="ctr"/>
+                      <a:r>
+                        <a:rPr lang="en-US" sz="2400" dirty="0">
+                          <a:latin typeface="Courier New" panose="02070309020205020404" pitchFamily="49" charset="0"/>
+                          <a:cs typeface="Courier New" panose="02070309020205020404" pitchFamily="49" charset="0"/>
+                        </a:rPr>
+                        <a:t>56</a:t>
+                      </a:r>
+                    </a:p>
+                  </a:txBody>
+                  <a:tcPr anchor="ctr">
+                    <a:lnL w="12700" cap="flat" cmpd="sng" algn="ctr">
+                      <a:noFill/>
+                      <a:prstDash val="solid"/>
+                      <a:round/>
+                      <a:headEnd type="none" w="med" len="med"/>
+                      <a:tailEnd type="none" w="med" len="med"/>
+                    </a:lnL>
+                    <a:noFill/>
+                  </a:tcPr>
+                </a:tc>
+                <a:tc>
+                  <a:txBody>
+                    <a:bodyPr/>
+                    <a:lstStyle/>
+                    <a:p>
+                      <a:pPr algn="ctr"/>
+                      <a:r>
+                        <a:rPr lang="en-US" sz="2400" dirty="0">
+                          <a:latin typeface="Courier New" panose="02070309020205020404" pitchFamily="49" charset="0"/>
+                          <a:cs typeface="Courier New" panose="02070309020205020404" pitchFamily="49" charset="0"/>
+                        </a:rPr>
+                        <a:t>V</a:t>
+                      </a:r>
+                    </a:p>
+                  </a:txBody>
+                  <a:tcPr anchor="ctr">
+                    <a:lnR w="12700" cap="flat" cmpd="sng" algn="ctr">
+                      <a:noFill/>
+                      <a:prstDash val="solid"/>
+                      <a:round/>
+                      <a:headEnd type="none" w="med" len="med"/>
+                      <a:tailEnd type="none" w="med" len="med"/>
+                    </a:lnR>
+                    <a:noFill/>
+                  </a:tcPr>
+                </a:tc>
+                <a:extLst>
+                  <a:ext uri="{0D108BD9-81ED-4DB2-BD59-A6C34878D82A}">
+                    <a16:rowId xmlns:a16="http://schemas.microsoft.com/office/drawing/2014/main" val="2516648206"/>
+                  </a:ext>
+                </a:extLst>
+              </a:tr>
+              <a:tr h="384704">
+                <a:tc>
+                  <a:txBody>
+                    <a:bodyPr/>
+                    <a:lstStyle/>
+                    <a:p>
+                      <a:pPr algn="ctr"/>
+                      <a:r>
+                        <a:rPr lang="en-US" sz="2400" dirty="0">
+                          <a:latin typeface="Courier New" panose="02070309020205020404" pitchFamily="49" charset="0"/>
+                          <a:cs typeface="Courier New" panose="02070309020205020404" pitchFamily="49" charset="0"/>
+                        </a:rPr>
+                        <a:t>57</a:t>
+                      </a:r>
+                    </a:p>
+                  </a:txBody>
+                  <a:tcPr anchor="ctr">
+                    <a:lnL w="12700" cap="flat" cmpd="sng" algn="ctr">
+                      <a:noFill/>
+                      <a:prstDash val="solid"/>
+                      <a:round/>
+                      <a:headEnd type="none" w="med" len="med"/>
+                      <a:tailEnd type="none" w="med" len="med"/>
+                    </a:lnL>
+                    <a:noFill/>
+                  </a:tcPr>
+                </a:tc>
+                <a:tc>
+                  <a:txBody>
+                    <a:bodyPr/>
+                    <a:lstStyle/>
+                    <a:p>
+                      <a:pPr algn="ctr"/>
+                      <a:r>
+                        <a:rPr lang="en-US" sz="2400" dirty="0">
+                          <a:latin typeface="Courier New" panose="02070309020205020404" pitchFamily="49" charset="0"/>
+                          <a:cs typeface="Courier New" panose="02070309020205020404" pitchFamily="49" charset="0"/>
+                        </a:rPr>
+                        <a:t>W</a:t>
+                      </a:r>
+                    </a:p>
+                  </a:txBody>
+                  <a:tcPr anchor="ctr">
+                    <a:lnR w="12700" cap="flat" cmpd="sng" algn="ctr">
+                      <a:noFill/>
+                      <a:prstDash val="solid"/>
+                      <a:round/>
+                      <a:headEnd type="none" w="med" len="med"/>
+                      <a:tailEnd type="none" w="med" len="med"/>
+                    </a:lnR>
+                    <a:noFill/>
+                  </a:tcPr>
+                </a:tc>
+                <a:extLst>
+                  <a:ext uri="{0D108BD9-81ED-4DB2-BD59-A6C34878D82A}">
+                    <a16:rowId xmlns:a16="http://schemas.microsoft.com/office/drawing/2014/main" val="3480683499"/>
+                  </a:ext>
+                </a:extLst>
+              </a:tr>
+              <a:tr h="384704">
+                <a:tc>
+                  <a:txBody>
+                    <a:bodyPr/>
+                    <a:lstStyle/>
+                    <a:p>
+                      <a:pPr algn="ctr"/>
+                      <a:r>
+                        <a:rPr lang="en-US" sz="2400" dirty="0">
+                          <a:latin typeface="Courier New" panose="02070309020205020404" pitchFamily="49" charset="0"/>
+                          <a:cs typeface="Courier New" panose="02070309020205020404" pitchFamily="49" charset="0"/>
+                        </a:rPr>
+                        <a:t>58</a:t>
+                      </a:r>
+                    </a:p>
+                  </a:txBody>
+                  <a:tcPr anchor="ctr">
+                    <a:lnL w="12700" cap="flat" cmpd="sng" algn="ctr">
+                      <a:noFill/>
+                      <a:prstDash val="solid"/>
+                      <a:round/>
+                      <a:headEnd type="none" w="med" len="med"/>
+                      <a:tailEnd type="none" w="med" len="med"/>
+                    </a:lnL>
+                    <a:noFill/>
+                  </a:tcPr>
+                </a:tc>
+                <a:tc>
+                  <a:txBody>
+                    <a:bodyPr/>
+                    <a:lstStyle/>
+                    <a:p>
+                      <a:pPr algn="ctr"/>
+                      <a:r>
+                        <a:rPr lang="en-US" sz="2400" dirty="0">
+                          <a:latin typeface="Courier New" panose="02070309020205020404" pitchFamily="49" charset="0"/>
+                          <a:cs typeface="Courier New" panose="02070309020205020404" pitchFamily="49" charset="0"/>
+                        </a:rPr>
+                        <a:t>X</a:t>
+                      </a:r>
+                    </a:p>
+                  </a:txBody>
+                  <a:tcPr anchor="ctr">
+                    <a:lnR w="12700" cap="flat" cmpd="sng" algn="ctr">
+                      <a:noFill/>
+                      <a:prstDash val="solid"/>
+                      <a:round/>
+                      <a:headEnd type="none" w="med" len="med"/>
+                      <a:tailEnd type="none" w="med" len="med"/>
+                    </a:lnR>
+                    <a:noFill/>
+                  </a:tcPr>
+                </a:tc>
+                <a:extLst>
+                  <a:ext uri="{0D108BD9-81ED-4DB2-BD59-A6C34878D82A}">
+                    <a16:rowId xmlns:a16="http://schemas.microsoft.com/office/drawing/2014/main" val="945269057"/>
+                  </a:ext>
+                </a:extLst>
+              </a:tr>
+              <a:tr h="384704">
+                <a:tc>
+                  <a:txBody>
+                    <a:bodyPr/>
+                    <a:lstStyle/>
+                    <a:p>
+                      <a:pPr algn="ctr"/>
+                      <a:r>
+                        <a:rPr lang="en-US" sz="2400" dirty="0">
+                          <a:latin typeface="Courier New" panose="02070309020205020404" pitchFamily="49" charset="0"/>
+                          <a:cs typeface="Courier New" panose="02070309020205020404" pitchFamily="49" charset="0"/>
+                        </a:rPr>
+                        <a:t>59</a:t>
+                      </a:r>
+                    </a:p>
+                  </a:txBody>
+                  <a:tcPr anchor="ctr">
+                    <a:lnL w="12700" cap="flat" cmpd="sng" algn="ctr">
+                      <a:noFill/>
+                      <a:prstDash val="solid"/>
+                      <a:round/>
+                      <a:headEnd type="none" w="med" len="med"/>
+                      <a:tailEnd type="none" w="med" len="med"/>
+                    </a:lnL>
+                    <a:noFill/>
+                  </a:tcPr>
+                </a:tc>
+                <a:tc>
+                  <a:txBody>
+                    <a:bodyPr/>
+                    <a:lstStyle/>
+                    <a:p>
+                      <a:pPr algn="ctr"/>
+                      <a:r>
+                        <a:rPr lang="en-US" sz="2400" dirty="0">
+                          <a:latin typeface="Courier New" panose="02070309020205020404" pitchFamily="49" charset="0"/>
+                          <a:cs typeface="Courier New" panose="02070309020205020404" pitchFamily="49" charset="0"/>
+                        </a:rPr>
+                        <a:t>Y</a:t>
+                      </a:r>
+                    </a:p>
+                  </a:txBody>
+                  <a:tcPr anchor="ctr">
+                    <a:lnR w="12700" cap="flat" cmpd="sng" algn="ctr">
+                      <a:noFill/>
+                      <a:prstDash val="solid"/>
+                      <a:round/>
+                      <a:headEnd type="none" w="med" len="med"/>
+                      <a:tailEnd type="none" w="med" len="med"/>
+                    </a:lnR>
+                    <a:noFill/>
+                  </a:tcPr>
+                </a:tc>
+                <a:extLst>
+                  <a:ext uri="{0D108BD9-81ED-4DB2-BD59-A6C34878D82A}">
+                    <a16:rowId xmlns:a16="http://schemas.microsoft.com/office/drawing/2014/main" val="897014544"/>
+                  </a:ext>
+                </a:extLst>
+              </a:tr>
+              <a:tr h="384704">
+                <a:tc>
+                  <a:txBody>
+                    <a:bodyPr/>
+                    <a:lstStyle/>
+                    <a:p>
+                      <a:pPr algn="ctr"/>
+                      <a:r>
+                        <a:rPr lang="en-US" sz="2400" dirty="0">
+                          <a:latin typeface="Courier New" panose="02070309020205020404" pitchFamily="49" charset="0"/>
+                          <a:cs typeface="Courier New" panose="02070309020205020404" pitchFamily="49" charset="0"/>
+                        </a:rPr>
+                        <a:t>60</a:t>
+                      </a:r>
+                    </a:p>
+                  </a:txBody>
+                  <a:tcPr anchor="ctr">
+                    <a:lnL w="12700" cap="flat" cmpd="sng" algn="ctr">
+                      <a:noFill/>
+                      <a:prstDash val="solid"/>
+                      <a:round/>
+                      <a:headEnd type="none" w="med" len="med"/>
+                      <a:tailEnd type="none" w="med" len="med"/>
+                    </a:lnL>
+                    <a:lnB w="12700" cap="flat" cmpd="sng" algn="ctr">
+                      <a:noFill/>
+                      <a:prstDash val="solid"/>
+                      <a:round/>
+                      <a:headEnd type="none" w="med" len="med"/>
+                      <a:tailEnd type="none" w="med" len="med"/>
+                    </a:lnB>
+                    <a:noFill/>
+                  </a:tcPr>
+                </a:tc>
+                <a:tc>
+                  <a:txBody>
+                    <a:bodyPr/>
+                    <a:lstStyle/>
+                    <a:p>
+                      <a:pPr algn="ctr"/>
+                      <a:r>
+                        <a:rPr lang="en-US" sz="2400" dirty="0">
+                          <a:latin typeface="Courier New" panose="02070309020205020404" pitchFamily="49" charset="0"/>
+                          <a:cs typeface="Courier New" panose="02070309020205020404" pitchFamily="49" charset="0"/>
+                        </a:rPr>
+                        <a:t>Z</a:t>
+                      </a:r>
+                    </a:p>
+                  </a:txBody>
+                  <a:tcPr anchor="ctr">
+                    <a:lnR w="12700" cap="flat" cmpd="sng" algn="ctr">
+                      <a:noFill/>
+                      <a:prstDash val="solid"/>
+                      <a:round/>
+                      <a:headEnd type="none" w="med" len="med"/>
+                      <a:tailEnd type="none" w="med" len="med"/>
+                    </a:lnR>
+                    <a:lnB w="12700" cap="flat" cmpd="sng" algn="ctr">
+                      <a:noFill/>
+                      <a:prstDash val="solid"/>
+                      <a:round/>
+                      <a:headEnd type="none" w="med" len="med"/>
+                      <a:tailEnd type="none" w="med" len="med"/>
+                    </a:lnB>
+                    <a:noFill/>
+                  </a:tcPr>
+                </a:tc>
+                <a:extLst>
+                  <a:ext uri="{0D108BD9-81ED-4DB2-BD59-A6C34878D82A}">
+                    <a16:rowId xmlns:a16="http://schemas.microsoft.com/office/drawing/2014/main" val="3648943626"/>
+                  </a:ext>
+                </a:extLst>
+              </a:tr>
+            </a:tbl>
+          </a:graphicData>
+        </a:graphic>
+      </p:graphicFrame>
+      <p:cxnSp>
+        <p:nvCxnSpPr>
+          <p:cNvPr id="10" name="Straight Connector 9">
+            <a:extLst>
+              <a:ext uri="{FF2B5EF4-FFF2-40B4-BE49-F238E27FC236}">
+                <a16:creationId xmlns:a16="http://schemas.microsoft.com/office/drawing/2014/main" id="{8E6AA148-694B-0E56-04E6-1E08D7DA446F}"/>
+              </a:ext>
+            </a:extLst>
+          </p:cNvPr>
+          <p:cNvCxnSpPr/>
+          <p:nvPr/>
+        </p:nvCxnSpPr>
+        <p:spPr>
+          <a:xfrm>
+            <a:off x="8718340" y="873760"/>
+            <a:ext cx="0" cy="5466080"/>
+          </a:xfrm>
+          <a:prstGeom prst="line">
+            <a:avLst/>
+          </a:prstGeom>
+        </p:spPr>
+        <p:style>
+          <a:lnRef idx="2">
+            <a:schemeClr val="dk1"/>
+          </a:lnRef>
+          <a:fillRef idx="0">
+            <a:schemeClr val="dk1"/>
+          </a:fillRef>
+          <a:effectRef idx="1">
+            <a:schemeClr val="dk1"/>
+          </a:effectRef>
+          <a:fontRef idx="minor">
+            <a:schemeClr val="tx1"/>
+          </a:fontRef>
+        </p:style>
+      </p:cxnSp>
+      <p:sp>
+        <p:nvSpPr>
+          <p:cNvPr id="11" name="TextBox 10">
+            <a:extLst>
+              <a:ext uri="{FF2B5EF4-FFF2-40B4-BE49-F238E27FC236}">
+                <a16:creationId xmlns:a16="http://schemas.microsoft.com/office/drawing/2014/main" id="{2AA905CD-7371-A237-6FC8-5DC9FC25D1AD}"/>
+              </a:ext>
+            </a:extLst>
+          </p:cNvPr>
+          <p:cNvSpPr txBox="1"/>
+          <p:nvPr/>
+        </p:nvSpPr>
+        <p:spPr>
+          <a:xfrm rot="16200000">
+            <a:off x="9487559" y="3290500"/>
+            <a:ext cx="2633226" cy="276999"/>
+          </a:xfrm>
+          <a:prstGeom prst="rect">
+            <a:avLst/>
+          </a:prstGeom>
+          <a:noFill/>
+        </p:spPr>
+        <p:txBody>
+          <a:bodyPr wrap="square" rtlCol="0">
+            <a:spAutoFit/>
+          </a:bodyPr>
+          <a:lstStyle/>
+          <a:p>
+            <a:r>
+              <a:rPr lang="en-US" sz="1200" dirty="0">
+                <a:latin typeface="Courier New" panose="02070309020205020404" pitchFamily="49" charset="0"/>
+                <a:cs typeface="Courier New" panose="02070309020205020404" pitchFamily="49" charset="0"/>
+              </a:rPr>
+              <a:t>Character Encoding: ASCII</a:t>
+            </a:r>
+          </a:p>
+        </p:txBody>
+      </p:sp>
+    </p:spTree>
+    <p:extLst>
+      <p:ext uri="{BB962C8B-B14F-4D97-AF65-F5344CB8AC3E}">
+        <p14:creationId xmlns:p14="http://schemas.microsoft.com/office/powerpoint/2010/main" val="4183716767"/>
+      </p:ext>
+    </p:extLst>
+  </p:cSld>
+  <p:clrMapOvr>
+    <a:masterClrMapping/>
+  </p:clrMapOvr>
+</p:sld>
+</file>
+
+<file path=ppt/slides/slide4.xml><?xml version="1.0" encoding="utf-8"?>
+<p:sld xmlns:a="http://schemas.openxmlformats.org/drawingml/2006/main" xmlns:r="http://schemas.openxmlformats.org/officeDocument/2006/relationships" xmlns:p="http://schemas.openxmlformats.org/presentationml/2006/main">
+  <p:cSld>
+    <p:spTree>
+      <p:nvGrpSpPr>
+        <p:cNvPr id="1" name=""/>
+        <p:cNvGrpSpPr/>
+        <p:nvPr/>
+      </p:nvGrpSpPr>
+      <p:grpSpPr>
+        <a:xfrm>
+          <a:off x="0" y="0"/>
+          <a:ext cx="0" cy="0"/>
+          <a:chOff x="0" y="0"/>
+          <a:chExt cx="0" cy="0"/>
+        </a:xfrm>
+      </p:grpSpPr>
+      <p:graphicFrame>
+        <p:nvGraphicFramePr>
+          <p:cNvPr id="5" name="Table 4">
+            <a:extLst>
+              <a:ext uri="{FF2B5EF4-FFF2-40B4-BE49-F238E27FC236}">
+                <a16:creationId xmlns:a16="http://schemas.microsoft.com/office/drawing/2014/main" id="{BD46E6C9-C5B7-4C2D-960E-2393B2D53FE9}"/>
+              </a:ext>
+            </a:extLst>
+          </p:cNvPr>
+          <p:cNvGraphicFramePr>
+            <a:graphicFrameLocks noGrp="1"/>
+          </p:cNvGraphicFramePr>
+          <p:nvPr>
+            <p:extLst>
+              <p:ext uri="{D42A27DB-BD31-4B8C-83A1-F6EECF244321}">
+                <p14:modId xmlns:p14="http://schemas.microsoft.com/office/powerpoint/2010/main" val="3881178766"/>
+              </p:ext>
+            </p:extLst>
+          </p:nvPr>
+        </p:nvGraphicFramePr>
+        <p:xfrm>
+          <a:off x="342899" y="400050"/>
+          <a:ext cx="11458576" cy="5893592"/>
+        </p:xfrm>
+        <a:graphic>
+          <a:graphicData uri="http://schemas.openxmlformats.org/drawingml/2006/table">
+            <a:tbl>
+              <a:tblPr firstRow="1" bandRow="1">
+                <a:tableStyleId>{5940675A-B579-460E-94D1-54222C63F5DA}</a:tableStyleId>
+              </a:tblPr>
+              <a:tblGrid>
+                <a:gridCol w="2864644">
+                  <a:extLst>
+                    <a:ext uri="{9D8B030D-6E8A-4147-A177-3AD203B41FA5}">
+                      <a16:colId xmlns:a16="http://schemas.microsoft.com/office/drawing/2014/main" val="3668984341"/>
+                    </a:ext>
+                  </a:extLst>
+                </a:gridCol>
+                <a:gridCol w="2864644">
+                  <a:extLst>
+                    <a:ext uri="{9D8B030D-6E8A-4147-A177-3AD203B41FA5}">
+                      <a16:colId xmlns:a16="http://schemas.microsoft.com/office/drawing/2014/main" val="2584389920"/>
+                    </a:ext>
+                  </a:extLst>
+                </a:gridCol>
+                <a:gridCol w="2864644">
+                  <a:extLst>
+                    <a:ext uri="{9D8B030D-6E8A-4147-A177-3AD203B41FA5}">
+                      <a16:colId xmlns:a16="http://schemas.microsoft.com/office/drawing/2014/main" val="3222579570"/>
+                    </a:ext>
+                  </a:extLst>
+                </a:gridCol>
+                <a:gridCol w="2864644">
+                  <a:extLst>
+                    <a:ext uri="{9D8B030D-6E8A-4147-A177-3AD203B41FA5}">
+                      <a16:colId xmlns:a16="http://schemas.microsoft.com/office/drawing/2014/main" val="1252469361"/>
+                    </a:ext>
+                  </a:extLst>
+                </a:gridCol>
+              </a:tblGrid>
+              <a:tr h="736699">
+                <a:tc>
+                  <a:txBody>
+                    <a:bodyPr/>
+                    <a:lstStyle/>
+                    <a:p>
+                      <a:pPr algn="ctr"/>
+                      <a:r>
+                        <a:rPr lang="en-US" dirty="0">
+                          <a:latin typeface="Courier New" panose="02070309020205020404" pitchFamily="49" charset="0"/>
+                          <a:cs typeface="Courier New" panose="02070309020205020404" pitchFamily="49" charset="0"/>
+                        </a:rPr>
+                        <a:t>42 45 4E </a:t>
+                      </a:r>
+                      <a:r>
+                        <a:rPr lang="en-US" dirty="0" err="1">
+                          <a:latin typeface="Courier New" panose="02070309020205020404" pitchFamily="49" charset="0"/>
+                          <a:cs typeface="Courier New" panose="02070309020205020404" pitchFamily="49" charset="0"/>
+                        </a:rPr>
+                        <a:t>4E</a:t>
+                      </a:r>
+                      <a:r>
+                        <a:rPr lang="en-US" dirty="0">
+                          <a:latin typeface="Courier New" panose="02070309020205020404" pitchFamily="49" charset="0"/>
+                          <a:cs typeface="Courier New" panose="02070309020205020404" pitchFamily="49" charset="0"/>
+                        </a:rPr>
+                        <a:t> 55 </a:t>
+                      </a:r>
+                    </a:p>
+                  </a:txBody>
+                  <a:tcPr anchor="ctr"/>
+                </a:tc>
+                <a:tc>
+                  <a:txBody>
+                    <a:bodyPr/>
+                    <a:lstStyle/>
+                    <a:p>
+                      <a:pPr algn="ctr"/>
+                      <a:r>
+                        <a:rPr lang="en-US" dirty="0">
+                          <a:latin typeface="Courier New" panose="02070309020205020404" pitchFamily="49" charset="0"/>
+                          <a:cs typeface="Courier New" panose="02070309020205020404" pitchFamily="49" charset="0"/>
+                        </a:rPr>
+                        <a:t>4D 4F </a:t>
+                      </a:r>
+                      <a:r>
+                        <a:rPr lang="en-US" dirty="0" err="1">
+                          <a:latin typeface="Courier New" panose="02070309020205020404" pitchFamily="49" charset="0"/>
+                          <a:cs typeface="Courier New" panose="02070309020205020404" pitchFamily="49" charset="0"/>
+                        </a:rPr>
+                        <a:t>4F</a:t>
+                      </a:r>
+                      <a:r>
+                        <a:rPr lang="en-US" dirty="0">
+                          <a:latin typeface="Courier New" panose="02070309020205020404" pitchFamily="49" charset="0"/>
+                          <a:cs typeface="Courier New" panose="02070309020205020404" pitchFamily="49" charset="0"/>
+                        </a:rPr>
+                        <a:t> 4E 53</a:t>
+                      </a:r>
+                    </a:p>
+                  </a:txBody>
+                  <a:tcPr anchor="ctr"/>
+                </a:tc>
+                <a:tc>
+                  <a:txBody>
+                    <a:bodyPr/>
+                    <a:lstStyle/>
+                    <a:p>
+                      <a:pPr algn="ctr"/>
+                      <a:r>
+                        <a:rPr lang="en-US" dirty="0">
+                          <a:latin typeface="Courier New" panose="02070309020205020404" pitchFamily="49" charset="0"/>
+                          <a:cs typeface="Courier New" panose="02070309020205020404" pitchFamily="49" charset="0"/>
+                        </a:rPr>
+                        <a:t>53 50 41 43 45</a:t>
+                      </a:r>
+                    </a:p>
+                  </a:txBody>
+                  <a:tcPr anchor="ctr"/>
+                </a:tc>
+                <a:tc>
+                  <a:txBody>
+                    <a:bodyPr/>
+                    <a:lstStyle/>
+                    <a:p>
+                      <a:pPr algn="ctr"/>
+                      <a:r>
+                        <a:rPr lang="en-US" dirty="0">
+                          <a:latin typeface="Courier New" panose="02070309020205020404" pitchFamily="49" charset="0"/>
+                          <a:cs typeface="Courier New" panose="02070309020205020404" pitchFamily="49" charset="0"/>
+                        </a:rPr>
+                        <a:t>56 45 4E 55 53</a:t>
+                      </a:r>
+                    </a:p>
+                  </a:txBody>
+                  <a:tcPr anchor="ctr"/>
+                </a:tc>
+                <a:extLst>
+                  <a:ext uri="{0D108BD9-81ED-4DB2-BD59-A6C34878D82A}">
+                    <a16:rowId xmlns:a16="http://schemas.microsoft.com/office/drawing/2014/main" val="3489449322"/>
+                  </a:ext>
+                </a:extLst>
+              </a:tr>
+              <a:tr h="736699">
+                <a:tc>
+                  <a:txBody>
+                    <a:bodyPr/>
+                    <a:lstStyle/>
+                    <a:p>
+                      <a:pPr algn="ctr"/>
+                      <a:r>
+                        <a:rPr lang="en-US" dirty="0">
+                          <a:latin typeface="Courier New" panose="02070309020205020404" pitchFamily="49" charset="0"/>
+                          <a:cs typeface="Courier New" panose="02070309020205020404" pitchFamily="49" charset="0"/>
+                        </a:rPr>
+                        <a:t>50 4C 55 54 4F</a:t>
+                      </a:r>
+                    </a:p>
+                  </a:txBody>
+                  <a:tcPr anchor="ctr"/>
+                </a:tc>
+                <a:tc>
+                  <a:txBody>
+                    <a:bodyPr/>
+                    <a:lstStyle/>
+                    <a:p>
+                      <a:pPr algn="ctr"/>
+                      <a:r>
+                        <a:rPr lang="en-US" dirty="0">
+                          <a:latin typeface="Courier New" panose="02070309020205020404" pitchFamily="49" charset="0"/>
+                          <a:cs typeface="Courier New" panose="02070309020205020404" pitchFamily="49" charset="0"/>
+                        </a:rPr>
+                        <a:t>41 53 43 49 49</a:t>
+                      </a:r>
+                    </a:p>
+                  </a:txBody>
+                  <a:tcPr anchor="ctr"/>
+                </a:tc>
+                <a:tc>
+                  <a:txBody>
+                    <a:bodyPr/>
+                    <a:lstStyle/>
+                    <a:p>
+                      <a:pPr algn="ctr"/>
+                      <a:r>
+                        <a:rPr lang="en-US" dirty="0">
+                          <a:latin typeface="Courier New" panose="02070309020205020404" pitchFamily="49" charset="0"/>
+                          <a:cs typeface="Courier New" panose="02070309020205020404" pitchFamily="49" charset="0"/>
+                        </a:rPr>
+                        <a:t>45 41 52 54 48</a:t>
+                      </a:r>
+                    </a:p>
+                  </a:txBody>
+                  <a:tcPr anchor="ctr"/>
+                </a:tc>
+                <a:tc>
+                  <a:txBody>
+                    <a:bodyPr/>
+                    <a:lstStyle/>
+                    <a:p>
+                      <a:pPr algn="ctr"/>
+                      <a:r>
+                        <a:rPr lang="en-US" dirty="0">
+                          <a:latin typeface="Courier New" panose="02070309020205020404" pitchFamily="49" charset="0"/>
+                          <a:cs typeface="Courier New" panose="02070309020205020404" pitchFamily="49" charset="0"/>
+                        </a:rPr>
+                        <a:t>52 41 44 49 4F</a:t>
+                      </a:r>
+                    </a:p>
+                  </a:txBody>
+                  <a:tcPr anchor="ctr"/>
+                </a:tc>
+                <a:extLst>
+                  <a:ext uri="{0D108BD9-81ED-4DB2-BD59-A6C34878D82A}">
+                    <a16:rowId xmlns:a16="http://schemas.microsoft.com/office/drawing/2014/main" val="3914689851"/>
+                  </a:ext>
+                </a:extLst>
+              </a:tr>
+              <a:tr h="736699">
+                <a:tc>
+                  <a:txBody>
+                    <a:bodyPr/>
+                    <a:lstStyle/>
+                    <a:p>
+                      <a:pPr algn="ctr"/>
+                      <a:r>
+                        <a:rPr lang="en-US" dirty="0">
+                          <a:latin typeface="Courier New" panose="02070309020205020404" pitchFamily="49" charset="0"/>
+                          <a:cs typeface="Courier New" panose="02070309020205020404" pitchFamily="49" charset="0"/>
+                        </a:rPr>
+                        <a:t>50 52 4F 42 45</a:t>
+                      </a:r>
+                    </a:p>
+                  </a:txBody>
+                  <a:tcPr anchor="ctr"/>
+                </a:tc>
+                <a:tc>
+                  <a:txBody>
+                    <a:bodyPr/>
+                    <a:lstStyle/>
+                    <a:p>
+                      <a:pPr algn="ctr"/>
+                      <a:r>
+                        <a:rPr lang="en-US" dirty="0">
+                          <a:latin typeface="Courier New" panose="02070309020205020404" pitchFamily="49" charset="0"/>
+                          <a:cs typeface="Courier New" panose="02070309020205020404" pitchFamily="49" charset="0"/>
+                        </a:rPr>
+                        <a:t>52 4F 43 4B 53</a:t>
+                      </a:r>
+                    </a:p>
+                  </a:txBody>
+                  <a:tcPr anchor="ctr"/>
+                </a:tc>
+                <a:tc>
+                  <a:txBody>
+                    <a:bodyPr/>
+                    <a:lstStyle/>
+                    <a:p>
+                      <a:pPr algn="ctr"/>
+                      <a:r>
+                        <a:rPr lang="en-US" dirty="0">
+                          <a:latin typeface="Courier New" panose="02070309020205020404" pitchFamily="49" charset="0"/>
+                          <a:cs typeface="Courier New" panose="02070309020205020404" pitchFamily="49" charset="0"/>
+                        </a:rPr>
+                        <a:t>4F 52 42 49 54</a:t>
+                      </a:r>
+                    </a:p>
+                  </a:txBody>
+                  <a:tcPr anchor="ctr"/>
+                </a:tc>
+                <a:tc>
+                  <a:txBody>
+                    <a:bodyPr/>
+                    <a:lstStyle/>
+                    <a:p>
+                      <a:pPr algn="ctr"/>
+                      <a:r>
+                        <a:rPr lang="en-US" dirty="0">
+                          <a:latin typeface="Courier New" panose="02070309020205020404" pitchFamily="49" charset="0"/>
+                          <a:cs typeface="Courier New" panose="02070309020205020404" pitchFamily="49" charset="0"/>
+                        </a:rPr>
+                        <a:t>4C 55 4E 41 52</a:t>
+                      </a:r>
+                    </a:p>
+                  </a:txBody>
+                  <a:tcPr anchor="ctr"/>
+                </a:tc>
+                <a:extLst>
+                  <a:ext uri="{0D108BD9-81ED-4DB2-BD59-A6C34878D82A}">
+                    <a16:rowId xmlns:a16="http://schemas.microsoft.com/office/drawing/2014/main" val="1436048446"/>
+                  </a:ext>
+                </a:extLst>
+              </a:tr>
+              <a:tr h="736699">
+                <a:tc>
+                  <a:txBody>
+                    <a:bodyPr/>
+                    <a:lstStyle/>
+                    <a:p>
+                      <a:pPr algn="ctr"/>
+                      <a:r>
+                        <a:rPr lang="en-US" dirty="0">
+                          <a:latin typeface="Courier New" panose="02070309020205020404" pitchFamily="49" charset="0"/>
+                          <a:cs typeface="Courier New" panose="02070309020205020404" pitchFamily="49" charset="0"/>
+                        </a:rPr>
+                        <a:t>43 4F 4D </a:t>
+                      </a:r>
+                      <a:r>
+                        <a:rPr lang="en-US" dirty="0" err="1">
+                          <a:latin typeface="Courier New" panose="02070309020205020404" pitchFamily="49" charset="0"/>
+                          <a:cs typeface="Courier New" panose="02070309020205020404" pitchFamily="49" charset="0"/>
+                        </a:rPr>
+                        <a:t>4D</a:t>
+                      </a:r>
+                      <a:r>
+                        <a:rPr lang="en-US" dirty="0">
+                          <a:latin typeface="Courier New" panose="02070309020205020404" pitchFamily="49" charset="0"/>
+                          <a:cs typeface="Courier New" panose="02070309020205020404" pitchFamily="49" charset="0"/>
+                        </a:rPr>
+                        <a:t> 53</a:t>
+                      </a:r>
+                    </a:p>
+                  </a:txBody>
+                  <a:tcPr anchor="ctr"/>
+                </a:tc>
+                <a:tc>
+                  <a:txBody>
+                    <a:bodyPr/>
+                    <a:lstStyle/>
+                    <a:p>
+                      <a:pPr algn="ctr"/>
+                      <a:r>
+                        <a:rPr lang="en-US" dirty="0">
+                          <a:latin typeface="Courier New" panose="02070309020205020404" pitchFamily="49" charset="0"/>
+                          <a:cs typeface="Courier New" panose="02070309020205020404" pitchFamily="49" charset="0"/>
+                        </a:rPr>
+                        <a:t>43 50 4C 55 53</a:t>
+                      </a:r>
+                    </a:p>
+                  </a:txBody>
+                  <a:tcPr anchor="ctr"/>
+                </a:tc>
+                <a:tc>
+                  <a:txBody>
+                    <a:bodyPr/>
+                    <a:lstStyle/>
+                    <a:p>
+                      <a:pPr algn="ctr"/>
+                      <a:r>
+                        <a:rPr lang="en-US" dirty="0">
+                          <a:latin typeface="Courier New" panose="02070309020205020404" pitchFamily="49" charset="0"/>
+                          <a:cs typeface="Courier New" panose="02070309020205020404" pitchFamily="49" charset="0"/>
+                        </a:rPr>
+                        <a:t>41 53 54 52 4F</a:t>
+                      </a:r>
+                    </a:p>
+                  </a:txBody>
+                  <a:tcPr anchor="ctr"/>
+                </a:tc>
+                <a:tc>
+                  <a:txBody>
+                    <a:bodyPr/>
+                    <a:lstStyle/>
+                    <a:p>
+                      <a:pPr algn="ctr"/>
+                      <a:r>
+                        <a:rPr lang="en-US" dirty="0">
+                          <a:latin typeface="Courier New" panose="02070309020205020404" pitchFamily="49" charset="0"/>
+                          <a:cs typeface="Courier New" panose="02070309020205020404" pitchFamily="49" charset="0"/>
+                        </a:rPr>
+                        <a:t>57 4F 52 4C 44</a:t>
+                      </a:r>
+                    </a:p>
+                  </a:txBody>
+                  <a:tcPr anchor="ctr"/>
+                </a:tc>
+                <a:extLst>
+                  <a:ext uri="{0D108BD9-81ED-4DB2-BD59-A6C34878D82A}">
+                    <a16:rowId xmlns:a16="http://schemas.microsoft.com/office/drawing/2014/main" val="379625662"/>
+                  </a:ext>
+                </a:extLst>
+              </a:tr>
+              <a:tr h="736699">
+                <a:tc>
+                  <a:txBody>
+                    <a:bodyPr/>
+                    <a:lstStyle/>
+                    <a:p>
+                      <a:pPr algn="ctr"/>
+                      <a:r>
+                        <a:rPr lang="en-US" dirty="0">
+                          <a:latin typeface="Courier New" panose="02070309020205020404" pitchFamily="49" charset="0"/>
+                          <a:cs typeface="Courier New" panose="02070309020205020404" pitchFamily="49" charset="0"/>
+                        </a:rPr>
+                        <a:t>42 45 4E </a:t>
+                      </a:r>
+                      <a:r>
+                        <a:rPr lang="en-US" dirty="0" err="1">
+                          <a:latin typeface="Courier New" panose="02070309020205020404" pitchFamily="49" charset="0"/>
+                          <a:cs typeface="Courier New" panose="02070309020205020404" pitchFamily="49" charset="0"/>
+                        </a:rPr>
+                        <a:t>4E</a:t>
+                      </a:r>
+                      <a:r>
+                        <a:rPr lang="en-US" dirty="0">
+                          <a:latin typeface="Courier New" panose="02070309020205020404" pitchFamily="49" charset="0"/>
+                          <a:cs typeface="Courier New" panose="02070309020205020404" pitchFamily="49" charset="0"/>
+                        </a:rPr>
+                        <a:t> 55 </a:t>
+                      </a:r>
+                    </a:p>
+                  </a:txBody>
+                  <a:tcPr anchor="ctr"/>
+                </a:tc>
+                <a:tc>
+                  <a:txBody>
+                    <a:bodyPr/>
+                    <a:lstStyle/>
+                    <a:p>
+                      <a:pPr algn="ctr"/>
+                      <a:r>
+                        <a:rPr lang="en-US" dirty="0">
+                          <a:latin typeface="Courier New" panose="02070309020205020404" pitchFamily="49" charset="0"/>
+                          <a:cs typeface="Courier New" panose="02070309020205020404" pitchFamily="49" charset="0"/>
+                        </a:rPr>
+                        <a:t>4D 4F </a:t>
+                      </a:r>
+                      <a:r>
+                        <a:rPr lang="en-US" dirty="0" err="1">
+                          <a:latin typeface="Courier New" panose="02070309020205020404" pitchFamily="49" charset="0"/>
+                          <a:cs typeface="Courier New" panose="02070309020205020404" pitchFamily="49" charset="0"/>
+                        </a:rPr>
+                        <a:t>4F</a:t>
+                      </a:r>
+                      <a:r>
+                        <a:rPr lang="en-US" dirty="0">
+                          <a:latin typeface="Courier New" panose="02070309020205020404" pitchFamily="49" charset="0"/>
+                          <a:cs typeface="Courier New" panose="02070309020205020404" pitchFamily="49" charset="0"/>
+                        </a:rPr>
+                        <a:t> 4E 53</a:t>
+                      </a:r>
+                    </a:p>
+                  </a:txBody>
+                  <a:tcPr anchor="ctr"/>
+                </a:tc>
+                <a:tc>
+                  <a:txBody>
+                    <a:bodyPr/>
+                    <a:lstStyle/>
+                    <a:p>
+                      <a:pPr algn="ctr"/>
+                      <a:r>
+                        <a:rPr lang="en-US" dirty="0">
+                          <a:latin typeface="Courier New" panose="02070309020205020404" pitchFamily="49" charset="0"/>
+                          <a:cs typeface="Courier New" panose="02070309020205020404" pitchFamily="49" charset="0"/>
+                        </a:rPr>
+                        <a:t>53 50 41 43 45</a:t>
+                      </a:r>
+                    </a:p>
+                  </a:txBody>
+                  <a:tcPr anchor="ctr"/>
+                </a:tc>
+                <a:tc>
+                  <a:txBody>
+                    <a:bodyPr/>
+                    <a:lstStyle/>
+                    <a:p>
+                      <a:pPr algn="ctr"/>
+                      <a:r>
+                        <a:rPr lang="en-US" dirty="0">
+                          <a:latin typeface="Courier New" panose="02070309020205020404" pitchFamily="49" charset="0"/>
+                          <a:cs typeface="Courier New" panose="02070309020205020404" pitchFamily="49" charset="0"/>
+                        </a:rPr>
+                        <a:t>56 45 4E 55 53</a:t>
+                      </a:r>
+                    </a:p>
+                  </a:txBody>
+                  <a:tcPr anchor="ctr"/>
+                </a:tc>
+                <a:extLst>
+                  <a:ext uri="{0D108BD9-81ED-4DB2-BD59-A6C34878D82A}">
+                    <a16:rowId xmlns:a16="http://schemas.microsoft.com/office/drawing/2014/main" val="418278986"/>
+                  </a:ext>
+                </a:extLst>
+              </a:tr>
+              <a:tr h="736699">
+                <a:tc>
+                  <a:txBody>
+                    <a:bodyPr/>
+                    <a:lstStyle/>
+                    <a:p>
+                      <a:pPr algn="ctr"/>
+                      <a:r>
+                        <a:rPr lang="en-US" dirty="0">
+                          <a:latin typeface="Courier New" panose="02070309020205020404" pitchFamily="49" charset="0"/>
+                          <a:cs typeface="Courier New" panose="02070309020205020404" pitchFamily="49" charset="0"/>
+                        </a:rPr>
+                        <a:t>50 4C 55 54 4F</a:t>
+                      </a:r>
+                    </a:p>
+                  </a:txBody>
+                  <a:tcPr anchor="ctr"/>
+                </a:tc>
+                <a:tc>
+                  <a:txBody>
+                    <a:bodyPr/>
+                    <a:lstStyle/>
+                    <a:p>
+                      <a:pPr algn="ctr"/>
+                      <a:r>
+                        <a:rPr lang="en-US" dirty="0">
+                          <a:latin typeface="Courier New" panose="02070309020205020404" pitchFamily="49" charset="0"/>
+                          <a:cs typeface="Courier New" panose="02070309020205020404" pitchFamily="49" charset="0"/>
+                        </a:rPr>
+                        <a:t>41 53 43 49 49</a:t>
+                      </a:r>
+                    </a:p>
+                  </a:txBody>
+                  <a:tcPr anchor="ctr"/>
+                </a:tc>
+                <a:tc>
+                  <a:txBody>
+                    <a:bodyPr/>
+                    <a:lstStyle/>
+                    <a:p>
+                      <a:pPr algn="ctr"/>
+                      <a:r>
+                        <a:rPr lang="en-US" dirty="0">
+                          <a:latin typeface="Courier New" panose="02070309020205020404" pitchFamily="49" charset="0"/>
+                          <a:cs typeface="Courier New" panose="02070309020205020404" pitchFamily="49" charset="0"/>
+                        </a:rPr>
+                        <a:t>45 41 52 54 48</a:t>
+                      </a:r>
+                    </a:p>
+                  </a:txBody>
+                  <a:tcPr anchor="ctr"/>
+                </a:tc>
+                <a:tc>
+                  <a:txBody>
+                    <a:bodyPr/>
+                    <a:lstStyle/>
+                    <a:p>
+                      <a:pPr algn="ctr"/>
+                      <a:r>
+                        <a:rPr lang="en-US" dirty="0">
+                          <a:latin typeface="Courier New" panose="02070309020205020404" pitchFamily="49" charset="0"/>
+                          <a:cs typeface="Courier New" panose="02070309020205020404" pitchFamily="49" charset="0"/>
+                        </a:rPr>
+                        <a:t>52 41 44 49 4F</a:t>
+                      </a:r>
+                    </a:p>
+                  </a:txBody>
+                  <a:tcPr anchor="ctr"/>
+                </a:tc>
+                <a:extLst>
+                  <a:ext uri="{0D108BD9-81ED-4DB2-BD59-A6C34878D82A}">
+                    <a16:rowId xmlns:a16="http://schemas.microsoft.com/office/drawing/2014/main" val="787072625"/>
+                  </a:ext>
+                </a:extLst>
+              </a:tr>
+              <a:tr h="736699">
+                <a:tc>
+                  <a:txBody>
+                    <a:bodyPr/>
+                    <a:lstStyle/>
+                    <a:p>
+                      <a:pPr algn="ctr"/>
+                      <a:r>
+                        <a:rPr lang="en-US" dirty="0">
+                          <a:latin typeface="Courier New" panose="02070309020205020404" pitchFamily="49" charset="0"/>
+                          <a:cs typeface="Courier New" panose="02070309020205020404" pitchFamily="49" charset="0"/>
+                        </a:rPr>
+                        <a:t>50 52 4F 42 45</a:t>
+                      </a:r>
+                    </a:p>
+                  </a:txBody>
+                  <a:tcPr anchor="ctr"/>
+                </a:tc>
+                <a:tc>
+                  <a:txBody>
+                    <a:bodyPr/>
+                    <a:lstStyle/>
+                    <a:p>
+                      <a:pPr algn="ctr"/>
+                      <a:r>
+                        <a:rPr lang="en-US" dirty="0">
+                          <a:latin typeface="Courier New" panose="02070309020205020404" pitchFamily="49" charset="0"/>
+                          <a:cs typeface="Courier New" panose="02070309020205020404" pitchFamily="49" charset="0"/>
+                        </a:rPr>
+                        <a:t>52 4F 43 4B 53</a:t>
+                      </a:r>
+                    </a:p>
+                  </a:txBody>
+                  <a:tcPr anchor="ctr"/>
+                </a:tc>
+                <a:tc>
+                  <a:txBody>
+                    <a:bodyPr/>
+                    <a:lstStyle/>
+                    <a:p>
+                      <a:pPr algn="ctr"/>
+                      <a:r>
+                        <a:rPr lang="en-US" dirty="0">
+                          <a:latin typeface="Courier New" panose="02070309020205020404" pitchFamily="49" charset="0"/>
+                          <a:cs typeface="Courier New" panose="02070309020205020404" pitchFamily="49" charset="0"/>
+                        </a:rPr>
+                        <a:t>4F 52 42 49 54</a:t>
+                      </a:r>
+                    </a:p>
+                  </a:txBody>
+                  <a:tcPr anchor="ctr"/>
+                </a:tc>
+                <a:tc>
+                  <a:txBody>
+                    <a:bodyPr/>
+                    <a:lstStyle/>
+                    <a:p>
+                      <a:pPr algn="ctr"/>
+                      <a:r>
+                        <a:rPr lang="en-US" dirty="0">
+                          <a:latin typeface="Courier New" panose="02070309020205020404" pitchFamily="49" charset="0"/>
+                          <a:cs typeface="Courier New" panose="02070309020205020404" pitchFamily="49" charset="0"/>
+                        </a:rPr>
+                        <a:t>4C 55 4E 41 52</a:t>
+                      </a:r>
+                    </a:p>
+                  </a:txBody>
+                  <a:tcPr anchor="ctr"/>
+                </a:tc>
+                <a:extLst>
+                  <a:ext uri="{0D108BD9-81ED-4DB2-BD59-A6C34878D82A}">
+                    <a16:rowId xmlns:a16="http://schemas.microsoft.com/office/drawing/2014/main" val="2237316584"/>
+                  </a:ext>
+                </a:extLst>
+              </a:tr>
+              <a:tr h="736699">
+                <a:tc>
+                  <a:txBody>
+                    <a:bodyPr/>
+                    <a:lstStyle/>
+                    <a:p>
+                      <a:pPr algn="ctr"/>
+                      <a:r>
+                        <a:rPr lang="en-US" dirty="0">
+                          <a:latin typeface="Courier New" panose="02070309020205020404" pitchFamily="49" charset="0"/>
+                          <a:cs typeface="Courier New" panose="02070309020205020404" pitchFamily="49" charset="0"/>
+                        </a:rPr>
+                        <a:t>43 4F 4D </a:t>
+                      </a:r>
+                      <a:r>
+                        <a:rPr lang="en-US" dirty="0" err="1">
+                          <a:latin typeface="Courier New" panose="02070309020205020404" pitchFamily="49" charset="0"/>
+                          <a:cs typeface="Courier New" panose="02070309020205020404" pitchFamily="49" charset="0"/>
+                        </a:rPr>
+                        <a:t>4D</a:t>
+                      </a:r>
+                      <a:r>
+                        <a:rPr lang="en-US" dirty="0">
+                          <a:latin typeface="Courier New" panose="02070309020205020404" pitchFamily="49" charset="0"/>
+                          <a:cs typeface="Courier New" panose="02070309020205020404" pitchFamily="49" charset="0"/>
+                        </a:rPr>
+                        <a:t> 53</a:t>
+                      </a:r>
+                    </a:p>
+                  </a:txBody>
+                  <a:tcPr anchor="ctr"/>
+                </a:tc>
+                <a:tc>
+                  <a:txBody>
+                    <a:bodyPr/>
+                    <a:lstStyle/>
+                    <a:p>
+                      <a:pPr algn="ctr"/>
+                      <a:r>
+                        <a:rPr lang="en-US" dirty="0">
+                          <a:latin typeface="Courier New" panose="02070309020205020404" pitchFamily="49" charset="0"/>
+                          <a:cs typeface="Courier New" panose="02070309020205020404" pitchFamily="49" charset="0"/>
+                        </a:rPr>
+                        <a:t>43 50 4C 55 53</a:t>
+                      </a:r>
+                    </a:p>
+                  </a:txBody>
+                  <a:tcPr anchor="ctr"/>
+                </a:tc>
+                <a:tc>
+                  <a:txBody>
+                    <a:bodyPr/>
+                    <a:lstStyle/>
+                    <a:p>
+                      <a:pPr algn="ctr"/>
+                      <a:r>
+                        <a:rPr lang="en-US" dirty="0">
+                          <a:latin typeface="Courier New" panose="02070309020205020404" pitchFamily="49" charset="0"/>
+                          <a:cs typeface="Courier New" panose="02070309020205020404" pitchFamily="49" charset="0"/>
+                        </a:rPr>
+                        <a:t>41 53 54 52 4F</a:t>
+                      </a:r>
+                    </a:p>
+                  </a:txBody>
+                  <a:tcPr anchor="ctr"/>
+                </a:tc>
+                <a:tc>
+                  <a:txBody>
+                    <a:bodyPr/>
+                    <a:lstStyle/>
+                    <a:p>
+                      <a:pPr algn="ctr"/>
+                      <a:r>
+                        <a:rPr lang="en-US" dirty="0">
+                          <a:latin typeface="Courier New" panose="02070309020205020404" pitchFamily="49" charset="0"/>
+                          <a:cs typeface="Courier New" panose="02070309020205020404" pitchFamily="49" charset="0"/>
+                        </a:rPr>
+                        <a:t>57 4F 52 4C 44</a:t>
+                      </a:r>
+                    </a:p>
+                  </a:txBody>
+                  <a:tcPr anchor="ctr"/>
+                </a:tc>
+                <a:extLst>
+                  <a:ext uri="{0D108BD9-81ED-4DB2-BD59-A6C34878D82A}">
+                    <a16:rowId xmlns:a16="http://schemas.microsoft.com/office/drawing/2014/main" val="735326505"/>
+                  </a:ext>
+                </a:extLst>
+              </a:tr>
+            </a:tbl>
+          </a:graphicData>
+        </a:graphic>
+      </p:graphicFrame>
+    </p:spTree>
+    <p:extLst>
+      <p:ext uri="{BB962C8B-B14F-4D97-AF65-F5344CB8AC3E}">
+        <p14:creationId xmlns:p14="http://schemas.microsoft.com/office/powerpoint/2010/main" val="671678927"/>
       </p:ext>
     </p:extLst>
   </p:cSld>

</xml_diff>